<commit_message>
New structure, notes added
</commit_message>
<xml_diff>
--- a/Report/Presentatie_1.pptx
+++ b/Report/Presentatie_1.pptx
@@ -5,7 +5,7 @@
     <p:sldMasterId id="2147483660" r:id="rId1"/>
   </p:sldMasterIdLst>
   <p:notesMasterIdLst>
-    <p:notesMasterId r:id="rId16"/>
+    <p:notesMasterId r:id="rId17"/>
   </p:notesMasterIdLst>
   <p:sldIdLst>
     <p:sldId id="259" r:id="rId2"/>
@@ -19,9 +19,10 @@
     <p:sldId id="268" r:id="rId10"/>
     <p:sldId id="296" r:id="rId11"/>
     <p:sldId id="297" r:id="rId12"/>
-    <p:sldId id="269" r:id="rId13"/>
-    <p:sldId id="271" r:id="rId14"/>
-    <p:sldId id="266" r:id="rId15"/>
+    <p:sldId id="298" r:id="rId13"/>
+    <p:sldId id="269" r:id="rId14"/>
+    <p:sldId id="271" r:id="rId15"/>
+    <p:sldId id="266" r:id="rId16"/>
   </p:sldIdLst>
   <p:sldSz cx="17338675" cy="9753600"/>
   <p:notesSz cx="6858000" cy="9144000"/>
@@ -573,6 +574,279 @@
 </p:notes>
 </file>
 
+<file path=ppt/notesSlides/notesSlide10.xml><?xml version="1.0" encoding="utf-8"?>
+<p:notes xmlns:a="http://schemas.openxmlformats.org/drawingml/2006/main" xmlns:r="http://schemas.openxmlformats.org/officeDocument/2006/relationships" xmlns:p="http://schemas.openxmlformats.org/presentationml/2006/main">
+  <p:cSld>
+    <p:spTree>
+      <p:nvGrpSpPr>
+        <p:cNvPr id="1" name=""/>
+        <p:cNvGrpSpPr/>
+        <p:nvPr/>
+      </p:nvGrpSpPr>
+      <p:grpSpPr>
+        <a:xfrm>
+          <a:off x="0" y="0"/>
+          <a:ext cx="0" cy="0"/>
+          <a:chOff x="0" y="0"/>
+          <a:chExt cx="0" cy="0"/>
+        </a:xfrm>
+      </p:grpSpPr>
+      <p:sp>
+        <p:nvSpPr>
+          <p:cNvPr id="2" name="Tijdelijke aanduiding voor dia-afbeelding 1"/>
+          <p:cNvSpPr>
+            <a:spLocks noGrp="1" noRot="1" noChangeAspect="1"/>
+          </p:cNvSpPr>
+          <p:nvPr>
+            <p:ph type="sldImg"/>
+          </p:nvPr>
+        </p:nvSpPr>
+        <p:spPr/>
+      </p:sp>
+      <p:sp>
+        <p:nvSpPr>
+          <p:cNvPr id="3" name="Tijdelijke aanduiding voor notities 2"/>
+          <p:cNvSpPr>
+            <a:spLocks noGrp="1"/>
+          </p:cNvSpPr>
+          <p:nvPr>
+            <p:ph type="body" idx="1"/>
+          </p:nvPr>
+        </p:nvSpPr>
+        <p:spPr/>
+        <p:txBody>
+          <a:bodyPr/>
+          <a:lstStyle/>
+          <a:p>
+            <a:r>
+              <a:rPr lang="nl-BE" dirty="0">
+                <a:sym typeface="Wingdings" pitchFamily="2" charset="2"/>
+              </a:rPr>
+              <a:t>Drone aansturen via Raspberry </a:t>
+            </a:r>
+          </a:p>
+          <a:p>
+            <a:endParaRPr lang="nl-BE" dirty="0">
+              <a:sym typeface="Wingdings" pitchFamily="2" charset="2"/>
+            </a:endParaRPr>
+          </a:p>
+          <a:p>
+            <a:endParaRPr lang="nl-BE" dirty="0">
+              <a:sym typeface="Wingdings" pitchFamily="2" charset="2"/>
+            </a:endParaRPr>
+          </a:p>
+          <a:p>
+            <a:endParaRPr lang="nl-BE" dirty="0"/>
+          </a:p>
+        </p:txBody>
+      </p:sp>
+      <p:sp>
+        <p:nvSpPr>
+          <p:cNvPr id="4" name="Tijdelijke aanduiding voor dianummer 3"/>
+          <p:cNvSpPr>
+            <a:spLocks noGrp="1"/>
+          </p:cNvSpPr>
+          <p:nvPr>
+            <p:ph type="sldNum" sz="quarter" idx="10"/>
+          </p:nvPr>
+        </p:nvSpPr>
+        <p:spPr/>
+        <p:txBody>
+          <a:bodyPr/>
+          <a:lstStyle/>
+          <a:p>
+            <a:fld id="{539A0A48-EDB1-4AFE-B1B7-10CE2A416496}" type="slidenum">
+              <a:rPr lang="en-GB" smtClean="0"/>
+              <a:t>12</a:t>
+            </a:fld>
+            <a:endParaRPr lang="en-GB"/>
+          </a:p>
+        </p:txBody>
+      </p:sp>
+    </p:spTree>
+    <p:extLst>
+      <p:ext uri="{BB962C8B-B14F-4D97-AF65-F5344CB8AC3E}">
+        <p14:creationId xmlns:p14="http://schemas.microsoft.com/office/powerpoint/2010/main" val="1259480818"/>
+      </p:ext>
+    </p:extLst>
+  </p:cSld>
+  <p:clrMapOvr>
+    <a:masterClrMapping/>
+  </p:clrMapOvr>
+</p:notes>
+</file>
+
+<file path=ppt/notesSlides/notesSlide11.xml><?xml version="1.0" encoding="utf-8"?>
+<p:notes xmlns:a="http://schemas.openxmlformats.org/drawingml/2006/main" xmlns:r="http://schemas.openxmlformats.org/officeDocument/2006/relationships" xmlns:p="http://schemas.openxmlformats.org/presentationml/2006/main">
+  <p:cSld>
+    <p:spTree>
+      <p:nvGrpSpPr>
+        <p:cNvPr id="1" name=""/>
+        <p:cNvGrpSpPr/>
+        <p:nvPr/>
+      </p:nvGrpSpPr>
+      <p:grpSpPr>
+        <a:xfrm>
+          <a:off x="0" y="0"/>
+          <a:ext cx="0" cy="0"/>
+          <a:chOff x="0" y="0"/>
+          <a:chExt cx="0" cy="0"/>
+        </a:xfrm>
+      </p:grpSpPr>
+      <p:sp>
+        <p:nvSpPr>
+          <p:cNvPr id="2" name="Slide Image Placeholder 1"/>
+          <p:cNvSpPr>
+            <a:spLocks noGrp="1" noRot="1" noChangeAspect="1"/>
+          </p:cNvSpPr>
+          <p:nvPr>
+            <p:ph type="sldImg"/>
+          </p:nvPr>
+        </p:nvSpPr>
+        <p:spPr/>
+      </p:sp>
+      <p:sp>
+        <p:nvSpPr>
+          <p:cNvPr id="3" name="Notes Placeholder 2"/>
+          <p:cNvSpPr>
+            <a:spLocks noGrp="1"/>
+          </p:cNvSpPr>
+          <p:nvPr>
+            <p:ph type="body" idx="1"/>
+          </p:nvPr>
+        </p:nvSpPr>
+        <p:spPr/>
+        <p:txBody>
+          <a:bodyPr/>
+          <a:lstStyle/>
+          <a:p>
+            <a:endParaRPr lang="en-GB" dirty="0"/>
+          </a:p>
+        </p:txBody>
+      </p:sp>
+      <p:sp>
+        <p:nvSpPr>
+          <p:cNvPr id="4" name="Slide Number Placeholder 3"/>
+          <p:cNvSpPr>
+            <a:spLocks noGrp="1"/>
+          </p:cNvSpPr>
+          <p:nvPr>
+            <p:ph type="sldNum" sz="quarter" idx="10"/>
+          </p:nvPr>
+        </p:nvSpPr>
+        <p:spPr/>
+        <p:txBody>
+          <a:bodyPr/>
+          <a:lstStyle/>
+          <a:p>
+            <a:fld id="{539A0A48-EDB1-4AFE-B1B7-10CE2A416496}" type="slidenum">
+              <a:rPr lang="en-GB" smtClean="0"/>
+              <a:t>13</a:t>
+            </a:fld>
+            <a:endParaRPr lang="en-GB"/>
+          </a:p>
+        </p:txBody>
+      </p:sp>
+    </p:spTree>
+    <p:extLst>
+      <p:ext uri="{BB962C8B-B14F-4D97-AF65-F5344CB8AC3E}">
+        <p14:creationId xmlns:p14="http://schemas.microsoft.com/office/powerpoint/2010/main" val="3237113512"/>
+      </p:ext>
+    </p:extLst>
+  </p:cSld>
+  <p:clrMapOvr>
+    <a:masterClrMapping/>
+  </p:clrMapOvr>
+</p:notes>
+</file>
+
+<file path=ppt/notesSlides/notesSlide12.xml><?xml version="1.0" encoding="utf-8"?>
+<p:notes xmlns:a="http://schemas.openxmlformats.org/drawingml/2006/main" xmlns:r="http://schemas.openxmlformats.org/officeDocument/2006/relationships" xmlns:p="http://schemas.openxmlformats.org/presentationml/2006/main">
+  <p:cSld>
+    <p:spTree>
+      <p:nvGrpSpPr>
+        <p:cNvPr id="1" name=""/>
+        <p:cNvGrpSpPr/>
+        <p:nvPr/>
+      </p:nvGrpSpPr>
+      <p:grpSpPr>
+        <a:xfrm>
+          <a:off x="0" y="0"/>
+          <a:ext cx="0" cy="0"/>
+          <a:chOff x="0" y="0"/>
+          <a:chExt cx="0" cy="0"/>
+        </a:xfrm>
+      </p:grpSpPr>
+      <p:sp>
+        <p:nvSpPr>
+          <p:cNvPr id="2" name="Tijdelijke aanduiding voor dia-afbeelding 1"/>
+          <p:cNvSpPr>
+            <a:spLocks noGrp="1" noRot="1" noChangeAspect="1"/>
+          </p:cNvSpPr>
+          <p:nvPr>
+            <p:ph type="sldImg"/>
+          </p:nvPr>
+        </p:nvSpPr>
+        <p:spPr/>
+      </p:sp>
+      <p:sp>
+        <p:nvSpPr>
+          <p:cNvPr id="3" name="Tijdelijke aanduiding voor notities 2"/>
+          <p:cNvSpPr>
+            <a:spLocks noGrp="1"/>
+          </p:cNvSpPr>
+          <p:nvPr>
+            <p:ph type="body" idx="1"/>
+          </p:nvPr>
+        </p:nvSpPr>
+        <p:spPr/>
+        <p:txBody>
+          <a:bodyPr/>
+          <a:lstStyle/>
+          <a:p>
+            <a:r>
+              <a:rPr lang="nl-BE" dirty="0"/>
+              <a:t>Planning?</a:t>
+            </a:r>
+          </a:p>
+        </p:txBody>
+      </p:sp>
+      <p:sp>
+        <p:nvSpPr>
+          <p:cNvPr id="4" name="Tijdelijke aanduiding voor dianummer 3"/>
+          <p:cNvSpPr>
+            <a:spLocks noGrp="1"/>
+          </p:cNvSpPr>
+          <p:nvPr>
+            <p:ph type="sldNum" sz="quarter" idx="10"/>
+          </p:nvPr>
+        </p:nvSpPr>
+        <p:spPr/>
+        <p:txBody>
+          <a:bodyPr/>
+          <a:lstStyle/>
+          <a:p>
+            <a:fld id="{539A0A48-EDB1-4AFE-B1B7-10CE2A416496}" type="slidenum">
+              <a:rPr lang="en-GB" smtClean="0"/>
+              <a:t>14</a:t>
+            </a:fld>
+            <a:endParaRPr lang="en-GB"/>
+          </a:p>
+        </p:txBody>
+      </p:sp>
+    </p:spTree>
+    <p:extLst>
+      <p:ext uri="{BB962C8B-B14F-4D97-AF65-F5344CB8AC3E}">
+        <p14:creationId xmlns:p14="http://schemas.microsoft.com/office/powerpoint/2010/main" val="2736078886"/>
+      </p:ext>
+    </p:extLst>
+  </p:cSld>
+  <p:clrMapOvr>
+    <a:masterClrMapping/>
+  </p:clrMapOvr>
+</p:notes>
+</file>
+
 <file path=ppt/notesSlides/notesSlide2.xml><?xml version="1.0" encoding="utf-8"?>
 <p:notes xmlns:a="http://schemas.openxmlformats.org/drawingml/2006/main" xmlns:r="http://schemas.openxmlformats.org/officeDocument/2006/relationships" xmlns:p="http://schemas.openxmlformats.org/presentationml/2006/main">
   <p:cSld>
@@ -619,26 +893,47 @@
           <a:p>
             <a:r>
               <a:rPr lang="nl-BE" dirty="0"/>
-              <a:t>Voorraden beheren in een magazijn. Traditioneel gebeurd dit door werknemers die op een vork- of schaarlift handmatig de barcodes inscannen. Zoals je wel kan aanvoelen is dat een zeer langzame, dure en gevaarlijke aanpak. Een kosteneffectievere oplossing is door gebruik te maken van automatisch aangestuurde drones die met een camera de barcodes kunnen inscannen. </a:t>
-            </a:r>
-          </a:p>
-          <a:p>
+              <a:t>Voorraden beheren in een magazijn.</a:t>
+            </a:r>
+          </a:p>
+          <a:p>
+            <a:r>
+              <a:rPr lang="nl-BE" dirty="0"/>
+              <a:t>Nu handmatig barcodes scannen </a:t>
+            </a:r>
+            <a:r>
+              <a:rPr lang="nl-BE" dirty="0">
+                <a:sym typeface="Wingdings" pitchFamily="2" charset="2"/>
+              </a:rPr>
+              <a:t> Traag, duur en gevaarlijk</a:t>
+            </a:r>
+          </a:p>
+          <a:p>
+            <a:endParaRPr lang="nl-BE" dirty="0">
+              <a:sym typeface="Wingdings" pitchFamily="2" charset="2"/>
+            </a:endParaRPr>
+          </a:p>
+          <a:p>
+            <a:r>
+              <a:rPr lang="nl-BE" dirty="0">
+                <a:sym typeface="Wingdings" pitchFamily="2" charset="2"/>
+              </a:rPr>
+              <a:t>Oplossing  Automatisch aangestuurde drones die via een camera de barcodes kunnen inscannen</a:t>
+            </a:r>
+          </a:p>
+          <a:p>
+            <a:endParaRPr lang="nl-BE" dirty="0">
+              <a:sym typeface="Wingdings" pitchFamily="2" charset="2"/>
+            </a:endParaRPr>
+          </a:p>
+          <a:p>
+            <a:r>
+              <a:rPr lang="nl-BE" dirty="0">
+                <a:sym typeface="Wingdings" pitchFamily="2" charset="2"/>
+              </a:rPr>
+              <a:t>WIJ  De basis, drone autonoom een vooraf bepaalde route laten vliegen in een magazijn. </a:t>
+            </a:r>
             <a:endParaRPr lang="nl-BE" dirty="0"/>
-          </a:p>
-          <a:p>
-            <a:r>
-              <a:rPr lang="nl-BE" dirty="0"/>
-              <a:t>Voor ons VOP gaan wij proberen om een basis te leggen voor dit systeem. In eerste instantie willen wij autonoom een drone een vooraf bepaalde route laten vliegen in een magazijn. In tweede instantie willen we graag het systeem uitbreiden naar meerdere drones die zonder accidenten door elkaar kunnen laten vliegen om zo het proces te versnellen, of grotere magazijnen te onderhouden.</a:t>
-            </a:r>
-          </a:p>
-          <a:p>
-            <a:endParaRPr lang="nl-BE" dirty="0"/>
-          </a:p>
-          <a:p>
-            <a:r>
-              <a:rPr lang="nl-BE" dirty="0"/>
-              <a:t>Om dit tot een goed einde te kunne brengen, hebben we reeds al een aantal hardware keuzes gemaakt, die we nu eerst verder gaan toelichten.</a:t>
-            </a:r>
           </a:p>
         </p:txBody>
       </p:sp>
@@ -808,7 +1103,7 @@
           <a:p>
             <a:r>
               <a:rPr lang="nl-BE" dirty="0"/>
-              <a:t>In theorie is het mogelijk om de drone op een gekende locatie te laten vertrekken en een voorgeprogrameerde route mee te geven. In de praktijk gaat dat zeker en vast voor problemen zorgen. Denk maar bijvoorbeeld aan een ongekend obstakel dat plots het pad kruist van de drone, of een ventilatieschacht die hem uit positie blaats. Daarom is het dus nodig dat we steeds weten waar de drone zicht bevind in de ruimte. Wanneer we kijken naar bekende localisatie algoritmen zoals gps, wifi en bluetooth, merken we dat deze veel te onnauwkeurig zijn voor onze toepassing. Als we een drone tussen 2 rekken met een doorgang van 2meter willen laten vliegen, dan zouden we graag iets nauwkeuriger willer weten dan wat deze signalen aankunnen. </a:t>
+              <a:t>Project samengevat op één dia</a:t>
             </a:r>
           </a:p>
           <a:p>
@@ -817,7 +1112,87 @@
           <a:p>
             <a:r>
               <a:rPr lang="nl-BE" dirty="0"/>
-              <a:t>Ultra Wide Band voldoet aan onze noden. Dit is een nog vrij recente techniek die ons een nauwkeurigheid in de grootteorde van 10cm kan geven, wat normaal wel voldoende is om onze drone indoor te kunnen lokaliseren.</a:t>
+              <a:t>Drone </a:t>
+            </a:r>
+          </a:p>
+          <a:p>
+            <a:r>
+              <a:rPr lang="nl-BE" dirty="0"/>
+              <a:t>Raspberry Pi Zero W </a:t>
+            </a:r>
+            <a:r>
+              <a:rPr lang="nl-BE" dirty="0">
+                <a:sym typeface="Wingdings" pitchFamily="2" charset="2"/>
+              </a:rPr>
+              <a:t> De controller, kleine computer</a:t>
+            </a:r>
+            <a:endParaRPr lang="nl-BE" dirty="0"/>
+          </a:p>
+          <a:p>
+            <a:r>
+              <a:rPr lang="nl-BE" dirty="0"/>
+              <a:t>Batterij </a:t>
+            </a:r>
+            <a:r>
+              <a:rPr lang="nl-BE" dirty="0">
+                <a:sym typeface="Wingdings" pitchFamily="2" charset="2"/>
+              </a:rPr>
+              <a:t> De controller van stroom voorzien</a:t>
+            </a:r>
+            <a:endParaRPr lang="nl-BE" dirty="0"/>
+          </a:p>
+          <a:p>
+            <a:r>
+              <a:rPr lang="nl-BE" dirty="0"/>
+              <a:t>Server </a:t>
+            </a:r>
+            <a:r>
+              <a:rPr lang="nl-BE" dirty="0">
+                <a:sym typeface="Wingdings" pitchFamily="2" charset="2"/>
+              </a:rPr>
+              <a:t> Komt later aan bod</a:t>
+            </a:r>
+            <a:endParaRPr lang="nl-BE" dirty="0"/>
+          </a:p>
+          <a:p>
+            <a:endParaRPr lang="nl-BE" dirty="0"/>
+          </a:p>
+          <a:p>
+            <a:r>
+              <a:rPr lang="nl-BE" dirty="0"/>
+              <a:t>Bram: </a:t>
+            </a:r>
+          </a:p>
+          <a:p>
+            <a:r>
+              <a:rPr lang="nl-BE" dirty="0"/>
+              <a:t>Pozyx tags en anchers </a:t>
+            </a:r>
+          </a:p>
+          <a:p>
+            <a:r>
+              <a:rPr lang="nl-BE" dirty="0"/>
+              <a:t>Theorie: Exact een route aan de drone meegeven vanaf een gekende locatie</a:t>
+            </a:r>
+          </a:p>
+          <a:p>
+            <a:r>
+              <a:rPr lang="nl-BE" dirty="0"/>
+              <a:t>Praktijk: Onhaalbaar </a:t>
+            </a:r>
+            <a:r>
+              <a:rPr lang="nl-BE" dirty="0">
+                <a:sym typeface="Wingdings" pitchFamily="2" charset="2"/>
+              </a:rPr>
+              <a:t> Ongekende obstakels, een ventilatieschacht etc.</a:t>
+            </a:r>
+          </a:p>
+          <a:p>
+            <a:r>
+              <a:rPr lang="nl-BE" dirty="0">
+                <a:sym typeface="Wingdings" pitchFamily="2" charset="2"/>
+              </a:rPr>
+              <a:t>Locatie is belangrijk</a:t>
             </a:r>
           </a:p>
         </p:txBody>
@@ -839,7 +1214,7 @@
           <a:p>
             <a:fld id="{539A0A48-EDB1-4AFE-B1B7-10CE2A416496}" type="slidenum">
               <a:rPr lang="en-GB" smtClean="0"/>
-              <a:t>7</a:t>
+              <a:t>6</a:t>
             </a:fld>
             <a:endParaRPr lang="en-GB"/>
           </a:p>
@@ -848,7 +1223,7 @@
     </p:spTree>
     <p:extLst>
       <p:ext uri="{BB962C8B-B14F-4D97-AF65-F5344CB8AC3E}">
-        <p14:creationId xmlns:p14="http://schemas.microsoft.com/office/powerpoint/2010/main" val="3176631790"/>
+        <p14:creationId xmlns:p14="http://schemas.microsoft.com/office/powerpoint/2010/main" val="2513926235"/>
       </p:ext>
     </p:extLst>
   </p:cSld>
@@ -904,17 +1279,42 @@
           <a:p>
             <a:r>
               <a:rPr lang="nl-BE" dirty="0"/>
-              <a:t>Om deze lokatiebepaling te kunnen doen via UWB hebben we twee verschillende hardware componenten op het oog, de Pozyx en de Decawave. In de eerste fase maken we gebruik van het pozyx-systeem. Dit bestaat uit een tag die we samen met de raspberry aan de drone kunnen bevestigen en verschillende anker nodes die op gekende locaties in het gebouw worden opgehangen. De tag kan dan om de beurt de verschillende ankers aanspreken, en vragen hoever hij van hen verwijderd is. Wanneer er enkele afstanden gekend zijn, kan hij zijn locatie bepalen ten opzichte van de ankers. </a:t>
-            </a:r>
-          </a:p>
-          <a:p>
+              <a:t>Bram:</a:t>
+            </a:r>
+          </a:p>
+          <a:p>
+            <a:r>
+              <a:rPr lang="nl-BE" dirty="0"/>
+              <a:t>Denken aan locatie </a:t>
+            </a:r>
+            <a:r>
+              <a:rPr lang="nl-BE" dirty="0">
+                <a:sym typeface="Wingdings" pitchFamily="2" charset="2"/>
+              </a:rPr>
+              <a:t> Gps, wifi, bluetooth  Te onnauwkeurig</a:t>
+            </a:r>
+          </a:p>
+          <a:p>
+            <a:r>
+              <a:rPr lang="nl-BE" dirty="0">
+                <a:sym typeface="Wingdings" pitchFamily="2" charset="2"/>
+              </a:rPr>
+              <a:t>Ons doel is om drone tussen rekken op 2m afstand te laten vliegen</a:t>
+            </a:r>
+          </a:p>
+          <a:p>
+            <a:endParaRPr lang="nl-BE" dirty="0">
+              <a:sym typeface="Wingdings" pitchFamily="2" charset="2"/>
+            </a:endParaRPr>
+          </a:p>
+          <a:p>
+            <a:r>
+              <a:rPr lang="nl-BE" dirty="0">
+                <a:sym typeface="Wingdings" pitchFamily="2" charset="2"/>
+              </a:rPr>
+              <a:t>Oplossing UWB</a:t>
+            </a:r>
             <a:endParaRPr lang="nl-BE" dirty="0"/>
-          </a:p>
-          <a:p>
-            <a:r>
-              <a:rPr lang="nl-BE" dirty="0"/>
-              <a:t>Een andere component die we op het oog hebben, is de Decawave DWM-1001 deze bevat dezelfde UWB chip, maar is goedkoper, compacter, en lichter dan de pozyx. Voor de drone die we hebben aangekocht, speelt het gewichtsverschil niet echt een probleem. We moeten wel in het achterhoofd houden dat als we meer massa toevoegen, hij stabiliteit en vlieguren, minuten, gaat verliezen. De reden dat we niet rechtstreeks hier mee aan de slag gaan is omdat er eerst nog onderzocht wordt of het technisch wel haalbaar is om makkelijk met de chip te communiceren, wat dan wel eenvoudiger is bij de pozyx.</a:t>
-            </a:r>
           </a:p>
         </p:txBody>
       </p:sp>
@@ -935,7 +1335,7 @@
           <a:p>
             <a:fld id="{539A0A48-EDB1-4AFE-B1B7-10CE2A416496}" type="slidenum">
               <a:rPr lang="en-GB" smtClean="0"/>
-              <a:t>8</a:t>
+              <a:t>7</a:t>
             </a:fld>
             <a:endParaRPr lang="en-GB"/>
           </a:p>
@@ -944,7 +1344,7 @@
     </p:spTree>
     <p:extLst>
       <p:ext uri="{BB962C8B-B14F-4D97-AF65-F5344CB8AC3E}">
-        <p14:creationId xmlns:p14="http://schemas.microsoft.com/office/powerpoint/2010/main" val="2418677896"/>
+        <p14:creationId xmlns:p14="http://schemas.microsoft.com/office/powerpoint/2010/main" val="3176631790"/>
       </p:ext>
     </p:extLst>
   </p:cSld>
@@ -973,7 +1373,7 @@
       </p:grpSpPr>
       <p:sp>
         <p:nvSpPr>
-          <p:cNvPr id="2" name="Slide Image Placeholder 1"/>
+          <p:cNvPr id="2" name="Tijdelijke aanduiding voor dia-afbeelding 1"/>
           <p:cNvSpPr>
             <a:spLocks noGrp="1" noRot="1" noChangeAspect="1"/>
           </p:cNvSpPr>
@@ -985,7 +1385,7 @@
       </p:sp>
       <p:sp>
         <p:nvSpPr>
-          <p:cNvPr id="3" name="Notes Placeholder 2"/>
+          <p:cNvPr id="3" name="Tijdelijke aanduiding voor notities 2"/>
           <p:cNvSpPr>
             <a:spLocks noGrp="1"/>
           </p:cNvSpPr>
@@ -998,13 +1398,70 @@
           <a:bodyPr/>
           <a:lstStyle/>
           <a:p>
-            <a:endParaRPr lang="en-GB"/>
-          </a:p>
-        </p:txBody>
-      </p:sp>
-      <p:sp>
-        <p:nvSpPr>
-          <p:cNvPr id="4" name="Slide Number Placeholder 3"/>
+            <a:r>
+              <a:rPr lang="nl-BE" dirty="0"/>
+              <a:t>Bram:</a:t>
+            </a:r>
+          </a:p>
+          <a:p>
+            <a:r>
+              <a:rPr lang="nl-BE" dirty="0"/>
+              <a:t>Ankers op gekende locaties</a:t>
+            </a:r>
+          </a:p>
+          <a:p>
+            <a:r>
+              <a:rPr lang="nl-BE" dirty="0"/>
+              <a:t>Tag aan de Raspberry Pi op de drone</a:t>
+            </a:r>
+          </a:p>
+          <a:p>
+            <a:endParaRPr lang="nl-BE" dirty="0"/>
+          </a:p>
+          <a:p>
+            <a:r>
+              <a:rPr lang="nl-BE" dirty="0"/>
+              <a:t>Tag spreekt om de beurt ankers aan, en weet hierdoor de afstand tot een bepaald punt in het magazijn</a:t>
+            </a:r>
+          </a:p>
+          <a:p>
+            <a:endParaRPr lang="nl-BE" dirty="0"/>
+          </a:p>
+          <a:p>
+            <a:r>
+              <a:rPr lang="nl-BE" dirty="0"/>
+              <a:t>Eerst gekozen voor Pozyx, want was direct beschikbaar</a:t>
+            </a:r>
+          </a:p>
+          <a:p>
+            <a:r>
+              <a:rPr lang="nl-BE" dirty="0"/>
+              <a:t>Toekomst: misschien DecaWave DWM1001, + kleiner, goedkoper, lichter</a:t>
+            </a:r>
+          </a:p>
+          <a:p>
+            <a:endParaRPr lang="nl-BE" dirty="0"/>
+          </a:p>
+          <a:p>
+            <a:r>
+              <a:rPr lang="nl-BE" dirty="0"/>
+              <a:t>Gewicht? Onze drone niet extreem belangrijk, maar uitbereiden naar kleinere drones wel.. </a:t>
+            </a:r>
+          </a:p>
+          <a:p>
+            <a:r>
+              <a:rPr lang="nl-BE" dirty="0"/>
+              <a:t>Stabiliteit, vliegtijd</a:t>
+            </a:r>
+          </a:p>
+          <a:p>
+            <a:endParaRPr lang="nl-BE" dirty="0"/>
+          </a:p>
+        </p:txBody>
+      </p:sp>
+      <p:sp>
+        <p:nvSpPr>
+          <p:cNvPr id="4" name="Tijdelijke aanduiding voor dianummer 3"/>
           <p:cNvSpPr>
             <a:spLocks noGrp="1"/>
           </p:cNvSpPr>
@@ -1019,7 +1476,7 @@
           <a:p>
             <a:fld id="{539A0A48-EDB1-4AFE-B1B7-10CE2A416496}" type="slidenum">
               <a:rPr lang="en-GB" smtClean="0"/>
-              <a:t>9</a:t>
+              <a:t>8</a:t>
             </a:fld>
             <a:endParaRPr lang="en-GB"/>
           </a:p>
@@ -1028,7 +1485,7 @@
     </p:spTree>
     <p:extLst>
       <p:ext uri="{BB962C8B-B14F-4D97-AF65-F5344CB8AC3E}">
-        <p14:creationId xmlns:p14="http://schemas.microsoft.com/office/powerpoint/2010/main" val="2596642095"/>
+        <p14:creationId xmlns:p14="http://schemas.microsoft.com/office/powerpoint/2010/main" val="2418677896"/>
       </p:ext>
     </p:extLst>
   </p:cSld>
@@ -1057,7 +1514,7 @@
       </p:grpSpPr>
       <p:sp>
         <p:nvSpPr>
-          <p:cNvPr id="2" name="Tijdelijke aanduiding voor dia-afbeelding 1"/>
+          <p:cNvPr id="2" name="Slide Image Placeholder 1"/>
           <p:cNvSpPr>
             <a:spLocks noGrp="1" noRot="1" noChangeAspect="1"/>
           </p:cNvSpPr>
@@ -1069,7 +1526,7 @@
       </p:sp>
       <p:sp>
         <p:nvSpPr>
-          <p:cNvPr id="3" name="Tijdelijke aanduiding voor notities 2"/>
+          <p:cNvPr id="3" name="Notes Placeholder 2"/>
           <p:cNvSpPr>
             <a:spLocks noGrp="1"/>
           </p:cNvSpPr>
@@ -1082,43 +1539,13 @@
           <a:bodyPr/>
           <a:lstStyle/>
           <a:p>
-            <a:r>
-              <a:rPr lang="nl-BE" dirty="0"/>
-              <a:t>Daarnet hebben we het reeds gehad over hardware die we gaan gebruiken om aan locatiebepaling te doen. Voor de exacte bepaling van de postitie gaan we als volgt te werk.</a:t>
-            </a:r>
-          </a:p>
-          <a:p>
-            <a:endParaRPr lang="nl-BE" dirty="0"/>
-          </a:p>
-          <a:p>
-            <a:r>
-              <a:rPr lang="nl-BE" dirty="0"/>
-              <a:t>De controller spreekt om de beurt de verschillende ankers aan, waardoor hij de afstand tot dat specifieke punt in de ruimte kent. De verwerking van deze data gaan we niet doen op de controller zelf, maar schuiven we door naar een MQTT server. Voor een ingewikkeld verhaal kort te maken. Dit protocol bestaat uit een Broker en Clients. Op de broker staan verschillende topics waar clients naar kunnen publishen of kunnen subscriben. In ons geval is het dan de bedoeling dat de drone zich eerst subscribed voor de position-topic. Daarna kan hij zijn afstanden tot de ranging-topic publishen. Daar worden dan de nodige berekeningen gedaan, een in het position-topic gezet. Iedereen, dus de drone, die gesubscriped heeft voor dit channel krijgt dan de locatie doorgestuurd. </a:t>
-            </a:r>
-          </a:p>
-          <a:p>
-            <a:endParaRPr lang="nl-BE" dirty="0"/>
-          </a:p>
-          <a:p>
-            <a:r>
-              <a:rPr lang="nl-BE" dirty="0"/>
-              <a:t>Een ander belangrijk aspect buiten nauwkeurigheid, is de snelheid. We gaan dus ook een algoritme moeten schrijven die bepaalt op welke ankers hij zich basseert. Het zou een beetje over-kill zijn als hij alle ankers in het volledige magazijn aanspreekt voor zijn locatie. Een mogelijke manier zou zijn dat we op voorhand bepalen dat hij gebruik maakt van het anker waar hij zicht het dichts bij bevind en 3 ankers die zich in de buurt bevinden.</a:t>
-            </a:r>
-          </a:p>
-          <a:p>
-            <a:endParaRPr lang="nl-BE" dirty="0"/>
-          </a:p>
-          <a:p>
-            <a:r>
-              <a:rPr lang="nl-BE" dirty="0"/>
-              <a:t>Nog een extra ontwerp die we in rekening moeten houden is dat de servers enkel 2D ondersteunen, wat dus niet voldoet voor een drone die op verschillende hoogtes kan vliegen. Gelukkig zit er in de drone een ultrasone sensor ingebouw die zijn hoogte kan bepalen. </a:t>
-            </a:r>
-          </a:p>
-        </p:txBody>
-      </p:sp>
-      <p:sp>
-        <p:nvSpPr>
-          <p:cNvPr id="4" name="Tijdelijke aanduiding voor dianummer 3"/>
+            <a:endParaRPr lang="en-GB"/>
+          </a:p>
+        </p:txBody>
+      </p:sp>
+      <p:sp>
+        <p:nvSpPr>
+          <p:cNvPr id="4" name="Slide Number Placeholder 3"/>
           <p:cNvSpPr>
             <a:spLocks noGrp="1"/>
           </p:cNvSpPr>
@@ -1133,7 +1560,7 @@
           <a:p>
             <a:fld id="{539A0A48-EDB1-4AFE-B1B7-10CE2A416496}" type="slidenum">
               <a:rPr lang="en-GB" smtClean="0"/>
-              <a:t>11</a:t>
+              <a:t>9</a:t>
             </a:fld>
             <a:endParaRPr lang="en-GB"/>
           </a:p>
@@ -1142,7 +1569,7 @@
     </p:spTree>
     <p:extLst>
       <p:ext uri="{BB962C8B-B14F-4D97-AF65-F5344CB8AC3E}">
-        <p14:creationId xmlns:p14="http://schemas.microsoft.com/office/powerpoint/2010/main" val="2054610554"/>
+        <p14:creationId xmlns:p14="http://schemas.microsoft.com/office/powerpoint/2010/main" val="2596642095"/>
       </p:ext>
     </p:extLst>
   </p:cSld>
@@ -1171,7 +1598,7 @@
       </p:grpSpPr>
       <p:sp>
         <p:nvSpPr>
-          <p:cNvPr id="2" name="Slide Image Placeholder 1"/>
+          <p:cNvPr id="2" name="Tijdelijke aanduiding voor dia-afbeelding 1"/>
           <p:cNvSpPr>
             <a:spLocks noGrp="1" noRot="1" noChangeAspect="1"/>
           </p:cNvSpPr>
@@ -1183,7 +1610,7 @@
       </p:sp>
       <p:sp>
         <p:nvSpPr>
-          <p:cNvPr id="3" name="Notes Placeholder 2"/>
+          <p:cNvPr id="3" name="Tijdelijke aanduiding voor notities 2"/>
           <p:cNvSpPr>
             <a:spLocks noGrp="1"/>
           </p:cNvSpPr>
@@ -1196,13 +1623,36 @@
           <a:bodyPr/>
           <a:lstStyle/>
           <a:p>
-            <a:endParaRPr lang="en-GB"/>
-          </a:p>
-        </p:txBody>
-      </p:sp>
-      <p:sp>
-        <p:nvSpPr>
-          <p:cNvPr id="4" name="Slide Number Placeholder 3"/>
+            <a:r>
+              <a:rPr lang="nl-BE" dirty="0"/>
+              <a:t>Bram:</a:t>
+            </a:r>
+          </a:p>
+          <a:p>
+            <a:r>
+              <a:rPr lang="nl-BE" dirty="0"/>
+              <a:t>Afstanden </a:t>
+            </a:r>
+            <a:r>
+              <a:rPr lang="nl-BE" dirty="0">
+                <a:sym typeface="Wingdings" pitchFamily="2" charset="2"/>
+              </a:rPr>
+              <a:t>naar positie</a:t>
+            </a:r>
+          </a:p>
+          <a:p>
+            <a:endParaRPr lang="nl-BE" dirty="0">
+              <a:sym typeface="Wingdings" pitchFamily="2" charset="2"/>
+            </a:endParaRPr>
+          </a:p>
+          <a:p>
+            <a:endParaRPr lang="nl-BE" dirty="0"/>
+          </a:p>
+        </p:txBody>
+      </p:sp>
+      <p:sp>
+        <p:nvSpPr>
+          <p:cNvPr id="4" name="Tijdelijke aanduiding voor dianummer 3"/>
           <p:cNvSpPr>
             <a:spLocks noGrp="1"/>
           </p:cNvSpPr>
@@ -1217,7 +1667,7 @@
           <a:p>
             <a:fld id="{539A0A48-EDB1-4AFE-B1B7-10CE2A416496}" type="slidenum">
               <a:rPr lang="en-GB" smtClean="0"/>
-              <a:t>12</a:t>
+              <a:t>10</a:t>
             </a:fld>
             <a:endParaRPr lang="en-GB"/>
           </a:p>
@@ -1226,7 +1676,180 @@
     </p:spTree>
     <p:extLst>
       <p:ext uri="{BB962C8B-B14F-4D97-AF65-F5344CB8AC3E}">
-        <p14:creationId xmlns:p14="http://schemas.microsoft.com/office/powerpoint/2010/main" val="3237113512"/>
+        <p14:creationId xmlns:p14="http://schemas.microsoft.com/office/powerpoint/2010/main" val="4015503791"/>
+      </p:ext>
+    </p:extLst>
+  </p:cSld>
+  <p:clrMapOvr>
+    <a:masterClrMapping/>
+  </p:clrMapOvr>
+</p:notes>
+</file>
+
+<file path=ppt/notesSlides/notesSlide9.xml><?xml version="1.0" encoding="utf-8"?>
+<p:notes xmlns:a="http://schemas.openxmlformats.org/drawingml/2006/main" xmlns:r="http://schemas.openxmlformats.org/officeDocument/2006/relationships" xmlns:p="http://schemas.openxmlformats.org/presentationml/2006/main">
+  <p:cSld>
+    <p:spTree>
+      <p:nvGrpSpPr>
+        <p:cNvPr id="1" name=""/>
+        <p:cNvGrpSpPr/>
+        <p:nvPr/>
+      </p:nvGrpSpPr>
+      <p:grpSpPr>
+        <a:xfrm>
+          <a:off x="0" y="0"/>
+          <a:ext cx="0" cy="0"/>
+          <a:chOff x="0" y="0"/>
+          <a:chExt cx="0" cy="0"/>
+        </a:xfrm>
+      </p:grpSpPr>
+      <p:sp>
+        <p:nvSpPr>
+          <p:cNvPr id="2" name="Tijdelijke aanduiding voor dia-afbeelding 1"/>
+          <p:cNvSpPr>
+            <a:spLocks noGrp="1" noRot="1" noChangeAspect="1"/>
+          </p:cNvSpPr>
+          <p:nvPr>
+            <p:ph type="sldImg"/>
+          </p:nvPr>
+        </p:nvSpPr>
+        <p:spPr/>
+      </p:sp>
+      <p:sp>
+        <p:nvSpPr>
+          <p:cNvPr id="3" name="Tijdelijke aanduiding voor notities 2"/>
+          <p:cNvSpPr>
+            <a:spLocks noGrp="1"/>
+          </p:cNvSpPr>
+          <p:nvPr>
+            <p:ph type="body" idx="1"/>
+          </p:nvPr>
+        </p:nvSpPr>
+        <p:spPr/>
+        <p:txBody>
+          <a:bodyPr/>
+          <a:lstStyle/>
+          <a:p>
+            <a:r>
+              <a:rPr lang="nl-BE" dirty="0"/>
+              <a:t>Afstanden komen binnen op Raspberry Pi</a:t>
+            </a:r>
+          </a:p>
+          <a:p>
+            <a:endParaRPr lang="nl-BE" dirty="0"/>
+          </a:p>
+          <a:p>
+            <a:r>
+              <a:rPr lang="nl-BE" dirty="0"/>
+              <a:t>Berekeningen verschuiven naar MQTT (=Message Queuing Telemetry Transport) server via wifi</a:t>
+            </a:r>
+          </a:p>
+          <a:p>
+            <a:endParaRPr lang="nl-BE" dirty="0"/>
+          </a:p>
+          <a:p>
+            <a:r>
+              <a:rPr lang="nl-BE" dirty="0"/>
+              <a:t>Wie? Broker </a:t>
+            </a:r>
+            <a:r>
+              <a:rPr lang="nl-BE" dirty="0">
+                <a:sym typeface="Wingdings" pitchFamily="2" charset="2"/>
+              </a:rPr>
+              <a:t> Clients</a:t>
+            </a:r>
+          </a:p>
+          <a:p>
+            <a:r>
+              <a:rPr lang="nl-BE" dirty="0">
+                <a:sym typeface="Wingdings" pitchFamily="2" charset="2"/>
+              </a:rPr>
+              <a:t>Methoden? Publish  Subscribe</a:t>
+            </a:r>
+          </a:p>
+          <a:p>
+            <a:r>
+              <a:rPr lang="nl-BE" dirty="0">
+                <a:sym typeface="Wingdings" pitchFamily="2" charset="2"/>
+              </a:rPr>
+              <a:t>Topics? Ranging  Position </a:t>
+            </a:r>
+          </a:p>
+          <a:p>
+            <a:endParaRPr lang="nl-BE" dirty="0">
+              <a:sym typeface="Wingdings" pitchFamily="2" charset="2"/>
+            </a:endParaRPr>
+          </a:p>
+          <a:p>
+            <a:r>
+              <a:rPr lang="nl-BE" dirty="0">
+                <a:sym typeface="Wingdings" pitchFamily="2" charset="2"/>
+              </a:rPr>
+              <a:t>Ander software matig concept m.b.t. Snelheid</a:t>
+            </a:r>
+          </a:p>
+          <a:p>
+            <a:r>
+              <a:rPr lang="nl-BE" dirty="0">
+                <a:sym typeface="Wingdings" pitchFamily="2" charset="2"/>
+              </a:rPr>
+              <a:t>Niet altijd alle ankers sturen, maar een selectie maken</a:t>
+            </a:r>
+          </a:p>
+          <a:p>
+            <a:endParaRPr lang="nl-BE" dirty="0">
+              <a:sym typeface="Wingdings" pitchFamily="2" charset="2"/>
+            </a:endParaRPr>
+          </a:p>
+          <a:p>
+            <a:r>
+              <a:rPr lang="nl-BE" dirty="0">
+                <a:sym typeface="Wingdings" pitchFamily="2" charset="2"/>
+              </a:rPr>
+              <a:t>Zijnoot: De server die we ter beschikking hebben werkt reeds in 2D, probleem</a:t>
+            </a:r>
+          </a:p>
+          <a:p>
+            <a:r>
+              <a:rPr lang="nl-BE" dirty="0">
+                <a:sym typeface="Wingdings" pitchFamily="2" charset="2"/>
+              </a:rPr>
+              <a:t>Oplossing: Ultrasone sensor op de drone voor de hoogte</a:t>
+            </a:r>
+            <a:endParaRPr lang="nl-BE" dirty="0"/>
+          </a:p>
+          <a:p>
+            <a:endParaRPr lang="nl-BE" dirty="0"/>
+          </a:p>
+        </p:txBody>
+      </p:sp>
+      <p:sp>
+        <p:nvSpPr>
+          <p:cNvPr id="4" name="Tijdelijke aanduiding voor dianummer 3"/>
+          <p:cNvSpPr>
+            <a:spLocks noGrp="1"/>
+          </p:cNvSpPr>
+          <p:nvPr>
+            <p:ph type="sldNum" sz="quarter" idx="10"/>
+          </p:nvPr>
+        </p:nvSpPr>
+        <p:spPr/>
+        <p:txBody>
+          <a:bodyPr/>
+          <a:lstStyle/>
+          <a:p>
+            <a:fld id="{539A0A48-EDB1-4AFE-B1B7-10CE2A416496}" type="slidenum">
+              <a:rPr lang="en-GB" smtClean="0"/>
+              <a:t>11</a:t>
+            </a:fld>
+            <a:endParaRPr lang="en-GB"/>
+          </a:p>
+        </p:txBody>
+      </p:sp>
+    </p:spTree>
+    <p:extLst>
+      <p:ext uri="{BB962C8B-B14F-4D97-AF65-F5344CB8AC3E}">
+        <p14:creationId xmlns:p14="http://schemas.microsoft.com/office/powerpoint/2010/main" val="2054610554"/>
       </p:ext>
     </p:extLst>
   </p:cSld>
@@ -4187,7 +4810,7 @@
           </p:nvPr>
         </p:nvPicPr>
         <p:blipFill>
-          <a:blip r:embed="rId2" cstate="print">
+          <a:blip r:embed="rId3" cstate="print">
             <a:clrChange>
               <a:clrFrom>
                 <a:srgbClr val="FFFFFF"/>
@@ -4230,7 +4853,7 @@
           <p:nvPr/>
         </p:nvPicPr>
         <p:blipFill>
-          <a:blip r:embed="rId3">
+          <a:blip r:embed="rId4">
             <a:clrChange>
               <a:clrFrom>
                 <a:srgbClr val="FFFFFF"/>
@@ -4276,11 +4899,11 @@
           <p:nvPr/>
         </p:nvPicPr>
         <p:blipFill>
-          <a:blip r:embed="rId4">
+          <a:blip r:embed="rId5">
             <a:extLst>
               <a:ext uri="{BEBA8EAE-BF5A-486C-A8C5-ECC9F3942E4B}">
                 <a14:imgProps xmlns:a14="http://schemas.microsoft.com/office/drawing/2010/main">
-                  <a14:imgLayer r:embed="rId5">
+                  <a14:imgLayer r:embed="rId6">
                     <a14:imgEffect>
                       <a14:backgroundRemoval t="5981" b="96890" l="4320" r="95680">
                         <a14:foregroundMark x1="9120" y1="39713" x2="9120" y2="39713"/>
@@ -4561,11 +5184,11 @@
           <p:nvPr/>
         </p:nvPicPr>
         <p:blipFill>
-          <a:blip r:embed="rId6">
+          <a:blip r:embed="rId7">
             <a:extLst>
               <a:ext uri="{BEBA8EAE-BF5A-486C-A8C5-ECC9F3942E4B}">
                 <a14:imgProps xmlns:a14="http://schemas.microsoft.com/office/drawing/2010/main">
-                  <a14:imgLayer r:embed="rId7">
+                  <a14:imgLayer r:embed="rId8">
                     <a14:imgEffect>
                       <a14:backgroundRemoval t="10000" b="90000" l="10000" r="90000"/>
                     </a14:imgEffect>
@@ -4648,11 +5271,11 @@
           <p:nvPr/>
         </p:nvPicPr>
         <p:blipFill>
-          <a:blip r:embed="rId8">
+          <a:blip r:embed="rId9">
             <a:extLst>
               <a:ext uri="{BEBA8EAE-BF5A-486C-A8C5-ECC9F3942E4B}">
                 <a14:imgProps xmlns:a14="http://schemas.microsoft.com/office/drawing/2010/main">
-                  <a14:imgLayer r:embed="rId9">
+                  <a14:imgLayer r:embed="rId10">
                     <a14:imgEffect>
                       <a14:backgroundRemoval t="10000" b="90000" l="4600" r="97400">
                         <a14:foregroundMark x1="94000" y1="54000" x2="94000" y2="54000"/>
@@ -4789,11 +5412,11 @@
           <p:nvPr/>
         </p:nvPicPr>
         <p:blipFill>
-          <a:blip r:embed="rId8">
+          <a:blip r:embed="rId9">
             <a:extLst>
               <a:ext uri="{BEBA8EAE-BF5A-486C-A8C5-ECC9F3942E4B}">
                 <a14:imgProps xmlns:a14="http://schemas.microsoft.com/office/drawing/2010/main">
-                  <a14:imgLayer r:embed="rId9">
+                  <a14:imgLayer r:embed="rId10">
                     <a14:imgEffect>
                       <a14:backgroundRemoval t="10000" b="90000" l="4600" r="97400">
                         <a14:foregroundMark x1="94000" y1="54000" x2="94000" y2="54000"/>
@@ -4843,11 +5466,11 @@
           <p:nvPr/>
         </p:nvPicPr>
         <p:blipFill>
-          <a:blip r:embed="rId8">
+          <a:blip r:embed="rId9">
             <a:extLst>
               <a:ext uri="{BEBA8EAE-BF5A-486C-A8C5-ECC9F3942E4B}">
                 <a14:imgProps xmlns:a14="http://schemas.microsoft.com/office/drawing/2010/main">
-                  <a14:imgLayer r:embed="rId9">
+                  <a14:imgLayer r:embed="rId10">
                     <a14:imgEffect>
                       <a14:backgroundRemoval t="10000" b="90000" l="4600" r="97400">
                         <a14:foregroundMark x1="94000" y1="54000" x2="94000" y2="54000"/>
@@ -4897,11 +5520,11 @@
           <p:nvPr/>
         </p:nvPicPr>
         <p:blipFill>
-          <a:blip r:embed="rId8">
+          <a:blip r:embed="rId9">
             <a:extLst>
               <a:ext uri="{BEBA8EAE-BF5A-486C-A8C5-ECC9F3942E4B}">
                 <a14:imgProps xmlns:a14="http://schemas.microsoft.com/office/drawing/2010/main">
-                  <a14:imgLayer r:embed="rId9">
+                  <a14:imgLayer r:embed="rId10">
                     <a14:imgEffect>
                       <a14:backgroundRemoval t="10000" b="90000" l="4600" r="97400">
                         <a14:foregroundMark x1="94000" y1="54000" x2="94000" y2="54000"/>
@@ -4936,46 +5559,6 @@
           </a:prstGeom>
         </p:spPr>
       </p:pic>
-      <p:sp>
-        <p:nvSpPr>
-          <p:cNvPr id="23" name="Rectangle 22">
-            <a:extLst>
-              <a:ext uri="{FF2B5EF4-FFF2-40B4-BE49-F238E27FC236}">
-                <a16:creationId xmlns:a16="http://schemas.microsoft.com/office/drawing/2014/main" id="{087B9FDB-6D44-4EEE-92DB-99DD78C92001}"/>
-              </a:ext>
-            </a:extLst>
-          </p:cNvPr>
-          <p:cNvSpPr/>
-          <p:nvPr/>
-        </p:nvSpPr>
-        <p:spPr>
-          <a:xfrm>
-            <a:off x="6057626" y="2150371"/>
-            <a:ext cx="902811" cy="561885"/>
-          </a:xfrm>
-          <a:prstGeom prst="rect">
-            <a:avLst/>
-          </a:prstGeom>
-        </p:spPr>
-        <p:txBody>
-          <a:bodyPr wrap="none">
-            <a:spAutoFit/>
-          </a:bodyPr>
-          <a:lstStyle/>
-          <a:p>
-            <a:pPr algn="ctr">
-              <a:lnSpc>
-                <a:spcPct val="120000"/>
-              </a:lnSpc>
-            </a:pPr>
-            <a:r>
-              <a:rPr lang="en-US" sz="2800" dirty="0" err="1"/>
-              <a:t>WiFi</a:t>
-            </a:r>
-            <a:endParaRPr lang="en-US" sz="2800" dirty="0"/>
-          </a:p>
-        </p:txBody>
-      </p:sp>
       <p:sp>
         <p:nvSpPr>
           <p:cNvPr id="26" name="Rectangle 25">
@@ -6175,12 +6758,12 @@
       </p:grpSpPr>
       <p:sp>
         <p:nvSpPr>
-          <p:cNvPr id="8" name="Titel 7"/>
+          <p:cNvPr id="2" name="Titel 1"/>
           <p:cNvSpPr>
             <a:spLocks noGrp="1"/>
           </p:cNvSpPr>
           <p:nvPr>
-            <p:ph type="ctrTitle"/>
+            <p:ph type="title"/>
           </p:nvPr>
         </p:nvSpPr>
         <p:spPr/>
@@ -6190,19 +6773,19 @@
           <a:p>
             <a:r>
               <a:rPr lang="nl-NL" dirty="0"/>
-              <a:t>planning</a:t>
-            </a:r>
-          </a:p>
-        </p:txBody>
-      </p:sp>
-      <p:sp>
-        <p:nvSpPr>
-          <p:cNvPr id="5" name="Slide Number Placeholder 4"/>
+              <a:t>Setup</a:t>
+            </a:r>
+          </a:p>
+        </p:txBody>
+      </p:sp>
+      <p:sp>
+        <p:nvSpPr>
+          <p:cNvPr id="4" name="Tijdelijke aanduiding voor dianummer 3"/>
           <p:cNvSpPr>
             <a:spLocks noGrp="1"/>
           </p:cNvSpPr>
           <p:nvPr>
-            <p:ph type="sldNum" sz="quarter" idx="4"/>
+            <p:ph type="sldNum" sz="quarter" idx="12"/>
           </p:nvPr>
         </p:nvSpPr>
         <p:spPr/>
@@ -6211,18 +6794,944 @@
           <a:lstStyle/>
           <a:p>
             <a:fld id="{7AE184E0-0BD4-4705-A12B-9B71DDE63301}" type="slidenum">
-              <a:rPr lang="nl-BE" smtClean="0"/>
-              <a:pPr/>
+              <a:rPr lang="nl-BE" noProof="0" smtClean="0"/>
               <a:t>12</a:t>
             </a:fld>
-            <a:endParaRPr lang="nl-BE" dirty="0"/>
+            <a:endParaRPr lang="nl-BE" noProof="0" dirty="0"/>
+          </a:p>
+        </p:txBody>
+      </p:sp>
+      <p:pic>
+        <p:nvPicPr>
+          <p:cNvPr id="5" name="Content Placeholder 5" descr="A picture containing black, cat, rowel&#10;&#10;Description generated with very high confidence">
+            <a:extLst>
+              <a:ext uri="{FF2B5EF4-FFF2-40B4-BE49-F238E27FC236}">
+                <a16:creationId xmlns:a16="http://schemas.microsoft.com/office/drawing/2014/main" id="{209815B5-D362-4E21-B105-90FB0738077B}"/>
+              </a:ext>
+            </a:extLst>
+          </p:cNvPr>
+          <p:cNvPicPr>
+            <a:picLocks noGrp="1" noChangeAspect="1"/>
+          </p:cNvPicPr>
+          <p:nvPr>
+            <p:ph idx="1"/>
+          </p:nvPr>
+        </p:nvPicPr>
+        <p:blipFill>
+          <a:blip r:embed="rId3" cstate="print">
+            <a:clrChange>
+              <a:clrFrom>
+                <a:srgbClr val="FFFFFF"/>
+              </a:clrFrom>
+              <a:clrTo>
+                <a:srgbClr val="FFFFFF">
+                  <a:alpha val="0"/>
+                </a:srgbClr>
+              </a:clrTo>
+            </a:clrChange>
+            <a:extLst>
+              <a:ext uri="{28A0092B-C50C-407E-A947-70E740481C1C}">
+                <a14:useLocalDpi xmlns:a14="http://schemas.microsoft.com/office/drawing/2010/main" val="0"/>
+              </a:ext>
+            </a:extLst>
+          </a:blip>
+          <a:stretch>
+            <a:fillRect/>
+          </a:stretch>
+        </p:blipFill>
+        <p:spPr>
+          <a:xfrm>
+            <a:off x="43955" y="1278990"/>
+            <a:ext cx="5752881" cy="2871674"/>
+          </a:xfrm>
+        </p:spPr>
+      </p:pic>
+      <p:pic>
+        <p:nvPicPr>
+          <p:cNvPr id="6" name="Content Placeholder 5" descr="A circuit board&#10;&#10;Description generated with very high confidence">
+            <a:extLst>
+              <a:ext uri="{FF2B5EF4-FFF2-40B4-BE49-F238E27FC236}">
+                <a16:creationId xmlns:a16="http://schemas.microsoft.com/office/drawing/2014/main" id="{5DC46D9F-5DB3-407F-B27A-199B3FE0352B}"/>
+              </a:ext>
+            </a:extLst>
+          </p:cNvPr>
+          <p:cNvPicPr>
+            <a:picLocks noChangeAspect="1"/>
+          </p:cNvPicPr>
+          <p:nvPr/>
+        </p:nvPicPr>
+        <p:blipFill>
+          <a:blip r:embed="rId4">
+            <a:clrChange>
+              <a:clrFrom>
+                <a:srgbClr val="FFFFFF"/>
+              </a:clrFrom>
+              <a:clrTo>
+                <a:srgbClr val="FFFFFF">
+                  <a:alpha val="0"/>
+                </a:srgbClr>
+              </a:clrTo>
+            </a:clrChange>
+            <a:extLst>
+              <a:ext uri="{28A0092B-C50C-407E-A947-70E740481C1C}">
+                <a14:useLocalDpi xmlns:a14="http://schemas.microsoft.com/office/drawing/2010/main" val="0"/>
+              </a:ext>
+            </a:extLst>
+          </a:blip>
+          <a:stretch>
+            <a:fillRect/>
+          </a:stretch>
+        </p:blipFill>
+        <p:spPr>
+          <a:xfrm>
+            <a:off x="6511265" y="1289833"/>
+            <a:ext cx="5040000" cy="5040000"/>
+          </a:xfrm>
+          <a:prstGeom prst="rect">
+            <a:avLst/>
+          </a:prstGeom>
+        </p:spPr>
+      </p:pic>
+      <p:pic>
+        <p:nvPicPr>
+          <p:cNvPr id="18" name="Picture 17" descr="A close up of a computer&#10;&#10;Description generated with very high confidence">
+            <a:extLst>
+              <a:ext uri="{FF2B5EF4-FFF2-40B4-BE49-F238E27FC236}">
+                <a16:creationId xmlns:a16="http://schemas.microsoft.com/office/drawing/2014/main" id="{E9750424-21F3-4252-B2D0-92619F4A0BAD}"/>
+              </a:ext>
+            </a:extLst>
+          </p:cNvPr>
+          <p:cNvPicPr>
+            <a:picLocks noChangeAspect="1"/>
+          </p:cNvPicPr>
+          <p:nvPr/>
+        </p:nvPicPr>
+        <p:blipFill>
+          <a:blip r:embed="rId5">
+            <a:extLst>
+              <a:ext uri="{BEBA8EAE-BF5A-486C-A8C5-ECC9F3942E4B}">
+                <a14:imgProps xmlns:a14="http://schemas.microsoft.com/office/drawing/2010/main">
+                  <a14:imgLayer r:embed="rId6">
+                    <a14:imgEffect>
+                      <a14:backgroundRemoval t="5981" b="96890" l="4320" r="95680">
+                        <a14:foregroundMark x1="9120" y1="39713" x2="9120" y2="39713"/>
+                        <a14:foregroundMark x1="10400" y1="67225" x2="4320" y2="40670"/>
+                        <a14:foregroundMark x1="4320" y1="40670" x2="10560" y2="30383"/>
+                        <a14:foregroundMark x1="10560" y1="30383" x2="16160" y2="28469"/>
+                        <a14:foregroundMark x1="81280" y1="97129" x2="79040" y2="97129"/>
+                        <a14:foregroundMark x1="81760" y1="6220" x2="81760" y2="6220"/>
+                        <a14:foregroundMark x1="53920" y1="7416" x2="53920" y2="7416"/>
+                        <a14:foregroundMark x1="44960" y1="7656" x2="44960" y2="7656"/>
+                        <a14:foregroundMark x1="40160" y1="12440" x2="48640" y2="9091"/>
+                        <a14:foregroundMark x1="48640" y1="9091" x2="48800" y2="9091"/>
+                        <a14:foregroundMark x1="63680" y1="8612" x2="85440" y2="4545"/>
+                        <a14:foregroundMark x1="85440" y1="4545" x2="91680" y2="15550"/>
+                        <a14:foregroundMark x1="91680" y1="15550" x2="95040" y2="88278"/>
+                        <a14:foregroundMark x1="96480" y1="3110" x2="99360" y2="26794"/>
+                        <a14:foregroundMark x1="99360" y1="26794" x2="95680" y2="85407"/>
+                        <a14:foregroundMark x1="95680" y1="85407" x2="85760" y2="82775"/>
+                        <a14:foregroundMark x1="85760" y1="82775" x2="85120" y2="67464"/>
+                        <a14:foregroundMark x1="85120" y1="67464" x2="93600" y2="21770"/>
+                        <a14:foregroundMark x1="93600" y1="21770" x2="89280" y2="10526"/>
+                        <a14:foregroundMark x1="89280" y1="10526" x2="89280" y2="10526"/>
+                      </a14:backgroundRemoval>
+                    </a14:imgEffect>
+                  </a14:imgLayer>
+                </a14:imgProps>
+              </a:ext>
+              <a:ext uri="{28A0092B-C50C-407E-A947-70E740481C1C}">
+                <a14:useLocalDpi xmlns:a14="http://schemas.microsoft.com/office/drawing/2010/main" val="0"/>
+              </a:ext>
+            </a:extLst>
+          </a:blip>
+          <a:stretch>
+            <a:fillRect/>
+          </a:stretch>
+        </p:blipFill>
+        <p:spPr>
+          <a:xfrm>
+            <a:off x="13010765" y="3432619"/>
+            <a:ext cx="4297497" cy="2881511"/>
+          </a:xfrm>
+          <a:prstGeom prst="rect">
+            <a:avLst/>
+          </a:prstGeom>
+        </p:spPr>
+      </p:pic>
+      <p:cxnSp>
+        <p:nvCxnSpPr>
+          <p:cNvPr id="7" name="Straight Connector 6">
+            <a:extLst>
+              <a:ext uri="{FF2B5EF4-FFF2-40B4-BE49-F238E27FC236}">
+                <a16:creationId xmlns:a16="http://schemas.microsoft.com/office/drawing/2014/main" id="{7C022078-64FB-4E01-B5F9-72AEBF028F24}"/>
+              </a:ext>
+            </a:extLst>
+          </p:cNvPr>
+          <p:cNvCxnSpPr/>
+          <p:nvPr/>
+        </p:nvCxnSpPr>
+        <p:spPr>
+          <a:xfrm>
+            <a:off x="5783656" y="2721429"/>
+            <a:ext cx="1440000" cy="0"/>
+          </a:xfrm>
+          <a:prstGeom prst="line">
+            <a:avLst/>
+          </a:prstGeom>
+          <a:ln w="28575">
+            <a:solidFill>
+              <a:srgbClr val="1E64C8"/>
+            </a:solidFill>
+            <a:prstDash val="solid"/>
+            <a:headEnd type="triangle" w="lg" len="lg"/>
+            <a:tailEnd type="triangle" w="lg" len="lg"/>
+          </a:ln>
+        </p:spPr>
+        <p:style>
+          <a:lnRef idx="3">
+            <a:schemeClr val="accent1"/>
+          </a:lnRef>
+          <a:fillRef idx="0">
+            <a:schemeClr val="accent1"/>
+          </a:fillRef>
+          <a:effectRef idx="2">
+            <a:schemeClr val="accent1"/>
+          </a:effectRef>
+          <a:fontRef idx="minor">
+            <a:schemeClr val="tx1"/>
+          </a:fontRef>
+        </p:style>
+      </p:cxnSp>
+      <p:cxnSp>
+        <p:nvCxnSpPr>
+          <p:cNvPr id="24" name="Straight Connector 23">
+            <a:extLst>
+              <a:ext uri="{FF2B5EF4-FFF2-40B4-BE49-F238E27FC236}">
+                <a16:creationId xmlns:a16="http://schemas.microsoft.com/office/drawing/2014/main" id="{A5ACC2CB-29EE-4B2E-8F9B-C4140FEBE798}"/>
+              </a:ext>
+            </a:extLst>
+          </p:cNvPr>
+          <p:cNvCxnSpPr>
+            <a:cxnSpLocks/>
+          </p:cNvCxnSpPr>
+          <p:nvPr/>
+        </p:nvCxnSpPr>
+        <p:spPr>
+          <a:xfrm>
+            <a:off x="5927656" y="6249410"/>
+            <a:ext cx="1296000" cy="432000"/>
+          </a:xfrm>
+          <a:prstGeom prst="line">
+            <a:avLst/>
+          </a:prstGeom>
+          <a:ln w="28575">
+            <a:solidFill>
+              <a:srgbClr val="1E64C8"/>
+            </a:solidFill>
+            <a:headEnd type="triangle" w="lg" len="lg"/>
+            <a:tailEnd type="triangle" w="lg" len="lg"/>
+          </a:ln>
+        </p:spPr>
+        <p:style>
+          <a:lnRef idx="3">
+            <a:schemeClr val="accent1"/>
+          </a:lnRef>
+          <a:fillRef idx="0">
+            <a:schemeClr val="accent1"/>
+          </a:fillRef>
+          <a:effectRef idx="2">
+            <a:schemeClr val="accent1"/>
+          </a:effectRef>
+          <a:fontRef idx="minor">
+            <a:schemeClr val="tx1"/>
+          </a:fontRef>
+        </p:style>
+      </p:cxnSp>
+      <p:cxnSp>
+        <p:nvCxnSpPr>
+          <p:cNvPr id="25" name="Straight Connector 24">
+            <a:extLst>
+              <a:ext uri="{FF2B5EF4-FFF2-40B4-BE49-F238E27FC236}">
+                <a16:creationId xmlns:a16="http://schemas.microsoft.com/office/drawing/2014/main" id="{DD833622-E1CB-4406-BC3B-BEC0EA9F358B}"/>
+              </a:ext>
+            </a:extLst>
+          </p:cNvPr>
+          <p:cNvCxnSpPr>
+            <a:cxnSpLocks/>
+          </p:cNvCxnSpPr>
+          <p:nvPr/>
+        </p:nvCxnSpPr>
+        <p:spPr>
+          <a:xfrm flipV="1">
+            <a:off x="5927656" y="8112638"/>
+            <a:ext cx="1296000" cy="432000"/>
+          </a:xfrm>
+          <a:prstGeom prst="line">
+            <a:avLst/>
+          </a:prstGeom>
+          <a:ln w="28575">
+            <a:solidFill>
+              <a:srgbClr val="1E64C8"/>
+            </a:solidFill>
+            <a:headEnd type="triangle" w="lg" len="lg"/>
+            <a:tailEnd type="triangle" w="lg" len="lg"/>
+          </a:ln>
+        </p:spPr>
+        <p:style>
+          <a:lnRef idx="3">
+            <a:schemeClr val="accent1"/>
+          </a:lnRef>
+          <a:fillRef idx="0">
+            <a:schemeClr val="accent1"/>
+          </a:fillRef>
+          <a:effectRef idx="2">
+            <a:schemeClr val="accent1"/>
+          </a:effectRef>
+          <a:fontRef idx="minor">
+            <a:schemeClr val="tx1"/>
+          </a:fontRef>
+        </p:style>
+      </p:cxnSp>
+      <p:cxnSp>
+        <p:nvCxnSpPr>
+          <p:cNvPr id="31" name="Straight Connector 30">
+            <a:extLst>
+              <a:ext uri="{FF2B5EF4-FFF2-40B4-BE49-F238E27FC236}">
+                <a16:creationId xmlns:a16="http://schemas.microsoft.com/office/drawing/2014/main" id="{42965CAB-4FC4-44FC-974F-2A001BFFDAC2}"/>
+              </a:ext>
+            </a:extLst>
+          </p:cNvPr>
+          <p:cNvCxnSpPr/>
+          <p:nvPr/>
+        </p:nvCxnSpPr>
+        <p:spPr>
+          <a:xfrm>
+            <a:off x="11553828" y="4874809"/>
+            <a:ext cx="1440000" cy="0"/>
+          </a:xfrm>
+          <a:prstGeom prst="line">
+            <a:avLst/>
+          </a:prstGeom>
+          <a:ln w="28575">
+            <a:solidFill>
+              <a:srgbClr val="1E64C8"/>
+            </a:solidFill>
+            <a:headEnd type="triangle" w="lg" len="lg"/>
+            <a:tailEnd type="triangle" w="lg" len="lg"/>
+          </a:ln>
+        </p:spPr>
+        <p:style>
+          <a:lnRef idx="3">
+            <a:schemeClr val="accent1"/>
+          </a:lnRef>
+          <a:fillRef idx="0">
+            <a:schemeClr val="accent1"/>
+          </a:fillRef>
+          <a:effectRef idx="2">
+            <a:schemeClr val="accent1"/>
+          </a:effectRef>
+          <a:fontRef idx="minor">
+            <a:schemeClr val="tx1"/>
+          </a:fontRef>
+        </p:style>
+      </p:cxnSp>
+      <p:cxnSp>
+        <p:nvCxnSpPr>
+          <p:cNvPr id="32" name="Straight Connector 31">
+            <a:extLst>
+              <a:ext uri="{FF2B5EF4-FFF2-40B4-BE49-F238E27FC236}">
+                <a16:creationId xmlns:a16="http://schemas.microsoft.com/office/drawing/2014/main" id="{6A385D8E-99CA-4AC3-915F-B7588F75E6E6}"/>
+              </a:ext>
+            </a:extLst>
+          </p:cNvPr>
+          <p:cNvCxnSpPr>
+            <a:cxnSpLocks/>
+          </p:cNvCxnSpPr>
+          <p:nvPr/>
+        </p:nvCxnSpPr>
+        <p:spPr>
+          <a:xfrm>
+            <a:off x="7948150" y="4876800"/>
+            <a:ext cx="0" cy="1440000"/>
+          </a:xfrm>
+          <a:prstGeom prst="line">
+            <a:avLst/>
+          </a:prstGeom>
+          <a:ln w="28575">
+            <a:headEnd type="triangle" w="lg" len="lg"/>
+            <a:tailEnd type="triangle" w="lg" len="lg"/>
+          </a:ln>
+        </p:spPr>
+        <p:style>
+          <a:lnRef idx="3">
+            <a:schemeClr val="accent2"/>
+          </a:lnRef>
+          <a:fillRef idx="0">
+            <a:schemeClr val="accent2"/>
+          </a:fillRef>
+          <a:effectRef idx="2">
+            <a:schemeClr val="accent2"/>
+          </a:effectRef>
+          <a:fontRef idx="minor">
+            <a:schemeClr val="tx1"/>
+          </a:fontRef>
+        </p:style>
+      </p:cxnSp>
+      <p:pic>
+        <p:nvPicPr>
+          <p:cNvPr id="36" name="Content Placeholder 8" descr="A close up of a device&#10;&#10;Description generated with high confidence">
+            <a:extLst>
+              <a:ext uri="{FF2B5EF4-FFF2-40B4-BE49-F238E27FC236}">
+                <a16:creationId xmlns:a16="http://schemas.microsoft.com/office/drawing/2014/main" id="{4DCA515B-FF18-4773-879C-D0DA14287EA4}"/>
+              </a:ext>
+            </a:extLst>
+          </p:cNvPr>
+          <p:cNvPicPr>
+            <a:picLocks noChangeAspect="1"/>
+          </p:cNvPicPr>
+          <p:nvPr/>
+        </p:nvPicPr>
+        <p:blipFill>
+          <a:blip r:embed="rId7">
+            <a:extLst>
+              <a:ext uri="{BEBA8EAE-BF5A-486C-A8C5-ECC9F3942E4B}">
+                <a14:imgProps xmlns:a14="http://schemas.microsoft.com/office/drawing/2010/main">
+                  <a14:imgLayer r:embed="rId8">
+                    <a14:imgEffect>
+                      <a14:backgroundRemoval t="10000" b="90000" l="10000" r="90000"/>
+                    </a14:imgEffect>
+                  </a14:imgLayer>
+                </a14:imgProps>
+              </a:ext>
+              <a:ext uri="{28A0092B-C50C-407E-A947-70E740481C1C}">
+                <a14:useLocalDpi xmlns:a14="http://schemas.microsoft.com/office/drawing/2010/main" val="0"/>
+              </a:ext>
+            </a:extLst>
+          </a:blip>
+          <a:stretch>
+            <a:fillRect/>
+          </a:stretch>
+        </p:blipFill>
+        <p:spPr>
+          <a:xfrm>
+            <a:off x="8981084" y="0"/>
+            <a:ext cx="2281867" cy="2002972"/>
+          </a:xfrm>
+          <a:prstGeom prst="rect">
+            <a:avLst/>
+          </a:prstGeom>
+        </p:spPr>
+      </p:pic>
+      <p:cxnSp>
+        <p:nvCxnSpPr>
+          <p:cNvPr id="37" name="Straight Connector 36">
+            <a:extLst>
+              <a:ext uri="{FF2B5EF4-FFF2-40B4-BE49-F238E27FC236}">
+                <a16:creationId xmlns:a16="http://schemas.microsoft.com/office/drawing/2014/main" id="{7A9CC6C6-26AC-4C9B-963B-9C13D9697B44}"/>
+              </a:ext>
+            </a:extLst>
+          </p:cNvPr>
+          <p:cNvCxnSpPr>
+            <a:cxnSpLocks/>
+          </p:cNvCxnSpPr>
+          <p:nvPr/>
+        </p:nvCxnSpPr>
+        <p:spPr>
+          <a:xfrm>
+            <a:off x="10115019" y="2002972"/>
+            <a:ext cx="0" cy="1436914"/>
+          </a:xfrm>
+          <a:prstGeom prst="line">
+            <a:avLst/>
+          </a:prstGeom>
+          <a:ln w="28575">
+            <a:headEnd type="triangle" w="lg" len="lg"/>
+            <a:tailEnd type="triangle" w="lg" len="lg"/>
+          </a:ln>
+        </p:spPr>
+        <p:style>
+          <a:lnRef idx="3">
+            <a:schemeClr val="accent2"/>
+          </a:lnRef>
+          <a:fillRef idx="0">
+            <a:schemeClr val="accent2"/>
+          </a:fillRef>
+          <a:effectRef idx="2">
+            <a:schemeClr val="accent2"/>
+          </a:effectRef>
+          <a:fontRef idx="minor">
+            <a:schemeClr val="tx1"/>
+          </a:fontRef>
+        </p:style>
+      </p:cxnSp>
+      <p:pic>
+        <p:nvPicPr>
+          <p:cNvPr id="33" name="Content Placeholder 5" descr="A circuit board&#10;&#10;Description generated with very high confidence">
+            <a:extLst>
+              <a:ext uri="{FF2B5EF4-FFF2-40B4-BE49-F238E27FC236}">
+                <a16:creationId xmlns:a16="http://schemas.microsoft.com/office/drawing/2014/main" id="{5E97ED60-7D5C-412E-BD73-CA59674ADA15}"/>
+              </a:ext>
+            </a:extLst>
+          </p:cNvPr>
+          <p:cNvPicPr>
+            <a:picLocks noChangeAspect="1"/>
+          </p:cNvPicPr>
+          <p:nvPr/>
+        </p:nvPicPr>
+        <p:blipFill>
+          <a:blip r:embed="rId9">
+            <a:extLst>
+              <a:ext uri="{BEBA8EAE-BF5A-486C-A8C5-ECC9F3942E4B}">
+                <a14:imgProps xmlns:a14="http://schemas.microsoft.com/office/drawing/2010/main">
+                  <a14:imgLayer r:embed="rId10">
+                    <a14:imgEffect>
+                      <a14:backgroundRemoval t="10000" b="90000" l="4600" r="97400">
+                        <a14:foregroundMark x1="94000" y1="54000" x2="94000" y2="54000"/>
+                        <a14:foregroundMark x1="97400" y1="54000" x2="97400" y2="54000"/>
+                        <a14:foregroundMark x1="8600" y1="28000" x2="8600" y2="28000"/>
+                        <a14:foregroundMark x1="4600" y1="40400" x2="4600" y2="40400"/>
+                        <a14:foregroundMark x1="30600" y1="80400" x2="23800" y2="76600"/>
+                        <a14:foregroundMark x1="23800" y1="76600" x2="21600" y2="69200"/>
+                        <a14:foregroundMark x1="21600" y1="69200" x2="21600" y2="68000"/>
+                        <a14:foregroundMark x1="30200" y1="84400" x2="27600" y2="82000"/>
+                      </a14:backgroundRemoval>
+                    </a14:imgEffect>
+                  </a14:imgLayer>
+                </a14:imgProps>
+              </a:ext>
+              <a:ext uri="{28A0092B-C50C-407E-A947-70E740481C1C}">
+                <a14:useLocalDpi xmlns:a14="http://schemas.microsoft.com/office/drawing/2010/main" val="0"/>
+              </a:ext>
+            </a:extLst>
+          </a:blip>
+          <a:stretch>
+            <a:fillRect/>
+          </a:stretch>
+        </p:blipFill>
+        <p:spPr>
+          <a:xfrm flipH="1">
+            <a:off x="3628884" y="4893733"/>
+            <a:ext cx="2154772" cy="2154771"/>
+          </a:xfrm>
+          <a:prstGeom prst="rect">
+            <a:avLst/>
+          </a:prstGeom>
+        </p:spPr>
+      </p:pic>
+      <p:cxnSp>
+        <p:nvCxnSpPr>
+          <p:cNvPr id="40" name="Straight Connector 39">
+            <a:extLst>
+              <a:ext uri="{FF2B5EF4-FFF2-40B4-BE49-F238E27FC236}">
+                <a16:creationId xmlns:a16="http://schemas.microsoft.com/office/drawing/2014/main" id="{3502DCF6-F5E2-4DE3-9B56-35798FF187D8}"/>
+              </a:ext>
+            </a:extLst>
+          </p:cNvPr>
+          <p:cNvCxnSpPr>
+            <a:cxnSpLocks/>
+          </p:cNvCxnSpPr>
+          <p:nvPr/>
+        </p:nvCxnSpPr>
+        <p:spPr>
+          <a:xfrm>
+            <a:off x="5783656" y="7397024"/>
+            <a:ext cx="1440000" cy="1"/>
+          </a:xfrm>
+          <a:prstGeom prst="line">
+            <a:avLst/>
+          </a:prstGeom>
+          <a:ln w="28575">
+            <a:solidFill>
+              <a:srgbClr val="1E64C8"/>
+            </a:solidFill>
+            <a:headEnd type="triangle" w="lg" len="lg"/>
+            <a:tailEnd type="triangle" w="lg" len="lg"/>
+          </a:ln>
+        </p:spPr>
+        <p:style>
+          <a:lnRef idx="3">
+            <a:schemeClr val="accent1"/>
+          </a:lnRef>
+          <a:fillRef idx="0">
+            <a:schemeClr val="accent1"/>
+          </a:fillRef>
+          <a:effectRef idx="2">
+            <a:schemeClr val="accent1"/>
+          </a:effectRef>
+          <a:fontRef idx="minor">
+            <a:schemeClr val="tx1"/>
+          </a:fontRef>
+        </p:style>
+      </p:cxnSp>
+      <p:cxnSp>
+        <p:nvCxnSpPr>
+          <p:cNvPr id="41" name="Straight Connector 40">
+            <a:extLst>
+              <a:ext uri="{FF2B5EF4-FFF2-40B4-BE49-F238E27FC236}">
+                <a16:creationId xmlns:a16="http://schemas.microsoft.com/office/drawing/2014/main" id="{646C3ECD-1E1B-4EA5-888B-0E5F68D9A070}"/>
+              </a:ext>
+            </a:extLst>
+          </p:cNvPr>
+          <p:cNvCxnSpPr>
+            <a:cxnSpLocks/>
+          </p:cNvCxnSpPr>
+          <p:nvPr/>
+        </p:nvCxnSpPr>
+        <p:spPr>
+          <a:xfrm>
+            <a:off x="8310100" y="4876800"/>
+            <a:ext cx="0" cy="1440000"/>
+          </a:xfrm>
+          <a:prstGeom prst="line">
+            <a:avLst/>
+          </a:prstGeom>
+          <a:ln w="28575">
+            <a:headEnd type="triangle" w="lg" len="lg"/>
+            <a:tailEnd type="triangle" w="lg" len="lg"/>
+          </a:ln>
+        </p:spPr>
+        <p:style>
+          <a:lnRef idx="3">
+            <a:schemeClr val="accent2"/>
+          </a:lnRef>
+          <a:fillRef idx="0">
+            <a:schemeClr val="accent2"/>
+          </a:fillRef>
+          <a:effectRef idx="2">
+            <a:schemeClr val="accent2"/>
+          </a:effectRef>
+          <a:fontRef idx="minor">
+            <a:schemeClr val="tx1"/>
+          </a:fontRef>
+        </p:style>
+      </p:cxnSp>
+      <p:pic>
+        <p:nvPicPr>
+          <p:cNvPr id="21" name="Content Placeholder 5" descr="A circuit board&#10;&#10;Description generated with very high confidence">
+            <a:extLst>
+              <a:ext uri="{FF2B5EF4-FFF2-40B4-BE49-F238E27FC236}">
+                <a16:creationId xmlns:a16="http://schemas.microsoft.com/office/drawing/2014/main" id="{6D79CF16-C9A0-4673-AA2E-348378FF8194}"/>
+              </a:ext>
+            </a:extLst>
+          </p:cNvPr>
+          <p:cNvPicPr>
+            <a:picLocks noChangeAspect="1"/>
+          </p:cNvPicPr>
+          <p:nvPr/>
+        </p:nvPicPr>
+        <p:blipFill>
+          <a:blip r:embed="rId9">
+            <a:extLst>
+              <a:ext uri="{BEBA8EAE-BF5A-486C-A8C5-ECC9F3942E4B}">
+                <a14:imgProps xmlns:a14="http://schemas.microsoft.com/office/drawing/2010/main">
+                  <a14:imgLayer r:embed="rId10">
+                    <a14:imgEffect>
+                      <a14:backgroundRemoval t="10000" b="90000" l="4600" r="97400">
+                        <a14:foregroundMark x1="94000" y1="54000" x2="94000" y2="54000"/>
+                        <a14:foregroundMark x1="97400" y1="54000" x2="97400" y2="54000"/>
+                        <a14:foregroundMark x1="8600" y1="28000" x2="8600" y2="28000"/>
+                        <a14:foregroundMark x1="4600" y1="40400" x2="4600" y2="40400"/>
+                        <a14:foregroundMark x1="30600" y1="80400" x2="23800" y2="76600"/>
+                        <a14:foregroundMark x1="23800" y1="76600" x2="21600" y2="69200"/>
+                        <a14:foregroundMark x1="21600" y1="69200" x2="21600" y2="68000"/>
+                        <a14:foregroundMark x1="30200" y1="84400" x2="27600" y2="82000"/>
+                      </a14:backgroundRemoval>
+                    </a14:imgEffect>
+                  </a14:imgLayer>
+                </a14:imgProps>
+              </a:ext>
+              <a:ext uri="{28A0092B-C50C-407E-A947-70E740481C1C}">
+                <a14:useLocalDpi xmlns:a14="http://schemas.microsoft.com/office/drawing/2010/main" val="0"/>
+              </a:ext>
+            </a:extLst>
+          </a:blip>
+          <a:stretch>
+            <a:fillRect/>
+          </a:stretch>
+        </p:blipFill>
+        <p:spPr>
+          <a:xfrm flipH="1">
+            <a:off x="7223655" y="6334075"/>
+            <a:ext cx="2890416" cy="2856553"/>
+          </a:xfrm>
+          <a:prstGeom prst="rect">
+            <a:avLst/>
+          </a:prstGeom>
+        </p:spPr>
+      </p:pic>
+      <p:pic>
+        <p:nvPicPr>
+          <p:cNvPr id="20" name="Content Placeholder 5" descr="A circuit board&#10;&#10;Description generated with very high confidence">
+            <a:extLst>
+              <a:ext uri="{FF2B5EF4-FFF2-40B4-BE49-F238E27FC236}">
+                <a16:creationId xmlns:a16="http://schemas.microsoft.com/office/drawing/2014/main" id="{8DE2BD19-D59F-4A31-92EF-1B0D9E9D0FDB}"/>
+              </a:ext>
+            </a:extLst>
+          </p:cNvPr>
+          <p:cNvPicPr>
+            <a:picLocks noChangeAspect="1"/>
+          </p:cNvPicPr>
+          <p:nvPr/>
+        </p:nvPicPr>
+        <p:blipFill>
+          <a:blip r:embed="rId9">
+            <a:extLst>
+              <a:ext uri="{BEBA8EAE-BF5A-486C-A8C5-ECC9F3942E4B}">
+                <a14:imgProps xmlns:a14="http://schemas.microsoft.com/office/drawing/2010/main">
+                  <a14:imgLayer r:embed="rId10">
+                    <a14:imgEffect>
+                      <a14:backgroundRemoval t="10000" b="90000" l="4600" r="97400">
+                        <a14:foregroundMark x1="94000" y1="54000" x2="94000" y2="54000"/>
+                        <a14:foregroundMark x1="97400" y1="54000" x2="97400" y2="54000"/>
+                        <a14:foregroundMark x1="8600" y1="28000" x2="8600" y2="28000"/>
+                        <a14:foregroundMark x1="4600" y1="40400" x2="4600" y2="40400"/>
+                        <a14:foregroundMark x1="30600" y1="80400" x2="23800" y2="76600"/>
+                        <a14:foregroundMark x1="23800" y1="76600" x2="21600" y2="69200"/>
+                        <a14:foregroundMark x1="21600" y1="69200" x2="21600" y2="68000"/>
+                        <a14:foregroundMark x1="30200" y1="84400" x2="27600" y2="82000"/>
+                      </a14:backgroundRemoval>
+                    </a14:imgEffect>
+                  </a14:imgLayer>
+                </a14:imgProps>
+              </a:ext>
+              <a:ext uri="{28A0092B-C50C-407E-A947-70E740481C1C}">
+                <a14:useLocalDpi xmlns:a14="http://schemas.microsoft.com/office/drawing/2010/main" val="0"/>
+              </a:ext>
+            </a:extLst>
+          </a:blip>
+          <a:stretch>
+            <a:fillRect/>
+          </a:stretch>
+        </p:blipFill>
+        <p:spPr>
+          <a:xfrm flipH="1">
+            <a:off x="3641549" y="6333733"/>
+            <a:ext cx="2154772" cy="2154771"/>
+          </a:xfrm>
+          <a:prstGeom prst="rect">
+            <a:avLst/>
+          </a:prstGeom>
+        </p:spPr>
+      </p:pic>
+      <p:pic>
+        <p:nvPicPr>
+          <p:cNvPr id="22" name="Content Placeholder 5" descr="A circuit board&#10;&#10;Description generated with very high confidence">
+            <a:extLst>
+              <a:ext uri="{FF2B5EF4-FFF2-40B4-BE49-F238E27FC236}">
+                <a16:creationId xmlns:a16="http://schemas.microsoft.com/office/drawing/2014/main" id="{ADF143CE-9778-400F-8F41-742E440E5FBF}"/>
+              </a:ext>
+            </a:extLst>
+          </p:cNvPr>
+          <p:cNvPicPr>
+            <a:picLocks noChangeAspect="1"/>
+          </p:cNvPicPr>
+          <p:nvPr/>
+        </p:nvPicPr>
+        <p:blipFill>
+          <a:blip r:embed="rId9">
+            <a:extLst>
+              <a:ext uri="{BEBA8EAE-BF5A-486C-A8C5-ECC9F3942E4B}">
+                <a14:imgProps xmlns:a14="http://schemas.microsoft.com/office/drawing/2010/main">
+                  <a14:imgLayer r:embed="rId10">
+                    <a14:imgEffect>
+                      <a14:backgroundRemoval t="10000" b="90000" l="4600" r="97400">
+                        <a14:foregroundMark x1="94000" y1="54000" x2="94000" y2="54000"/>
+                        <a14:foregroundMark x1="97400" y1="54000" x2="97400" y2="54000"/>
+                        <a14:foregroundMark x1="8600" y1="28000" x2="8600" y2="28000"/>
+                        <a14:foregroundMark x1="4600" y1="40400" x2="4600" y2="40400"/>
+                        <a14:foregroundMark x1="30600" y1="80400" x2="23800" y2="76600"/>
+                        <a14:foregroundMark x1="23800" y1="76600" x2="21600" y2="69200"/>
+                        <a14:foregroundMark x1="21600" y1="69200" x2="21600" y2="68000"/>
+                        <a14:foregroundMark x1="30200" y1="84400" x2="27600" y2="82000"/>
+                      </a14:backgroundRemoval>
+                    </a14:imgEffect>
+                  </a14:imgLayer>
+                </a14:imgProps>
+              </a:ext>
+              <a:ext uri="{28A0092B-C50C-407E-A947-70E740481C1C}">
+                <a14:useLocalDpi xmlns:a14="http://schemas.microsoft.com/office/drawing/2010/main" val="0"/>
+              </a:ext>
+            </a:extLst>
+          </a:blip>
+          <a:stretch>
+            <a:fillRect/>
+          </a:stretch>
+        </p:blipFill>
+        <p:spPr>
+          <a:xfrm flipH="1">
+            <a:off x="3628884" y="7764118"/>
+            <a:ext cx="2154772" cy="2154771"/>
+          </a:xfrm>
+          <a:prstGeom prst="rect">
+            <a:avLst/>
+          </a:prstGeom>
+        </p:spPr>
+      </p:pic>
+      <p:sp>
+        <p:nvSpPr>
+          <p:cNvPr id="23" name="Rectangle 22">
+            <a:extLst>
+              <a:ext uri="{FF2B5EF4-FFF2-40B4-BE49-F238E27FC236}">
+                <a16:creationId xmlns:a16="http://schemas.microsoft.com/office/drawing/2014/main" id="{087B9FDB-6D44-4EEE-92DB-99DD78C92001}"/>
+              </a:ext>
+            </a:extLst>
+          </p:cNvPr>
+          <p:cNvSpPr/>
+          <p:nvPr/>
+        </p:nvSpPr>
+        <p:spPr>
+          <a:xfrm>
+            <a:off x="6057626" y="2150371"/>
+            <a:ext cx="902811" cy="561885"/>
+          </a:xfrm>
+          <a:prstGeom prst="rect">
+            <a:avLst/>
+          </a:prstGeom>
+        </p:spPr>
+        <p:txBody>
+          <a:bodyPr wrap="none">
+            <a:spAutoFit/>
+          </a:bodyPr>
+          <a:lstStyle/>
+          <a:p>
+            <a:pPr algn="ctr">
+              <a:lnSpc>
+                <a:spcPct val="120000"/>
+              </a:lnSpc>
+            </a:pPr>
+            <a:r>
+              <a:rPr lang="en-US" sz="2800" dirty="0" err="1"/>
+              <a:t>WiFi</a:t>
+            </a:r>
+            <a:endParaRPr lang="en-US" sz="2800" dirty="0"/>
+          </a:p>
+        </p:txBody>
+      </p:sp>
+      <p:sp>
+        <p:nvSpPr>
+          <p:cNvPr id="26" name="Rectangle 25">
+            <a:extLst>
+              <a:ext uri="{FF2B5EF4-FFF2-40B4-BE49-F238E27FC236}">
+                <a16:creationId xmlns:a16="http://schemas.microsoft.com/office/drawing/2014/main" id="{B98378B0-F384-4BE8-9145-430E57DE03D7}"/>
+              </a:ext>
+            </a:extLst>
+          </p:cNvPr>
+          <p:cNvSpPr/>
+          <p:nvPr/>
+        </p:nvSpPr>
+        <p:spPr>
+          <a:xfrm>
+            <a:off x="11829609" y="4303751"/>
+            <a:ext cx="902811" cy="561885"/>
+          </a:xfrm>
+          <a:prstGeom prst="rect">
+            <a:avLst/>
+          </a:prstGeom>
+        </p:spPr>
+        <p:txBody>
+          <a:bodyPr wrap="none">
+            <a:spAutoFit/>
+          </a:bodyPr>
+          <a:lstStyle/>
+          <a:p>
+            <a:pPr algn="ctr">
+              <a:lnSpc>
+                <a:spcPct val="120000"/>
+              </a:lnSpc>
+            </a:pPr>
+            <a:r>
+              <a:rPr lang="en-US" sz="2800" dirty="0" err="1"/>
+              <a:t>WiFi</a:t>
+            </a:r>
+            <a:endParaRPr lang="en-US" sz="2800" dirty="0"/>
+          </a:p>
+        </p:txBody>
+      </p:sp>
+      <p:sp>
+        <p:nvSpPr>
+          <p:cNvPr id="27" name="TextBox 26">
+            <a:extLst>
+              <a:ext uri="{FF2B5EF4-FFF2-40B4-BE49-F238E27FC236}">
+                <a16:creationId xmlns:a16="http://schemas.microsoft.com/office/drawing/2014/main" id="{069F82B7-3555-4F6A-ABB5-38813CE5FC85}"/>
+              </a:ext>
+            </a:extLst>
+          </p:cNvPr>
+          <p:cNvSpPr txBox="1"/>
+          <p:nvPr/>
+        </p:nvSpPr>
+        <p:spPr>
+          <a:xfrm>
+            <a:off x="6036723" y="6843026"/>
+            <a:ext cx="923714" cy="553998"/>
+          </a:xfrm>
+          <a:prstGeom prst="rect">
+            <a:avLst/>
+          </a:prstGeom>
+          <a:noFill/>
+        </p:spPr>
+        <p:txBody>
+          <a:bodyPr wrap="square" rtlCol="0">
+            <a:spAutoFit/>
+          </a:bodyPr>
+          <a:lstStyle/>
+          <a:p>
+            <a:pPr algn="ctr">
+              <a:lnSpc>
+                <a:spcPct val="120000"/>
+              </a:lnSpc>
+            </a:pPr>
+            <a:r>
+              <a:rPr lang="en-US" sz="2500" dirty="0" err="1"/>
+              <a:t>UWB</a:t>
+            </a:r>
+            <a:endParaRPr lang="en-US" sz="2500" dirty="0"/>
+          </a:p>
+        </p:txBody>
+      </p:sp>
+      <p:sp>
+        <p:nvSpPr>
+          <p:cNvPr id="28" name="TextBox 27">
+            <a:extLst>
+              <a:ext uri="{FF2B5EF4-FFF2-40B4-BE49-F238E27FC236}">
+                <a16:creationId xmlns:a16="http://schemas.microsoft.com/office/drawing/2014/main" id="{1FE4C8C7-54FF-458B-98C0-1F9EBCC334C8}"/>
+              </a:ext>
+            </a:extLst>
+          </p:cNvPr>
+          <p:cNvSpPr txBox="1"/>
+          <p:nvPr/>
+        </p:nvSpPr>
+        <p:spPr>
+          <a:xfrm>
+            <a:off x="7095066" y="5283287"/>
+            <a:ext cx="856655" cy="552868"/>
+          </a:xfrm>
+          <a:prstGeom prst="rect">
+            <a:avLst/>
+          </a:prstGeom>
+          <a:noFill/>
+        </p:spPr>
+        <p:txBody>
+          <a:bodyPr wrap="square" rtlCol="0">
+            <a:spAutoFit/>
+          </a:bodyPr>
+          <a:lstStyle/>
+          <a:p>
+            <a:pPr algn="ctr">
+              <a:lnSpc>
+                <a:spcPct val="120000"/>
+              </a:lnSpc>
+            </a:pPr>
+            <a:r>
+              <a:rPr lang="en-US" sz="2500" dirty="0"/>
+              <a:t>USB</a:t>
+            </a:r>
           </a:p>
         </p:txBody>
       </p:sp>
     </p:spTree>
     <p:extLst>
       <p:ext uri="{BB962C8B-B14F-4D97-AF65-F5344CB8AC3E}">
-        <p14:creationId xmlns:p14="http://schemas.microsoft.com/office/powerpoint/2010/main" val="3761811934"/>
+        <p14:creationId xmlns:p14="http://schemas.microsoft.com/office/powerpoint/2010/main" val="1912169220"/>
       </p:ext>
     </p:extLst>
   </p:cSld>
@@ -6251,12 +7760,12 @@
       </p:grpSpPr>
       <p:sp>
         <p:nvSpPr>
-          <p:cNvPr id="2" name="Titel 1"/>
+          <p:cNvPr id="8" name="Titel 7"/>
           <p:cNvSpPr>
             <a:spLocks noGrp="1"/>
           </p:cNvSpPr>
           <p:nvPr>
-            <p:ph type="title"/>
+            <p:ph type="ctrTitle"/>
           </p:nvPr>
         </p:nvSpPr>
         <p:spPr/>
@@ -6266,19 +7775,19 @@
           <a:p>
             <a:r>
               <a:rPr lang="nl-NL" dirty="0"/>
-              <a:t>Initiële planning</a:t>
-            </a:r>
-          </a:p>
-        </p:txBody>
-      </p:sp>
-      <p:sp>
-        <p:nvSpPr>
-          <p:cNvPr id="4" name="Tijdelijke aanduiding voor dianummer 3"/>
+              <a:t>planning</a:t>
+            </a:r>
+          </a:p>
+        </p:txBody>
+      </p:sp>
+      <p:sp>
+        <p:nvSpPr>
+          <p:cNvPr id="5" name="Slide Number Placeholder 4"/>
           <p:cNvSpPr>
             <a:spLocks noGrp="1"/>
           </p:cNvSpPr>
           <p:nvPr>
-            <p:ph type="sldNum" sz="quarter" idx="12"/>
+            <p:ph type="sldNum" sz="quarter" idx="4"/>
           </p:nvPr>
         </p:nvSpPr>
         <p:spPr/>
@@ -6287,8 +7796,84 @@
           <a:lstStyle/>
           <a:p>
             <a:fld id="{7AE184E0-0BD4-4705-A12B-9B71DDE63301}" type="slidenum">
+              <a:rPr lang="nl-BE" smtClean="0"/>
+              <a:pPr/>
+              <a:t>13</a:t>
+            </a:fld>
+            <a:endParaRPr lang="nl-BE" dirty="0"/>
+          </a:p>
+        </p:txBody>
+      </p:sp>
+    </p:spTree>
+    <p:extLst>
+      <p:ext uri="{BB962C8B-B14F-4D97-AF65-F5344CB8AC3E}">
+        <p14:creationId xmlns:p14="http://schemas.microsoft.com/office/powerpoint/2010/main" val="3761811934"/>
+      </p:ext>
+    </p:extLst>
+  </p:cSld>
+  <p:clrMapOvr>
+    <a:masterClrMapping/>
+  </p:clrMapOvr>
+</p:sld>
+</file>
+
+<file path=ppt/slides/slide14.xml><?xml version="1.0" encoding="utf-8"?>
+<p:sld xmlns:a="http://schemas.openxmlformats.org/drawingml/2006/main" xmlns:r="http://schemas.openxmlformats.org/officeDocument/2006/relationships" xmlns:p="http://schemas.openxmlformats.org/presentationml/2006/main">
+  <p:cSld>
+    <p:spTree>
+      <p:nvGrpSpPr>
+        <p:cNvPr id="1" name=""/>
+        <p:cNvGrpSpPr/>
+        <p:nvPr/>
+      </p:nvGrpSpPr>
+      <p:grpSpPr>
+        <a:xfrm>
+          <a:off x="0" y="0"/>
+          <a:ext cx="0" cy="0"/>
+          <a:chOff x="0" y="0"/>
+          <a:chExt cx="0" cy="0"/>
+        </a:xfrm>
+      </p:grpSpPr>
+      <p:sp>
+        <p:nvSpPr>
+          <p:cNvPr id="2" name="Titel 1"/>
+          <p:cNvSpPr>
+            <a:spLocks noGrp="1"/>
+          </p:cNvSpPr>
+          <p:nvPr>
+            <p:ph type="title"/>
+          </p:nvPr>
+        </p:nvSpPr>
+        <p:spPr/>
+        <p:txBody>
+          <a:bodyPr/>
+          <a:lstStyle/>
+          <a:p>
+            <a:r>
+              <a:rPr lang="nl-NL" dirty="0"/>
+              <a:t>Initiële planning</a:t>
+            </a:r>
+          </a:p>
+        </p:txBody>
+      </p:sp>
+      <p:sp>
+        <p:nvSpPr>
+          <p:cNvPr id="4" name="Tijdelijke aanduiding voor dianummer 3"/>
+          <p:cNvSpPr>
+            <a:spLocks noGrp="1"/>
+          </p:cNvSpPr>
+          <p:nvPr>
+            <p:ph type="sldNum" sz="quarter" idx="12"/>
+          </p:nvPr>
+        </p:nvSpPr>
+        <p:spPr/>
+        <p:txBody>
+          <a:bodyPr/>
+          <a:lstStyle/>
+          <a:p>
+            <a:fld id="{7AE184E0-0BD4-4705-A12B-9B71DDE63301}" type="slidenum">
               <a:rPr lang="nl-BE" noProof="0" smtClean="0"/>
-              <a:t>13</a:t>
+              <a:t>14</a:t>
             </a:fld>
             <a:endParaRPr lang="nl-BE" noProof="0" dirty="0"/>
           </a:p>
@@ -6332,7 +7917,7 @@
 </p:sld>
 </file>
 
-<file path=ppt/slides/slide14.xml><?xml version="1.0" encoding="utf-8"?>
+<file path=ppt/slides/slide15.xml><?xml version="1.0" encoding="utf-8"?>
 <p:sld xmlns:a="http://schemas.openxmlformats.org/drawingml/2006/main" xmlns:r="http://schemas.openxmlformats.org/officeDocument/2006/relationships" xmlns:p="http://schemas.openxmlformats.org/presentationml/2006/main">
   <p:cSld>
     <p:spTree>
@@ -6549,10 +8134,9 @@
           <a:lstStyle/>
           <a:p>
             <a:r>
-              <a:rPr lang="en-US" dirty="0" err="1"/>
+              <a:rPr lang="nl-NL" dirty="0"/>
               <a:t>probleemanalyse</a:t>
             </a:r>
-            <a:endParaRPr lang="nl-NL" dirty="0"/>
           </a:p>
         </p:txBody>
       </p:sp>
@@ -6705,7 +8289,7 @@
 </file>
 
 <file path=ppt/slides/slide5.xml><?xml version="1.0" encoding="utf-8"?>
-<p:sld xmlns:a="http://schemas.openxmlformats.org/drawingml/2006/main" xmlns:r="http://schemas.openxmlformats.org/officeDocument/2006/relationships" xmlns:p="http://schemas.openxmlformats.org/presentationml/2006/main">
+<p:sld xmlns:a="http://schemas.openxmlformats.org/drawingml/2006/main" xmlns:r="http://schemas.openxmlformats.org/officeDocument/2006/relationships" xmlns:p="http://schemas.openxmlformats.org/presentationml/2006/main" show="0">
   <p:cSld>
     <p:spTree>
       <p:nvGrpSpPr>
@@ -6859,7 +8443,7 @@
           </p:nvPr>
         </p:nvPicPr>
         <p:blipFill>
-          <a:blip r:embed="rId2" cstate="print">
+          <a:blip r:embed="rId3" cstate="print">
             <a:clrChange>
               <a:clrFrom>
                 <a:srgbClr val="FFFFFF"/>
@@ -6902,7 +8486,7 @@
           <p:nvPr/>
         </p:nvPicPr>
         <p:blipFill>
-          <a:blip r:embed="rId3">
+          <a:blip r:embed="rId4">
             <a:clrChange>
               <a:clrFrom>
                 <a:srgbClr val="FFFFFF"/>
@@ -6948,11 +8532,11 @@
           <p:nvPr/>
         </p:nvPicPr>
         <p:blipFill>
-          <a:blip r:embed="rId4">
+          <a:blip r:embed="rId5">
             <a:extLst>
               <a:ext uri="{BEBA8EAE-BF5A-486C-A8C5-ECC9F3942E4B}">
                 <a14:imgProps xmlns:a14="http://schemas.microsoft.com/office/drawing/2010/main">
-                  <a14:imgLayer r:embed="rId5">
+                  <a14:imgLayer r:embed="rId6">
                     <a14:imgEffect>
                       <a14:backgroundRemoval t="5981" b="96890" l="4320" r="95680">
                         <a14:foregroundMark x1="9120" y1="39713" x2="9120" y2="39713"/>
@@ -7233,11 +8817,11 @@
           <p:nvPr/>
         </p:nvPicPr>
         <p:blipFill>
-          <a:blip r:embed="rId6">
+          <a:blip r:embed="rId7">
             <a:extLst>
               <a:ext uri="{BEBA8EAE-BF5A-486C-A8C5-ECC9F3942E4B}">
                 <a14:imgProps xmlns:a14="http://schemas.microsoft.com/office/drawing/2010/main">
-                  <a14:imgLayer r:embed="rId7">
+                  <a14:imgLayer r:embed="rId8">
                     <a14:imgEffect>
                       <a14:backgroundRemoval t="10000" b="90000" l="10000" r="90000"/>
                     </a14:imgEffect>
@@ -7320,11 +8904,11 @@
           <p:nvPr/>
         </p:nvPicPr>
         <p:blipFill>
-          <a:blip r:embed="rId8">
+          <a:blip r:embed="rId9">
             <a:extLst>
               <a:ext uri="{BEBA8EAE-BF5A-486C-A8C5-ECC9F3942E4B}">
                 <a14:imgProps xmlns:a14="http://schemas.microsoft.com/office/drawing/2010/main">
-                  <a14:imgLayer r:embed="rId9">
+                  <a14:imgLayer r:embed="rId10">
                     <a14:imgEffect>
                       <a14:backgroundRemoval t="10000" b="90000" l="4600" r="97400">
                         <a14:foregroundMark x1="94000" y1="54000" x2="94000" y2="54000"/>
@@ -7461,11 +9045,11 @@
           <p:nvPr/>
         </p:nvPicPr>
         <p:blipFill>
-          <a:blip r:embed="rId8">
+          <a:blip r:embed="rId9">
             <a:extLst>
               <a:ext uri="{BEBA8EAE-BF5A-486C-A8C5-ECC9F3942E4B}">
                 <a14:imgProps xmlns:a14="http://schemas.microsoft.com/office/drawing/2010/main">
-                  <a14:imgLayer r:embed="rId9">
+                  <a14:imgLayer r:embed="rId10">
                     <a14:imgEffect>
                       <a14:backgroundRemoval t="10000" b="90000" l="4600" r="97400">
                         <a14:foregroundMark x1="94000" y1="54000" x2="94000" y2="54000"/>
@@ -7515,11 +9099,11 @@
           <p:nvPr/>
         </p:nvPicPr>
         <p:blipFill>
-          <a:blip r:embed="rId8">
+          <a:blip r:embed="rId9">
             <a:extLst>
               <a:ext uri="{BEBA8EAE-BF5A-486C-A8C5-ECC9F3942E4B}">
                 <a14:imgProps xmlns:a14="http://schemas.microsoft.com/office/drawing/2010/main">
-                  <a14:imgLayer r:embed="rId9">
+                  <a14:imgLayer r:embed="rId10">
                     <a14:imgEffect>
                       <a14:backgroundRemoval t="10000" b="90000" l="4600" r="97400">
                         <a14:foregroundMark x1="94000" y1="54000" x2="94000" y2="54000"/>
@@ -7569,11 +9153,11 @@
           <p:nvPr/>
         </p:nvPicPr>
         <p:blipFill>
-          <a:blip r:embed="rId8">
+          <a:blip r:embed="rId9">
             <a:extLst>
               <a:ext uri="{BEBA8EAE-BF5A-486C-A8C5-ECC9F3942E4B}">
                 <a14:imgProps xmlns:a14="http://schemas.microsoft.com/office/drawing/2010/main">
-                  <a14:imgLayer r:embed="rId9">
+                  <a14:imgLayer r:embed="rId10">
                     <a14:imgEffect>
                       <a14:backgroundRemoval t="10000" b="90000" l="4600" r="97400">
                         <a14:foregroundMark x1="94000" y1="54000" x2="94000" y2="54000"/>
@@ -8288,7 +9872,7 @@
 </file>
 
 <file path=ppt/slides/slide9.xml><?xml version="1.0" encoding="utf-8"?>
-<p:sld xmlns:a="http://schemas.openxmlformats.org/drawingml/2006/main" xmlns:r="http://schemas.openxmlformats.org/officeDocument/2006/relationships" xmlns:p="http://schemas.openxmlformats.org/presentationml/2006/main">
+<p:sld xmlns:a="http://schemas.openxmlformats.org/drawingml/2006/main" xmlns:r="http://schemas.openxmlformats.org/officeDocument/2006/relationships" xmlns:p="http://schemas.openxmlformats.org/presentationml/2006/main" show="0">
   <p:cSld>
     <p:spTree>
       <p:nvGrpSpPr>

</xml_diff>

<commit_message>
Added planning to Presentation 1 and added some comments under the slides
</commit_message>
<xml_diff>
--- a/Report/Presentatie_1.pptx
+++ b/Report/Presentatie_1.pptx
@@ -5,24 +5,23 @@
     <p:sldMasterId id="2147483660" r:id="rId1"/>
   </p:sldMasterIdLst>
   <p:notesMasterIdLst>
-    <p:notesMasterId r:id="rId17"/>
+    <p:notesMasterId r:id="rId16"/>
   </p:notesMasterIdLst>
   <p:sldIdLst>
     <p:sldId id="259" r:id="rId2"/>
     <p:sldId id="256" r:id="rId3"/>
     <p:sldId id="260" r:id="rId4"/>
     <p:sldId id="265" r:id="rId5"/>
-    <p:sldId id="267" r:id="rId6"/>
+    <p:sldId id="299" r:id="rId6"/>
     <p:sldId id="294" r:id="rId7"/>
     <p:sldId id="289" r:id="rId8"/>
     <p:sldId id="288" r:id="rId9"/>
-    <p:sldId id="268" r:id="rId10"/>
-    <p:sldId id="296" r:id="rId11"/>
-    <p:sldId id="297" r:id="rId12"/>
-    <p:sldId id="298" r:id="rId13"/>
-    <p:sldId id="269" r:id="rId14"/>
-    <p:sldId id="271" r:id="rId15"/>
-    <p:sldId id="266" r:id="rId16"/>
+    <p:sldId id="296" r:id="rId10"/>
+    <p:sldId id="297" r:id="rId11"/>
+    <p:sldId id="298" r:id="rId12"/>
+    <p:sldId id="269" r:id="rId13"/>
+    <p:sldId id="271" r:id="rId14"/>
+    <p:sldId id="266" r:id="rId15"/>
   </p:sldIdLst>
   <p:sldSz cx="17338675" cy="9753600"/>
   <p:notesSz cx="6858000" cy="9144000"/>
@@ -222,7 +221,7 @@
           <a:p>
             <a:fld id="{86680C0C-85DF-417F-8238-DB0D15743621}" type="datetimeFigureOut">
               <a:rPr lang="en-GB" smtClean="0"/>
-              <a:t>06/03/2018</a:t>
+              <a:t>07/03/2018</a:t>
             </a:fld>
             <a:endParaRPr lang="en-GB"/>
           </a:p>
@@ -381,7 +380,7 @@
           <a:p>
             <a:fld id="{539A0A48-EDB1-4AFE-B1B7-10CE2A416496}" type="slidenum">
               <a:rPr lang="en-GB" smtClean="0"/>
-              <a:t>‹nr.›</a:t>
+              <a:t>‹#›</a:t>
             </a:fld>
             <a:endParaRPr lang="en-GB"/>
           </a:p>
@@ -593,7 +592,7 @@
       </p:grpSpPr>
       <p:sp>
         <p:nvSpPr>
-          <p:cNvPr id="2" name="Tijdelijke aanduiding voor dia-afbeelding 1"/>
+          <p:cNvPr id="2" name="Slide Image Placeholder 1"/>
           <p:cNvSpPr>
             <a:spLocks noGrp="1" noRot="1" noChangeAspect="1"/>
           </p:cNvSpPr>
@@ -605,7 +604,7 @@
       </p:sp>
       <p:sp>
         <p:nvSpPr>
-          <p:cNvPr id="3" name="Tijdelijke aanduiding voor notities 2"/>
+          <p:cNvPr id="3" name="Notes Placeholder 2"/>
           <p:cNvSpPr>
             <a:spLocks noGrp="1"/>
           </p:cNvSpPr>
@@ -618,31 +617,13 @@
           <a:bodyPr/>
           <a:lstStyle/>
           <a:p>
-            <a:r>
-              <a:rPr lang="nl-BE" dirty="0">
-                <a:sym typeface="Wingdings" pitchFamily="2" charset="2"/>
-              </a:rPr>
-              <a:t>Drone aansturen via Raspberry </a:t>
-            </a:r>
-          </a:p>
-          <a:p>
-            <a:endParaRPr lang="nl-BE" dirty="0">
-              <a:sym typeface="Wingdings" pitchFamily="2" charset="2"/>
-            </a:endParaRPr>
-          </a:p>
-          <a:p>
-            <a:endParaRPr lang="nl-BE" dirty="0">
-              <a:sym typeface="Wingdings" pitchFamily="2" charset="2"/>
-            </a:endParaRPr>
-          </a:p>
-          <a:p>
-            <a:endParaRPr lang="nl-BE" dirty="0"/>
-          </a:p>
-        </p:txBody>
-      </p:sp>
-      <p:sp>
-        <p:nvSpPr>
-          <p:cNvPr id="4" name="Tijdelijke aanduiding voor dianummer 3"/>
+            <a:endParaRPr lang="en-GB" dirty="0"/>
+          </a:p>
+        </p:txBody>
+      </p:sp>
+      <p:sp>
+        <p:nvSpPr>
+          <p:cNvPr id="4" name="Slide Number Placeholder 3"/>
           <p:cNvSpPr>
             <a:spLocks noGrp="1"/>
           </p:cNvSpPr>
@@ -666,7 +647,7 @@
     </p:spTree>
     <p:extLst>
       <p:ext uri="{BB962C8B-B14F-4D97-AF65-F5344CB8AC3E}">
-        <p14:creationId xmlns:p14="http://schemas.microsoft.com/office/powerpoint/2010/main" val="1259480818"/>
+        <p14:creationId xmlns:p14="http://schemas.microsoft.com/office/powerpoint/2010/main" val="3237113512"/>
       </p:ext>
     </p:extLst>
   </p:cSld>
@@ -695,7 +676,7 @@
       </p:grpSpPr>
       <p:sp>
         <p:nvSpPr>
-          <p:cNvPr id="2" name="Slide Image Placeholder 1"/>
+          <p:cNvPr id="2" name="Tijdelijke aanduiding voor dia-afbeelding 1"/>
           <p:cNvSpPr>
             <a:spLocks noGrp="1" noRot="1" noChangeAspect="1"/>
           </p:cNvSpPr>
@@ -707,7 +688,7 @@
       </p:sp>
       <p:sp>
         <p:nvSpPr>
-          <p:cNvPr id="3" name="Notes Placeholder 2"/>
+          <p:cNvPr id="3" name="Tijdelijke aanduiding voor notities 2"/>
           <p:cNvSpPr>
             <a:spLocks noGrp="1"/>
           </p:cNvSpPr>
@@ -720,13 +701,52 @@
           <a:bodyPr/>
           <a:lstStyle/>
           <a:p>
-            <a:endParaRPr lang="en-GB" dirty="0"/>
-          </a:p>
-        </p:txBody>
-      </p:sp>
-      <p:sp>
-        <p:nvSpPr>
-          <p:cNvPr id="4" name="Slide Number Placeholder 3"/>
+            <a:r>
+              <a:rPr lang="nl-BE" dirty="0"/>
+              <a:t>Tot slot geven we u nog de initiële planning mee.</a:t>
+            </a:r>
+          </a:p>
+          <a:p>
+            <a:endParaRPr lang="nl-BE" dirty="0"/>
+          </a:p>
+          <a:p>
+            <a:r>
+              <a:rPr lang="nl-BE" dirty="0"/>
+              <a:t>De planning is opgedeeld in 13 weken, nl. de 12 lesweken en de inhaalweek.</a:t>
+            </a:r>
+          </a:p>
+          <a:p>
+            <a:endParaRPr lang="nl-BE" dirty="0"/>
+          </a:p>
+          <a:p>
+            <a:r>
+              <a:rPr lang="nl-BE" dirty="0"/>
+              <a:t>In het begin focussen we op de hardware en vervolgens krijgt het software-aspect de aandacht.</a:t>
+            </a:r>
+          </a:p>
+          <a:p>
+            <a:endParaRPr lang="nl-BE" dirty="0"/>
+          </a:p>
+          <a:p>
+            <a:r>
+              <a:rPr lang="nl-BE" dirty="0"/>
+              <a:t>Tijdens de eerste 2 weken hebben we de hardware samengesteld en besteld. Die orders worden in de komende week geleverd. Sinds gisteren is onze drone toegekomen en eerder vandaag hebben we die dan ook uitvoerig getest.</a:t>
+            </a:r>
+          </a:p>
+          <a:p>
+            <a:endParaRPr lang="nl-BE" dirty="0"/>
+          </a:p>
+          <a:p>
+            <a:r>
+              <a:rPr lang="nl-BE" dirty="0"/>
+              <a:t>Momenteel is het UWB aspect achter de rug en tegen het eind van volgende week moet het hardware-aspect volledig afgerond zijn.</a:t>
+            </a:r>
+          </a:p>
+        </p:txBody>
+      </p:sp>
+      <p:sp>
+        <p:nvSpPr>
+          <p:cNvPr id="4" name="Tijdelijke aanduiding voor dianummer 3"/>
           <p:cNvSpPr>
             <a:spLocks noGrp="1"/>
           </p:cNvSpPr>
@@ -750,7 +770,7 @@
     </p:spTree>
     <p:extLst>
       <p:ext uri="{BB962C8B-B14F-4D97-AF65-F5344CB8AC3E}">
-        <p14:creationId xmlns:p14="http://schemas.microsoft.com/office/powerpoint/2010/main" val="3237113512"/>
+        <p14:creationId xmlns:p14="http://schemas.microsoft.com/office/powerpoint/2010/main" val="2736078886"/>
       </p:ext>
     </p:extLst>
   </p:cSld>
@@ -779,7 +799,7 @@
       </p:grpSpPr>
       <p:sp>
         <p:nvSpPr>
-          <p:cNvPr id="2" name="Tijdelijke aanduiding voor dia-afbeelding 1"/>
+          <p:cNvPr id="2" name="Slide Image Placeholder 1"/>
           <p:cNvSpPr>
             <a:spLocks noGrp="1" noRot="1" noChangeAspect="1"/>
           </p:cNvSpPr>
@@ -791,7 +811,7 @@
       </p:sp>
       <p:sp>
         <p:nvSpPr>
-          <p:cNvPr id="3" name="Tijdelijke aanduiding voor notities 2"/>
+          <p:cNvPr id="3" name="Notes Placeholder 2"/>
           <p:cNvSpPr>
             <a:spLocks noGrp="1"/>
           </p:cNvSpPr>
@@ -805,15 +825,109 @@
           <a:lstStyle/>
           <a:p>
             <a:r>
-              <a:rPr lang="nl-BE" dirty="0"/>
-              <a:t>Planning?</a:t>
-            </a:r>
-          </a:p>
-        </p:txBody>
-      </p:sp>
-      <p:sp>
-        <p:nvSpPr>
-          <p:cNvPr id="4" name="Tijdelijke aanduiding voor dianummer 3"/>
+              <a:rPr lang="en-US" dirty="0" err="1"/>
+              <a:t>Bedankt</a:t>
+            </a:r>
+            <a:r>
+              <a:rPr lang="en-US" dirty="0"/>
+              <a:t> </a:t>
+            </a:r>
+            <a:r>
+              <a:rPr lang="en-US" dirty="0" err="1"/>
+              <a:t>voor</a:t>
+            </a:r>
+            <a:r>
+              <a:rPr lang="en-US" dirty="0"/>
+              <a:t> </a:t>
+            </a:r>
+            <a:r>
+              <a:rPr lang="en-US" dirty="0" err="1"/>
+              <a:t>uw</a:t>
+            </a:r>
+            <a:r>
+              <a:rPr lang="en-US" dirty="0"/>
+              <a:t> </a:t>
+            </a:r>
+            <a:r>
+              <a:rPr lang="en-US" dirty="0" err="1"/>
+              <a:t>aandacht</a:t>
+            </a:r>
+            <a:r>
+              <a:rPr lang="en-US" dirty="0"/>
+              <a:t>.</a:t>
+            </a:r>
+          </a:p>
+          <a:p>
+            <a:r>
+              <a:rPr lang="en-US" dirty="0" err="1"/>
+              <a:t>Als</a:t>
+            </a:r>
+            <a:r>
+              <a:rPr lang="en-US" dirty="0"/>
+              <a:t> </a:t>
+            </a:r>
+            <a:r>
+              <a:rPr lang="en-US" dirty="0" err="1"/>
+              <a:t>er</a:t>
+            </a:r>
+            <a:r>
+              <a:rPr lang="en-US" dirty="0"/>
+              <a:t> </a:t>
+            </a:r>
+            <a:r>
+              <a:rPr lang="en-US" dirty="0" err="1"/>
+              <a:t>nog</a:t>
+            </a:r>
+            <a:r>
+              <a:rPr lang="en-US" dirty="0"/>
+              <a:t> </a:t>
+            </a:r>
+            <a:r>
+              <a:rPr lang="en-US" dirty="0" err="1"/>
+              <a:t>vragen</a:t>
+            </a:r>
+            <a:r>
+              <a:rPr lang="en-US" dirty="0"/>
+              <a:t> </a:t>
+            </a:r>
+            <a:r>
+              <a:rPr lang="en-US" dirty="0" err="1"/>
+              <a:t>zijn</a:t>
+            </a:r>
+            <a:r>
+              <a:rPr lang="en-US" dirty="0"/>
+              <a:t> </a:t>
+            </a:r>
+            <a:r>
+              <a:rPr lang="en-US" dirty="0" err="1"/>
+              <a:t>mogen</a:t>
+            </a:r>
+            <a:r>
+              <a:rPr lang="en-US" dirty="0"/>
+              <a:t> die nu </a:t>
+            </a:r>
+            <a:r>
+              <a:rPr lang="en-US" dirty="0" err="1"/>
+              <a:t>gesteld</a:t>
+            </a:r>
+            <a:r>
+              <a:rPr lang="en-US" dirty="0"/>
+              <a:t> </a:t>
+            </a:r>
+            <a:r>
+              <a:rPr lang="en-US" dirty="0" err="1"/>
+              <a:t>worden</a:t>
+            </a:r>
+            <a:r>
+              <a:rPr lang="en-US" dirty="0"/>
+              <a:t>.</a:t>
+            </a:r>
+          </a:p>
+        </p:txBody>
+      </p:sp>
+      <p:sp>
+        <p:nvSpPr>
+          <p:cNvPr id="4" name="Slide Number Placeholder 3"/>
           <p:cNvSpPr>
             <a:spLocks noGrp="1"/>
           </p:cNvSpPr>
@@ -837,7 +951,7 @@
     </p:spTree>
     <p:extLst>
       <p:ext uri="{BB962C8B-B14F-4D97-AF65-F5344CB8AC3E}">
-        <p14:creationId xmlns:p14="http://schemas.microsoft.com/office/powerpoint/2010/main" val="2736078886"/>
+        <p14:creationId xmlns:p14="http://schemas.microsoft.com/office/powerpoint/2010/main" val="1624839729"/>
       </p:ext>
     </p:extLst>
   </p:cSld>
@@ -905,7 +1019,7 @@
               <a:rPr lang="nl-BE" dirty="0">
                 <a:sym typeface="Wingdings" pitchFamily="2" charset="2"/>
               </a:rPr>
-              <a:t> Traag, duur en gevaarlijk</a:t>
+              <a:t> traag, duur en gevaarlijk</a:t>
             </a:r>
           </a:p>
           <a:p>
@@ -932,6 +1046,14 @@
                 <a:sym typeface="Wingdings" pitchFamily="2" charset="2"/>
               </a:rPr>
               <a:t>WIJ  De basis, drone autonoom een vooraf bepaalde route laten vliegen in een magazijn. </a:t>
+            </a:r>
+          </a:p>
+          <a:p>
+            <a:r>
+              <a:rPr lang="nl-BE">
+                <a:sym typeface="Wingdings" pitchFamily="2" charset="2"/>
+              </a:rPr>
+              <a:t>Hierbij moeten we ook in real time de locatie van de drone kennen.</a:t>
             </a:r>
             <a:endParaRPr lang="nl-BE" dirty="0"/>
           </a:p>
@@ -1047,7 +1169,7 @@
     </p:spTree>
     <p:extLst>
       <p:ext uri="{BB962C8B-B14F-4D97-AF65-F5344CB8AC3E}">
-        <p14:creationId xmlns:p14="http://schemas.microsoft.com/office/powerpoint/2010/main" val="2775425252"/>
+        <p14:creationId xmlns:p14="http://schemas.microsoft.com/office/powerpoint/2010/main" val="847193591"/>
       </p:ext>
     </p:extLst>
   </p:cSld>
@@ -1131,7 +1253,7 @@
           <a:p>
             <a:r>
               <a:rPr lang="nl-BE" dirty="0"/>
-              <a:t>Batterij </a:t>
+              <a:t>LiPo Batterij </a:t>
             </a:r>
             <a:r>
               <a:rPr lang="nl-BE" dirty="0">
@@ -1144,7 +1266,7 @@
           <a:p>
             <a:r>
               <a:rPr lang="nl-BE" dirty="0"/>
-              <a:t>Server </a:t>
+              <a:t>MQTT Server </a:t>
             </a:r>
             <a:r>
               <a:rPr lang="nl-BE" dirty="0">
@@ -1514,7 +1636,7 @@
       </p:grpSpPr>
       <p:sp>
         <p:nvSpPr>
-          <p:cNvPr id="2" name="Slide Image Placeholder 1"/>
+          <p:cNvPr id="2" name="Tijdelijke aanduiding voor dia-afbeelding 1"/>
           <p:cNvSpPr>
             <a:spLocks noGrp="1" noRot="1" noChangeAspect="1"/>
           </p:cNvSpPr>
@@ -1526,7 +1648,7 @@
       </p:sp>
       <p:sp>
         <p:nvSpPr>
-          <p:cNvPr id="3" name="Notes Placeholder 2"/>
+          <p:cNvPr id="3" name="Tijdelijke aanduiding voor notities 2"/>
           <p:cNvSpPr>
             <a:spLocks noGrp="1"/>
           </p:cNvSpPr>
@@ -1539,13 +1661,36 @@
           <a:bodyPr/>
           <a:lstStyle/>
           <a:p>
-            <a:endParaRPr lang="en-GB"/>
-          </a:p>
-        </p:txBody>
-      </p:sp>
-      <p:sp>
-        <p:nvSpPr>
-          <p:cNvPr id="4" name="Slide Number Placeholder 3"/>
+            <a:r>
+              <a:rPr lang="nl-BE" dirty="0"/>
+              <a:t>Bram:</a:t>
+            </a:r>
+          </a:p>
+          <a:p>
+            <a:r>
+              <a:rPr lang="nl-BE" dirty="0"/>
+              <a:t>Afstanden </a:t>
+            </a:r>
+            <a:r>
+              <a:rPr lang="nl-BE" dirty="0">
+                <a:sym typeface="Wingdings" pitchFamily="2" charset="2"/>
+              </a:rPr>
+              <a:t>naar positie</a:t>
+            </a:r>
+          </a:p>
+          <a:p>
+            <a:endParaRPr lang="nl-BE" dirty="0">
+              <a:sym typeface="Wingdings" pitchFamily="2" charset="2"/>
+            </a:endParaRPr>
+          </a:p>
+          <a:p>
+            <a:endParaRPr lang="nl-BE" dirty="0"/>
+          </a:p>
+        </p:txBody>
+      </p:sp>
+      <p:sp>
+        <p:nvSpPr>
+          <p:cNvPr id="4" name="Tijdelijke aanduiding voor dianummer 3"/>
           <p:cNvSpPr>
             <a:spLocks noGrp="1"/>
           </p:cNvSpPr>
@@ -1569,7 +1714,7 @@
     </p:spTree>
     <p:extLst>
       <p:ext uri="{BB962C8B-B14F-4D97-AF65-F5344CB8AC3E}">
-        <p14:creationId xmlns:p14="http://schemas.microsoft.com/office/powerpoint/2010/main" val="2596642095"/>
+        <p14:creationId xmlns:p14="http://schemas.microsoft.com/office/powerpoint/2010/main" val="4015503791"/>
       </p:ext>
     </p:extLst>
   </p:cSld>
@@ -1625,25 +1770,91 @@
           <a:p>
             <a:r>
               <a:rPr lang="nl-BE" dirty="0"/>
-              <a:t>Bram:</a:t>
-            </a:r>
+              <a:t>Afstanden komen binnen op Raspberry Pi</a:t>
+            </a:r>
+          </a:p>
+          <a:p>
+            <a:endParaRPr lang="nl-BE" dirty="0"/>
           </a:p>
           <a:p>
             <a:r>
               <a:rPr lang="nl-BE" dirty="0"/>
-              <a:t>Afstanden </a:t>
+              <a:t>Berekeningen verschuiven naar MQTT (=Message Queuing Telemetry Transport) server via wifi</a:t>
+            </a:r>
+          </a:p>
+          <a:p>
+            <a:endParaRPr lang="nl-BE" dirty="0"/>
+          </a:p>
+          <a:p>
+            <a:r>
+              <a:rPr lang="nl-BE" dirty="0"/>
+              <a:t>Wie? Broker </a:t>
             </a:r>
             <a:r>
               <a:rPr lang="nl-BE" dirty="0">
                 <a:sym typeface="Wingdings" pitchFamily="2" charset="2"/>
               </a:rPr>
-              <a:t>naar positie</a:t>
+              <a:t> Clients</a:t>
+            </a:r>
+          </a:p>
+          <a:p>
+            <a:r>
+              <a:rPr lang="nl-BE" dirty="0">
+                <a:sym typeface="Wingdings" pitchFamily="2" charset="2"/>
+              </a:rPr>
+              <a:t>Methoden? Publish  Subscribe</a:t>
+            </a:r>
+          </a:p>
+          <a:p>
+            <a:r>
+              <a:rPr lang="nl-BE" dirty="0">
+                <a:sym typeface="Wingdings" pitchFamily="2" charset="2"/>
+              </a:rPr>
+              <a:t>Topics? Ranging  Position </a:t>
             </a:r>
           </a:p>
           <a:p>
             <a:endParaRPr lang="nl-BE" dirty="0">
               <a:sym typeface="Wingdings" pitchFamily="2" charset="2"/>
             </a:endParaRPr>
+          </a:p>
+          <a:p>
+            <a:r>
+              <a:rPr lang="nl-BE" dirty="0">
+                <a:sym typeface="Wingdings" pitchFamily="2" charset="2"/>
+              </a:rPr>
+              <a:t>Ander software matig concept m.b.t. Snelheid</a:t>
+            </a:r>
+          </a:p>
+          <a:p>
+            <a:r>
+              <a:rPr lang="nl-BE" dirty="0">
+                <a:sym typeface="Wingdings" pitchFamily="2" charset="2"/>
+              </a:rPr>
+              <a:t>Niet altijd alle ankers sturen, maar een selectie maken</a:t>
+            </a:r>
+          </a:p>
+          <a:p>
+            <a:endParaRPr lang="nl-BE" dirty="0">
+              <a:sym typeface="Wingdings" pitchFamily="2" charset="2"/>
+            </a:endParaRPr>
+          </a:p>
+          <a:p>
+            <a:r>
+              <a:rPr lang="nl-BE" dirty="0">
+                <a:sym typeface="Wingdings" pitchFamily="2" charset="2"/>
+              </a:rPr>
+              <a:t>Zijnoot: De server die we ter beschikking hebben werkt reeds in 2D, probleem</a:t>
+            </a:r>
+          </a:p>
+          <a:p>
+            <a:r>
+              <a:rPr lang="nl-BE" dirty="0">
+                <a:sym typeface="Wingdings" pitchFamily="2" charset="2"/>
+              </a:rPr>
+              <a:t>Oplossing: Ultrasone sensor op de drone voor de hoogte</a:t>
+            </a:r>
+            <a:endParaRPr lang="nl-BE" dirty="0"/>
           </a:p>
           <a:p>
             <a:endParaRPr lang="nl-BE" dirty="0"/>
@@ -1676,7 +1887,7 @@
     </p:spTree>
     <p:extLst>
       <p:ext uri="{BB962C8B-B14F-4D97-AF65-F5344CB8AC3E}">
-        <p14:creationId xmlns:p14="http://schemas.microsoft.com/office/powerpoint/2010/main" val="4015503791"/>
+        <p14:creationId xmlns:p14="http://schemas.microsoft.com/office/powerpoint/2010/main" val="2054610554"/>
       </p:ext>
     </p:extLst>
   </p:cSld>
@@ -1731,48 +1942,10 @@
           <a:lstStyle/>
           <a:p>
             <a:r>
-              <a:rPr lang="nl-BE" dirty="0"/>
-              <a:t>Afstanden komen binnen op Raspberry Pi</a:t>
-            </a:r>
-          </a:p>
-          <a:p>
-            <a:endParaRPr lang="nl-BE" dirty="0"/>
-          </a:p>
-          <a:p>
-            <a:r>
-              <a:rPr lang="nl-BE" dirty="0"/>
-              <a:t>Berekeningen verschuiven naar MQTT (=Message Queuing Telemetry Transport) server via wifi</a:t>
-            </a:r>
-          </a:p>
-          <a:p>
-            <a:endParaRPr lang="nl-BE" dirty="0"/>
-          </a:p>
-          <a:p>
-            <a:r>
-              <a:rPr lang="nl-BE" dirty="0"/>
-              <a:t>Wie? Broker </a:t>
-            </a:r>
-            <a:r>
               <a:rPr lang="nl-BE" dirty="0">
                 <a:sym typeface="Wingdings" pitchFamily="2" charset="2"/>
               </a:rPr>
-              <a:t> Clients</a:t>
-            </a:r>
-          </a:p>
-          <a:p>
-            <a:r>
-              <a:rPr lang="nl-BE" dirty="0">
-                <a:sym typeface="Wingdings" pitchFamily="2" charset="2"/>
-              </a:rPr>
-              <a:t>Methoden? Publish  Subscribe</a:t>
-            </a:r>
-          </a:p>
-          <a:p>
-            <a:r>
-              <a:rPr lang="nl-BE" dirty="0">
-                <a:sym typeface="Wingdings" pitchFamily="2" charset="2"/>
-              </a:rPr>
-              <a:t>Topics? Ranging  Position </a:t>
+              <a:t>Drone aansturen via Raspberry </a:t>
             </a:r>
           </a:p>
           <a:p>
@@ -1781,42 +1954,9 @@
             </a:endParaRPr>
           </a:p>
           <a:p>
-            <a:r>
-              <a:rPr lang="nl-BE" dirty="0">
-                <a:sym typeface="Wingdings" pitchFamily="2" charset="2"/>
-              </a:rPr>
-              <a:t>Ander software matig concept m.b.t. Snelheid</a:t>
-            </a:r>
-          </a:p>
-          <a:p>
-            <a:r>
-              <a:rPr lang="nl-BE" dirty="0">
-                <a:sym typeface="Wingdings" pitchFamily="2" charset="2"/>
-              </a:rPr>
-              <a:t>Niet altijd alle ankers sturen, maar een selectie maken</a:t>
-            </a:r>
-          </a:p>
-          <a:p>
             <a:endParaRPr lang="nl-BE" dirty="0">
               <a:sym typeface="Wingdings" pitchFamily="2" charset="2"/>
             </a:endParaRPr>
-          </a:p>
-          <a:p>
-            <a:r>
-              <a:rPr lang="nl-BE" dirty="0">
-                <a:sym typeface="Wingdings" pitchFamily="2" charset="2"/>
-              </a:rPr>
-              <a:t>Zijnoot: De server die we ter beschikking hebben werkt reeds in 2D, probleem</a:t>
-            </a:r>
-          </a:p>
-          <a:p>
-            <a:r>
-              <a:rPr lang="nl-BE" dirty="0">
-                <a:sym typeface="Wingdings" pitchFamily="2" charset="2"/>
-              </a:rPr>
-              <a:t>Oplossing: Ultrasone sensor op de drone voor de hoogte</a:t>
-            </a:r>
-            <a:endParaRPr lang="nl-BE" dirty="0"/>
           </a:p>
           <a:p>
             <a:endParaRPr lang="nl-BE" dirty="0"/>
@@ -1849,7 +1989,7 @@
     </p:spTree>
     <p:extLst>
       <p:ext uri="{BB962C8B-B14F-4D97-AF65-F5344CB8AC3E}">
-        <p14:creationId xmlns:p14="http://schemas.microsoft.com/office/powerpoint/2010/main" val="2054610554"/>
+        <p14:creationId xmlns:p14="http://schemas.microsoft.com/office/powerpoint/2010/main" val="1259480818"/>
       </p:ext>
     </p:extLst>
   </p:cSld>
@@ -1893,7 +2033,7 @@
           <a:p>
             <a:fld id="{5A24147F-ED97-47AF-A1B3-C82A179CF7F3}" type="datetime1">
               <a:rPr lang="nl-NL" smtClean="0"/>
-              <a:t>06-03-18</a:t>
+              <a:t>7-3-2018</a:t>
             </a:fld>
             <a:endParaRPr lang="en-GB"/>
           </a:p>
@@ -1935,7 +2075,7 @@
           <a:p>
             <a:fld id="{7AE184E0-0BD4-4705-A12B-9B71DDE63301}" type="slidenum">
               <a:rPr lang="en-GB" smtClean="0"/>
-              <a:t>‹nr.›</a:t>
+              <a:t>‹#›</a:t>
             </a:fld>
             <a:endParaRPr lang="en-GB"/>
           </a:p>
@@ -2718,7 +2858,7 @@
             <a:fld id="{7AE184E0-0BD4-4705-A12B-9B71DDE63301}" type="slidenum">
               <a:rPr lang="nl-BE" noProof="0" smtClean="0"/>
               <a:pPr/>
-              <a:t>‹nr.›</a:t>
+              <a:t>‹#›</a:t>
             </a:fld>
             <a:endParaRPr lang="nl-BE" noProof="0" dirty="0"/>
           </a:p>
@@ -2971,7 +3111,7 @@
           <a:p>
             <a:fld id="{25470885-0B31-4E06-AE71-7E16801F2838}" type="datetime1">
               <a:rPr lang="nl-BE" noProof="0" smtClean="0"/>
-              <a:t>6/03/18</a:t>
+              <a:t>7/03/2018</a:t>
             </a:fld>
             <a:endParaRPr lang="nl-BE" noProof="0" dirty="0"/>
           </a:p>
@@ -3013,7 +3153,7 @@
           <a:p>
             <a:fld id="{7AE184E0-0BD4-4705-A12B-9B71DDE63301}" type="slidenum">
               <a:rPr lang="nl-BE" noProof="0" smtClean="0"/>
-              <a:t>‹nr.›</a:t>
+              <a:t>‹#›</a:t>
             </a:fld>
             <a:endParaRPr lang="nl-BE" noProof="0" dirty="0"/>
           </a:p>
@@ -3089,7 +3229,7 @@
           <a:p>
             <a:fld id="{E7410F60-8C93-4C37-B51A-4DDAE36F7E9B}" type="datetime1">
               <a:rPr lang="nl-BE" noProof="0" smtClean="0"/>
-              <a:t>6/03/18</a:t>
+              <a:t>7/03/2018</a:t>
             </a:fld>
             <a:endParaRPr lang="nl-BE" noProof="0" dirty="0"/>
           </a:p>
@@ -3186,7 +3326,7 @@
             <a:fld id="{7AE184E0-0BD4-4705-A12B-9B71DDE63301}" type="slidenum">
               <a:rPr lang="nl-BE" noProof="0" smtClean="0"/>
               <a:pPr/>
-              <a:t>‹nr.›</a:t>
+              <a:t>‹#›</a:t>
             </a:fld>
             <a:endParaRPr lang="nl-BE" noProof="0" dirty="0"/>
           </a:p>
@@ -3368,7 +3508,7 @@
           <a:p>
             <a:fld id="{656594B6-17DF-4759-A7A5-128AFEA77F2C}" type="datetime1">
               <a:rPr lang="nl-BE" noProof="0" smtClean="0"/>
-              <a:t>6/03/18</a:t>
+              <a:t>7/03/2018</a:t>
             </a:fld>
             <a:endParaRPr lang="nl-BE" noProof="0" dirty="0"/>
           </a:p>
@@ -3410,7 +3550,7 @@
           <a:p>
             <a:fld id="{7AE184E0-0BD4-4705-A12B-9B71DDE63301}" type="slidenum">
               <a:rPr lang="nl-BE" noProof="0" smtClean="0"/>
-              <a:t>‹nr.›</a:t>
+              <a:t>‹#›</a:t>
             </a:fld>
             <a:endParaRPr lang="nl-BE" noProof="0" dirty="0"/>
           </a:p>
@@ -3509,7 +3649,7 @@
           <a:p>
             <a:fld id="{66A81384-1200-4D40-BEF0-3A17A1F906F4}" type="datetime1">
               <a:rPr lang="nl-NL" noProof="0" smtClean="0"/>
-              <a:t>06-03-18</a:t>
+              <a:t>7-3-2018</a:t>
             </a:fld>
             <a:endParaRPr lang="nl-NL" noProof="0" dirty="0"/>
           </a:p>
@@ -4050,7 +4190,7 @@
           <a:p>
             <a:fld id="{FA870D1A-A3AB-4E9F-892E-C45B5A80FDBF}" type="datetime1">
               <a:rPr lang="nl-BE" noProof="0" smtClean="0"/>
-              <a:t>6/03/18</a:t>
+              <a:t>7/03/2018</a:t>
             </a:fld>
             <a:endParaRPr lang="nl-BE" noProof="0" dirty="0"/>
           </a:p>
@@ -4127,7 +4267,7 @@
             <a:fld id="{7AE184E0-0BD4-4705-A12B-9B71DDE63301}" type="slidenum">
               <a:rPr lang="nl-BE" noProof="0" smtClean="0"/>
               <a:pPr/>
-              <a:t>‹nr.›</a:t>
+              <a:t>‹#›</a:t>
             </a:fld>
             <a:endParaRPr lang="nl-BE" noProof="0" dirty="0"/>
           </a:p>
@@ -4765,7 +4905,7 @@
           <a:p>
             <a:r>
               <a:rPr lang="nl-NL" dirty="0"/>
-              <a:t>Setup</a:t>
+              <a:t>Lokalisatie</a:t>
             </a:r>
           </a:p>
         </p:txBody>
@@ -4788,968 +4928,6 @@
             <a:fld id="{7AE184E0-0BD4-4705-A12B-9B71DDE63301}" type="slidenum">
               <a:rPr lang="nl-BE" noProof="0" smtClean="0"/>
               <a:t>10</a:t>
-            </a:fld>
-            <a:endParaRPr lang="nl-BE" noProof="0" dirty="0"/>
-          </a:p>
-        </p:txBody>
-      </p:sp>
-      <p:pic>
-        <p:nvPicPr>
-          <p:cNvPr id="5" name="Content Placeholder 5" descr="A picture containing black, cat, rowel&#10;&#10;Description generated with very high confidence">
-            <a:extLst>
-              <a:ext uri="{FF2B5EF4-FFF2-40B4-BE49-F238E27FC236}">
-                <a16:creationId xmlns:a16="http://schemas.microsoft.com/office/drawing/2014/main" id="{209815B5-D362-4E21-B105-90FB0738077B}"/>
-              </a:ext>
-            </a:extLst>
-          </p:cNvPr>
-          <p:cNvPicPr>
-            <a:picLocks noGrp="1" noChangeAspect="1"/>
-          </p:cNvPicPr>
-          <p:nvPr>
-            <p:ph idx="1"/>
-          </p:nvPr>
-        </p:nvPicPr>
-        <p:blipFill>
-          <a:blip r:embed="rId3" cstate="print">
-            <a:clrChange>
-              <a:clrFrom>
-                <a:srgbClr val="FFFFFF"/>
-              </a:clrFrom>
-              <a:clrTo>
-                <a:srgbClr val="FFFFFF">
-                  <a:alpha val="0"/>
-                </a:srgbClr>
-              </a:clrTo>
-            </a:clrChange>
-            <a:extLst>
-              <a:ext uri="{28A0092B-C50C-407E-A947-70E740481C1C}">
-                <a14:useLocalDpi xmlns:a14="http://schemas.microsoft.com/office/drawing/2010/main" val="0"/>
-              </a:ext>
-            </a:extLst>
-          </a:blip>
-          <a:stretch>
-            <a:fillRect/>
-          </a:stretch>
-        </p:blipFill>
-        <p:spPr>
-          <a:xfrm>
-            <a:off x="43955" y="1278990"/>
-            <a:ext cx="5752881" cy="2871674"/>
-          </a:xfrm>
-        </p:spPr>
-      </p:pic>
-      <p:pic>
-        <p:nvPicPr>
-          <p:cNvPr id="6" name="Content Placeholder 5" descr="A circuit board&#10;&#10;Description generated with very high confidence">
-            <a:extLst>
-              <a:ext uri="{FF2B5EF4-FFF2-40B4-BE49-F238E27FC236}">
-                <a16:creationId xmlns:a16="http://schemas.microsoft.com/office/drawing/2014/main" id="{5DC46D9F-5DB3-407F-B27A-199B3FE0352B}"/>
-              </a:ext>
-            </a:extLst>
-          </p:cNvPr>
-          <p:cNvPicPr>
-            <a:picLocks noChangeAspect="1"/>
-          </p:cNvPicPr>
-          <p:nvPr/>
-        </p:nvPicPr>
-        <p:blipFill>
-          <a:blip r:embed="rId4">
-            <a:clrChange>
-              <a:clrFrom>
-                <a:srgbClr val="FFFFFF"/>
-              </a:clrFrom>
-              <a:clrTo>
-                <a:srgbClr val="FFFFFF">
-                  <a:alpha val="0"/>
-                </a:srgbClr>
-              </a:clrTo>
-            </a:clrChange>
-            <a:extLst>
-              <a:ext uri="{28A0092B-C50C-407E-A947-70E740481C1C}">
-                <a14:useLocalDpi xmlns:a14="http://schemas.microsoft.com/office/drawing/2010/main" val="0"/>
-              </a:ext>
-            </a:extLst>
-          </a:blip>
-          <a:stretch>
-            <a:fillRect/>
-          </a:stretch>
-        </p:blipFill>
-        <p:spPr>
-          <a:xfrm>
-            <a:off x="6511265" y="1289833"/>
-            <a:ext cx="5040000" cy="5040000"/>
-          </a:xfrm>
-          <a:prstGeom prst="rect">
-            <a:avLst/>
-          </a:prstGeom>
-        </p:spPr>
-      </p:pic>
-      <p:pic>
-        <p:nvPicPr>
-          <p:cNvPr id="18" name="Picture 17" descr="A close up of a computer&#10;&#10;Description generated with very high confidence">
-            <a:extLst>
-              <a:ext uri="{FF2B5EF4-FFF2-40B4-BE49-F238E27FC236}">
-                <a16:creationId xmlns:a16="http://schemas.microsoft.com/office/drawing/2014/main" id="{E9750424-21F3-4252-B2D0-92619F4A0BAD}"/>
-              </a:ext>
-            </a:extLst>
-          </p:cNvPr>
-          <p:cNvPicPr>
-            <a:picLocks noChangeAspect="1"/>
-          </p:cNvPicPr>
-          <p:nvPr/>
-        </p:nvPicPr>
-        <p:blipFill>
-          <a:blip r:embed="rId5">
-            <a:extLst>
-              <a:ext uri="{BEBA8EAE-BF5A-486C-A8C5-ECC9F3942E4B}">
-                <a14:imgProps xmlns:a14="http://schemas.microsoft.com/office/drawing/2010/main">
-                  <a14:imgLayer r:embed="rId6">
-                    <a14:imgEffect>
-                      <a14:backgroundRemoval t="5981" b="96890" l="4320" r="95680">
-                        <a14:foregroundMark x1="9120" y1="39713" x2="9120" y2="39713"/>
-                        <a14:foregroundMark x1="10400" y1="67225" x2="4320" y2="40670"/>
-                        <a14:foregroundMark x1="4320" y1="40670" x2="10560" y2="30383"/>
-                        <a14:foregroundMark x1="10560" y1="30383" x2="16160" y2="28469"/>
-                        <a14:foregroundMark x1="81280" y1="97129" x2="79040" y2="97129"/>
-                        <a14:foregroundMark x1="81760" y1="6220" x2="81760" y2="6220"/>
-                        <a14:foregroundMark x1="53920" y1="7416" x2="53920" y2="7416"/>
-                        <a14:foregroundMark x1="44960" y1="7656" x2="44960" y2="7656"/>
-                        <a14:foregroundMark x1="40160" y1="12440" x2="48640" y2="9091"/>
-                        <a14:foregroundMark x1="48640" y1="9091" x2="48800" y2="9091"/>
-                        <a14:foregroundMark x1="63680" y1="8612" x2="85440" y2="4545"/>
-                        <a14:foregroundMark x1="85440" y1="4545" x2="91680" y2="15550"/>
-                        <a14:foregroundMark x1="91680" y1="15550" x2="95040" y2="88278"/>
-                        <a14:foregroundMark x1="96480" y1="3110" x2="99360" y2="26794"/>
-                        <a14:foregroundMark x1="99360" y1="26794" x2="95680" y2="85407"/>
-                        <a14:foregroundMark x1="95680" y1="85407" x2="85760" y2="82775"/>
-                        <a14:foregroundMark x1="85760" y1="82775" x2="85120" y2="67464"/>
-                        <a14:foregroundMark x1="85120" y1="67464" x2="93600" y2="21770"/>
-                        <a14:foregroundMark x1="93600" y1="21770" x2="89280" y2="10526"/>
-                        <a14:foregroundMark x1="89280" y1="10526" x2="89280" y2="10526"/>
-                      </a14:backgroundRemoval>
-                    </a14:imgEffect>
-                  </a14:imgLayer>
-                </a14:imgProps>
-              </a:ext>
-              <a:ext uri="{28A0092B-C50C-407E-A947-70E740481C1C}">
-                <a14:useLocalDpi xmlns:a14="http://schemas.microsoft.com/office/drawing/2010/main" val="0"/>
-              </a:ext>
-            </a:extLst>
-          </a:blip>
-          <a:stretch>
-            <a:fillRect/>
-          </a:stretch>
-        </p:blipFill>
-        <p:spPr>
-          <a:xfrm>
-            <a:off x="13010765" y="3432619"/>
-            <a:ext cx="4297497" cy="2881511"/>
-          </a:xfrm>
-          <a:prstGeom prst="rect">
-            <a:avLst/>
-          </a:prstGeom>
-        </p:spPr>
-      </p:pic>
-      <p:cxnSp>
-        <p:nvCxnSpPr>
-          <p:cNvPr id="7" name="Straight Connector 6">
-            <a:extLst>
-              <a:ext uri="{FF2B5EF4-FFF2-40B4-BE49-F238E27FC236}">
-                <a16:creationId xmlns:a16="http://schemas.microsoft.com/office/drawing/2014/main" id="{7C022078-64FB-4E01-B5F9-72AEBF028F24}"/>
-              </a:ext>
-            </a:extLst>
-          </p:cNvPr>
-          <p:cNvCxnSpPr/>
-          <p:nvPr/>
-        </p:nvCxnSpPr>
-        <p:spPr>
-          <a:xfrm>
-            <a:off x="5783656" y="2721429"/>
-            <a:ext cx="1440000" cy="0"/>
-          </a:xfrm>
-          <a:prstGeom prst="line">
-            <a:avLst/>
-          </a:prstGeom>
-          <a:ln w="28575">
-            <a:solidFill>
-              <a:srgbClr val="1E64C8"/>
-            </a:solidFill>
-            <a:prstDash val="solid"/>
-            <a:headEnd type="triangle" w="lg" len="lg"/>
-            <a:tailEnd type="triangle" w="lg" len="lg"/>
-          </a:ln>
-        </p:spPr>
-        <p:style>
-          <a:lnRef idx="3">
-            <a:schemeClr val="accent1"/>
-          </a:lnRef>
-          <a:fillRef idx="0">
-            <a:schemeClr val="accent1"/>
-          </a:fillRef>
-          <a:effectRef idx="2">
-            <a:schemeClr val="accent1"/>
-          </a:effectRef>
-          <a:fontRef idx="minor">
-            <a:schemeClr val="tx1"/>
-          </a:fontRef>
-        </p:style>
-      </p:cxnSp>
-      <p:cxnSp>
-        <p:nvCxnSpPr>
-          <p:cNvPr id="24" name="Straight Connector 23">
-            <a:extLst>
-              <a:ext uri="{FF2B5EF4-FFF2-40B4-BE49-F238E27FC236}">
-                <a16:creationId xmlns:a16="http://schemas.microsoft.com/office/drawing/2014/main" id="{A5ACC2CB-29EE-4B2E-8F9B-C4140FEBE798}"/>
-              </a:ext>
-            </a:extLst>
-          </p:cNvPr>
-          <p:cNvCxnSpPr>
-            <a:cxnSpLocks/>
-          </p:cNvCxnSpPr>
-          <p:nvPr/>
-        </p:nvCxnSpPr>
-        <p:spPr>
-          <a:xfrm>
-            <a:off x="5927656" y="6249410"/>
-            <a:ext cx="1296000" cy="432000"/>
-          </a:xfrm>
-          <a:prstGeom prst="line">
-            <a:avLst/>
-          </a:prstGeom>
-          <a:ln w="28575">
-            <a:solidFill>
-              <a:srgbClr val="1E64C8"/>
-            </a:solidFill>
-            <a:headEnd type="triangle" w="lg" len="lg"/>
-            <a:tailEnd type="triangle" w="lg" len="lg"/>
-          </a:ln>
-        </p:spPr>
-        <p:style>
-          <a:lnRef idx="3">
-            <a:schemeClr val="accent1"/>
-          </a:lnRef>
-          <a:fillRef idx="0">
-            <a:schemeClr val="accent1"/>
-          </a:fillRef>
-          <a:effectRef idx="2">
-            <a:schemeClr val="accent1"/>
-          </a:effectRef>
-          <a:fontRef idx="minor">
-            <a:schemeClr val="tx1"/>
-          </a:fontRef>
-        </p:style>
-      </p:cxnSp>
-      <p:cxnSp>
-        <p:nvCxnSpPr>
-          <p:cNvPr id="25" name="Straight Connector 24">
-            <a:extLst>
-              <a:ext uri="{FF2B5EF4-FFF2-40B4-BE49-F238E27FC236}">
-                <a16:creationId xmlns:a16="http://schemas.microsoft.com/office/drawing/2014/main" id="{DD833622-E1CB-4406-BC3B-BEC0EA9F358B}"/>
-              </a:ext>
-            </a:extLst>
-          </p:cNvPr>
-          <p:cNvCxnSpPr>
-            <a:cxnSpLocks/>
-          </p:cNvCxnSpPr>
-          <p:nvPr/>
-        </p:nvCxnSpPr>
-        <p:spPr>
-          <a:xfrm flipV="1">
-            <a:off x="5927656" y="8112638"/>
-            <a:ext cx="1296000" cy="432000"/>
-          </a:xfrm>
-          <a:prstGeom prst="line">
-            <a:avLst/>
-          </a:prstGeom>
-          <a:ln w="28575">
-            <a:solidFill>
-              <a:srgbClr val="1E64C8"/>
-            </a:solidFill>
-            <a:headEnd type="triangle" w="lg" len="lg"/>
-            <a:tailEnd type="triangle" w="lg" len="lg"/>
-          </a:ln>
-        </p:spPr>
-        <p:style>
-          <a:lnRef idx="3">
-            <a:schemeClr val="accent1"/>
-          </a:lnRef>
-          <a:fillRef idx="0">
-            <a:schemeClr val="accent1"/>
-          </a:fillRef>
-          <a:effectRef idx="2">
-            <a:schemeClr val="accent1"/>
-          </a:effectRef>
-          <a:fontRef idx="minor">
-            <a:schemeClr val="tx1"/>
-          </a:fontRef>
-        </p:style>
-      </p:cxnSp>
-      <p:cxnSp>
-        <p:nvCxnSpPr>
-          <p:cNvPr id="31" name="Straight Connector 30">
-            <a:extLst>
-              <a:ext uri="{FF2B5EF4-FFF2-40B4-BE49-F238E27FC236}">
-                <a16:creationId xmlns:a16="http://schemas.microsoft.com/office/drawing/2014/main" id="{42965CAB-4FC4-44FC-974F-2A001BFFDAC2}"/>
-              </a:ext>
-            </a:extLst>
-          </p:cNvPr>
-          <p:cNvCxnSpPr/>
-          <p:nvPr/>
-        </p:nvCxnSpPr>
-        <p:spPr>
-          <a:xfrm>
-            <a:off x="11553828" y="4874809"/>
-            <a:ext cx="1440000" cy="0"/>
-          </a:xfrm>
-          <a:prstGeom prst="line">
-            <a:avLst/>
-          </a:prstGeom>
-          <a:ln w="28575">
-            <a:solidFill>
-              <a:srgbClr val="1E64C8"/>
-            </a:solidFill>
-            <a:headEnd type="triangle" w="lg" len="lg"/>
-            <a:tailEnd type="triangle" w="lg" len="lg"/>
-          </a:ln>
-        </p:spPr>
-        <p:style>
-          <a:lnRef idx="3">
-            <a:schemeClr val="accent1"/>
-          </a:lnRef>
-          <a:fillRef idx="0">
-            <a:schemeClr val="accent1"/>
-          </a:fillRef>
-          <a:effectRef idx="2">
-            <a:schemeClr val="accent1"/>
-          </a:effectRef>
-          <a:fontRef idx="minor">
-            <a:schemeClr val="tx1"/>
-          </a:fontRef>
-        </p:style>
-      </p:cxnSp>
-      <p:cxnSp>
-        <p:nvCxnSpPr>
-          <p:cNvPr id="32" name="Straight Connector 31">
-            <a:extLst>
-              <a:ext uri="{FF2B5EF4-FFF2-40B4-BE49-F238E27FC236}">
-                <a16:creationId xmlns:a16="http://schemas.microsoft.com/office/drawing/2014/main" id="{6A385D8E-99CA-4AC3-915F-B7588F75E6E6}"/>
-              </a:ext>
-            </a:extLst>
-          </p:cNvPr>
-          <p:cNvCxnSpPr>
-            <a:cxnSpLocks/>
-          </p:cNvCxnSpPr>
-          <p:nvPr/>
-        </p:nvCxnSpPr>
-        <p:spPr>
-          <a:xfrm>
-            <a:off x="7948150" y="4876800"/>
-            <a:ext cx="0" cy="1440000"/>
-          </a:xfrm>
-          <a:prstGeom prst="line">
-            <a:avLst/>
-          </a:prstGeom>
-          <a:ln w="28575">
-            <a:headEnd type="triangle" w="lg" len="lg"/>
-            <a:tailEnd type="triangle" w="lg" len="lg"/>
-          </a:ln>
-        </p:spPr>
-        <p:style>
-          <a:lnRef idx="3">
-            <a:schemeClr val="accent2"/>
-          </a:lnRef>
-          <a:fillRef idx="0">
-            <a:schemeClr val="accent2"/>
-          </a:fillRef>
-          <a:effectRef idx="2">
-            <a:schemeClr val="accent2"/>
-          </a:effectRef>
-          <a:fontRef idx="minor">
-            <a:schemeClr val="tx1"/>
-          </a:fontRef>
-        </p:style>
-      </p:cxnSp>
-      <p:pic>
-        <p:nvPicPr>
-          <p:cNvPr id="36" name="Content Placeholder 8" descr="A close up of a device&#10;&#10;Description generated with high confidence">
-            <a:extLst>
-              <a:ext uri="{FF2B5EF4-FFF2-40B4-BE49-F238E27FC236}">
-                <a16:creationId xmlns:a16="http://schemas.microsoft.com/office/drawing/2014/main" id="{4DCA515B-FF18-4773-879C-D0DA14287EA4}"/>
-              </a:ext>
-            </a:extLst>
-          </p:cNvPr>
-          <p:cNvPicPr>
-            <a:picLocks noChangeAspect="1"/>
-          </p:cNvPicPr>
-          <p:nvPr/>
-        </p:nvPicPr>
-        <p:blipFill>
-          <a:blip r:embed="rId7">
-            <a:extLst>
-              <a:ext uri="{BEBA8EAE-BF5A-486C-A8C5-ECC9F3942E4B}">
-                <a14:imgProps xmlns:a14="http://schemas.microsoft.com/office/drawing/2010/main">
-                  <a14:imgLayer r:embed="rId8">
-                    <a14:imgEffect>
-                      <a14:backgroundRemoval t="10000" b="90000" l="10000" r="90000"/>
-                    </a14:imgEffect>
-                  </a14:imgLayer>
-                </a14:imgProps>
-              </a:ext>
-              <a:ext uri="{28A0092B-C50C-407E-A947-70E740481C1C}">
-                <a14:useLocalDpi xmlns:a14="http://schemas.microsoft.com/office/drawing/2010/main" val="0"/>
-              </a:ext>
-            </a:extLst>
-          </a:blip>
-          <a:stretch>
-            <a:fillRect/>
-          </a:stretch>
-        </p:blipFill>
-        <p:spPr>
-          <a:xfrm>
-            <a:off x="8981084" y="0"/>
-            <a:ext cx="2281867" cy="2002972"/>
-          </a:xfrm>
-          <a:prstGeom prst="rect">
-            <a:avLst/>
-          </a:prstGeom>
-        </p:spPr>
-      </p:pic>
-      <p:cxnSp>
-        <p:nvCxnSpPr>
-          <p:cNvPr id="37" name="Straight Connector 36">
-            <a:extLst>
-              <a:ext uri="{FF2B5EF4-FFF2-40B4-BE49-F238E27FC236}">
-                <a16:creationId xmlns:a16="http://schemas.microsoft.com/office/drawing/2014/main" id="{7A9CC6C6-26AC-4C9B-963B-9C13D9697B44}"/>
-              </a:ext>
-            </a:extLst>
-          </p:cNvPr>
-          <p:cNvCxnSpPr>
-            <a:cxnSpLocks/>
-          </p:cNvCxnSpPr>
-          <p:nvPr/>
-        </p:nvCxnSpPr>
-        <p:spPr>
-          <a:xfrm>
-            <a:off x="10115019" y="2002972"/>
-            <a:ext cx="0" cy="1436914"/>
-          </a:xfrm>
-          <a:prstGeom prst="line">
-            <a:avLst/>
-          </a:prstGeom>
-          <a:ln w="28575">
-            <a:headEnd type="triangle" w="lg" len="lg"/>
-            <a:tailEnd type="triangle" w="lg" len="lg"/>
-          </a:ln>
-        </p:spPr>
-        <p:style>
-          <a:lnRef idx="3">
-            <a:schemeClr val="accent2"/>
-          </a:lnRef>
-          <a:fillRef idx="0">
-            <a:schemeClr val="accent2"/>
-          </a:fillRef>
-          <a:effectRef idx="2">
-            <a:schemeClr val="accent2"/>
-          </a:effectRef>
-          <a:fontRef idx="minor">
-            <a:schemeClr val="tx1"/>
-          </a:fontRef>
-        </p:style>
-      </p:cxnSp>
-      <p:pic>
-        <p:nvPicPr>
-          <p:cNvPr id="33" name="Content Placeholder 5" descr="A circuit board&#10;&#10;Description generated with very high confidence">
-            <a:extLst>
-              <a:ext uri="{FF2B5EF4-FFF2-40B4-BE49-F238E27FC236}">
-                <a16:creationId xmlns:a16="http://schemas.microsoft.com/office/drawing/2014/main" id="{5E97ED60-7D5C-412E-BD73-CA59674ADA15}"/>
-              </a:ext>
-            </a:extLst>
-          </p:cNvPr>
-          <p:cNvPicPr>
-            <a:picLocks noChangeAspect="1"/>
-          </p:cNvPicPr>
-          <p:nvPr/>
-        </p:nvPicPr>
-        <p:blipFill>
-          <a:blip r:embed="rId9">
-            <a:extLst>
-              <a:ext uri="{BEBA8EAE-BF5A-486C-A8C5-ECC9F3942E4B}">
-                <a14:imgProps xmlns:a14="http://schemas.microsoft.com/office/drawing/2010/main">
-                  <a14:imgLayer r:embed="rId10">
-                    <a14:imgEffect>
-                      <a14:backgroundRemoval t="10000" b="90000" l="4600" r="97400">
-                        <a14:foregroundMark x1="94000" y1="54000" x2="94000" y2="54000"/>
-                        <a14:foregroundMark x1="97400" y1="54000" x2="97400" y2="54000"/>
-                        <a14:foregroundMark x1="8600" y1="28000" x2="8600" y2="28000"/>
-                        <a14:foregroundMark x1="4600" y1="40400" x2="4600" y2="40400"/>
-                        <a14:foregroundMark x1="30600" y1="80400" x2="23800" y2="76600"/>
-                        <a14:foregroundMark x1="23800" y1="76600" x2="21600" y2="69200"/>
-                        <a14:foregroundMark x1="21600" y1="69200" x2="21600" y2="68000"/>
-                        <a14:foregroundMark x1="30200" y1="84400" x2="27600" y2="82000"/>
-                      </a14:backgroundRemoval>
-                    </a14:imgEffect>
-                  </a14:imgLayer>
-                </a14:imgProps>
-              </a:ext>
-              <a:ext uri="{28A0092B-C50C-407E-A947-70E740481C1C}">
-                <a14:useLocalDpi xmlns:a14="http://schemas.microsoft.com/office/drawing/2010/main" val="0"/>
-              </a:ext>
-            </a:extLst>
-          </a:blip>
-          <a:stretch>
-            <a:fillRect/>
-          </a:stretch>
-        </p:blipFill>
-        <p:spPr>
-          <a:xfrm flipH="1">
-            <a:off x="3628884" y="4893733"/>
-            <a:ext cx="2154772" cy="2154771"/>
-          </a:xfrm>
-          <a:prstGeom prst="rect">
-            <a:avLst/>
-          </a:prstGeom>
-        </p:spPr>
-      </p:pic>
-      <p:cxnSp>
-        <p:nvCxnSpPr>
-          <p:cNvPr id="40" name="Straight Connector 39">
-            <a:extLst>
-              <a:ext uri="{FF2B5EF4-FFF2-40B4-BE49-F238E27FC236}">
-                <a16:creationId xmlns:a16="http://schemas.microsoft.com/office/drawing/2014/main" id="{3502DCF6-F5E2-4DE3-9B56-35798FF187D8}"/>
-              </a:ext>
-            </a:extLst>
-          </p:cNvPr>
-          <p:cNvCxnSpPr>
-            <a:cxnSpLocks/>
-          </p:cNvCxnSpPr>
-          <p:nvPr/>
-        </p:nvCxnSpPr>
-        <p:spPr>
-          <a:xfrm>
-            <a:off x="5783656" y="7397024"/>
-            <a:ext cx="1440000" cy="1"/>
-          </a:xfrm>
-          <a:prstGeom prst="line">
-            <a:avLst/>
-          </a:prstGeom>
-          <a:ln w="28575">
-            <a:solidFill>
-              <a:srgbClr val="1E64C8"/>
-            </a:solidFill>
-            <a:headEnd type="triangle" w="lg" len="lg"/>
-            <a:tailEnd type="triangle" w="lg" len="lg"/>
-          </a:ln>
-        </p:spPr>
-        <p:style>
-          <a:lnRef idx="3">
-            <a:schemeClr val="accent1"/>
-          </a:lnRef>
-          <a:fillRef idx="0">
-            <a:schemeClr val="accent1"/>
-          </a:fillRef>
-          <a:effectRef idx="2">
-            <a:schemeClr val="accent1"/>
-          </a:effectRef>
-          <a:fontRef idx="minor">
-            <a:schemeClr val="tx1"/>
-          </a:fontRef>
-        </p:style>
-      </p:cxnSp>
-      <p:cxnSp>
-        <p:nvCxnSpPr>
-          <p:cNvPr id="41" name="Straight Connector 40">
-            <a:extLst>
-              <a:ext uri="{FF2B5EF4-FFF2-40B4-BE49-F238E27FC236}">
-                <a16:creationId xmlns:a16="http://schemas.microsoft.com/office/drawing/2014/main" id="{646C3ECD-1E1B-4EA5-888B-0E5F68D9A070}"/>
-              </a:ext>
-            </a:extLst>
-          </p:cNvPr>
-          <p:cNvCxnSpPr>
-            <a:cxnSpLocks/>
-          </p:cNvCxnSpPr>
-          <p:nvPr/>
-        </p:nvCxnSpPr>
-        <p:spPr>
-          <a:xfrm>
-            <a:off x="8310100" y="4876800"/>
-            <a:ext cx="0" cy="1440000"/>
-          </a:xfrm>
-          <a:prstGeom prst="line">
-            <a:avLst/>
-          </a:prstGeom>
-          <a:ln w="28575">
-            <a:headEnd type="triangle" w="lg" len="lg"/>
-            <a:tailEnd type="triangle" w="lg" len="lg"/>
-          </a:ln>
-        </p:spPr>
-        <p:style>
-          <a:lnRef idx="3">
-            <a:schemeClr val="accent2"/>
-          </a:lnRef>
-          <a:fillRef idx="0">
-            <a:schemeClr val="accent2"/>
-          </a:fillRef>
-          <a:effectRef idx="2">
-            <a:schemeClr val="accent2"/>
-          </a:effectRef>
-          <a:fontRef idx="minor">
-            <a:schemeClr val="tx1"/>
-          </a:fontRef>
-        </p:style>
-      </p:cxnSp>
-      <p:pic>
-        <p:nvPicPr>
-          <p:cNvPr id="21" name="Content Placeholder 5" descr="A circuit board&#10;&#10;Description generated with very high confidence">
-            <a:extLst>
-              <a:ext uri="{FF2B5EF4-FFF2-40B4-BE49-F238E27FC236}">
-                <a16:creationId xmlns:a16="http://schemas.microsoft.com/office/drawing/2014/main" id="{6D79CF16-C9A0-4673-AA2E-348378FF8194}"/>
-              </a:ext>
-            </a:extLst>
-          </p:cNvPr>
-          <p:cNvPicPr>
-            <a:picLocks noChangeAspect="1"/>
-          </p:cNvPicPr>
-          <p:nvPr/>
-        </p:nvPicPr>
-        <p:blipFill>
-          <a:blip r:embed="rId9">
-            <a:extLst>
-              <a:ext uri="{BEBA8EAE-BF5A-486C-A8C5-ECC9F3942E4B}">
-                <a14:imgProps xmlns:a14="http://schemas.microsoft.com/office/drawing/2010/main">
-                  <a14:imgLayer r:embed="rId10">
-                    <a14:imgEffect>
-                      <a14:backgroundRemoval t="10000" b="90000" l="4600" r="97400">
-                        <a14:foregroundMark x1="94000" y1="54000" x2="94000" y2="54000"/>
-                        <a14:foregroundMark x1="97400" y1="54000" x2="97400" y2="54000"/>
-                        <a14:foregroundMark x1="8600" y1="28000" x2="8600" y2="28000"/>
-                        <a14:foregroundMark x1="4600" y1="40400" x2="4600" y2="40400"/>
-                        <a14:foregroundMark x1="30600" y1="80400" x2="23800" y2="76600"/>
-                        <a14:foregroundMark x1="23800" y1="76600" x2="21600" y2="69200"/>
-                        <a14:foregroundMark x1="21600" y1="69200" x2="21600" y2="68000"/>
-                        <a14:foregroundMark x1="30200" y1="84400" x2="27600" y2="82000"/>
-                      </a14:backgroundRemoval>
-                    </a14:imgEffect>
-                  </a14:imgLayer>
-                </a14:imgProps>
-              </a:ext>
-              <a:ext uri="{28A0092B-C50C-407E-A947-70E740481C1C}">
-                <a14:useLocalDpi xmlns:a14="http://schemas.microsoft.com/office/drawing/2010/main" val="0"/>
-              </a:ext>
-            </a:extLst>
-          </a:blip>
-          <a:stretch>
-            <a:fillRect/>
-          </a:stretch>
-        </p:blipFill>
-        <p:spPr>
-          <a:xfrm flipH="1">
-            <a:off x="7223655" y="6334075"/>
-            <a:ext cx="2890416" cy="2856553"/>
-          </a:xfrm>
-          <a:prstGeom prst="rect">
-            <a:avLst/>
-          </a:prstGeom>
-        </p:spPr>
-      </p:pic>
-      <p:pic>
-        <p:nvPicPr>
-          <p:cNvPr id="20" name="Content Placeholder 5" descr="A circuit board&#10;&#10;Description generated with very high confidence">
-            <a:extLst>
-              <a:ext uri="{FF2B5EF4-FFF2-40B4-BE49-F238E27FC236}">
-                <a16:creationId xmlns:a16="http://schemas.microsoft.com/office/drawing/2014/main" id="{8DE2BD19-D59F-4A31-92EF-1B0D9E9D0FDB}"/>
-              </a:ext>
-            </a:extLst>
-          </p:cNvPr>
-          <p:cNvPicPr>
-            <a:picLocks noChangeAspect="1"/>
-          </p:cNvPicPr>
-          <p:nvPr/>
-        </p:nvPicPr>
-        <p:blipFill>
-          <a:blip r:embed="rId9">
-            <a:extLst>
-              <a:ext uri="{BEBA8EAE-BF5A-486C-A8C5-ECC9F3942E4B}">
-                <a14:imgProps xmlns:a14="http://schemas.microsoft.com/office/drawing/2010/main">
-                  <a14:imgLayer r:embed="rId10">
-                    <a14:imgEffect>
-                      <a14:backgroundRemoval t="10000" b="90000" l="4600" r="97400">
-                        <a14:foregroundMark x1="94000" y1="54000" x2="94000" y2="54000"/>
-                        <a14:foregroundMark x1="97400" y1="54000" x2="97400" y2="54000"/>
-                        <a14:foregroundMark x1="8600" y1="28000" x2="8600" y2="28000"/>
-                        <a14:foregroundMark x1="4600" y1="40400" x2="4600" y2="40400"/>
-                        <a14:foregroundMark x1="30600" y1="80400" x2="23800" y2="76600"/>
-                        <a14:foregroundMark x1="23800" y1="76600" x2="21600" y2="69200"/>
-                        <a14:foregroundMark x1="21600" y1="69200" x2="21600" y2="68000"/>
-                        <a14:foregroundMark x1="30200" y1="84400" x2="27600" y2="82000"/>
-                      </a14:backgroundRemoval>
-                    </a14:imgEffect>
-                  </a14:imgLayer>
-                </a14:imgProps>
-              </a:ext>
-              <a:ext uri="{28A0092B-C50C-407E-A947-70E740481C1C}">
-                <a14:useLocalDpi xmlns:a14="http://schemas.microsoft.com/office/drawing/2010/main" val="0"/>
-              </a:ext>
-            </a:extLst>
-          </a:blip>
-          <a:stretch>
-            <a:fillRect/>
-          </a:stretch>
-        </p:blipFill>
-        <p:spPr>
-          <a:xfrm flipH="1">
-            <a:off x="3641549" y="6333733"/>
-            <a:ext cx="2154772" cy="2154771"/>
-          </a:xfrm>
-          <a:prstGeom prst="rect">
-            <a:avLst/>
-          </a:prstGeom>
-        </p:spPr>
-      </p:pic>
-      <p:pic>
-        <p:nvPicPr>
-          <p:cNvPr id="22" name="Content Placeholder 5" descr="A circuit board&#10;&#10;Description generated with very high confidence">
-            <a:extLst>
-              <a:ext uri="{FF2B5EF4-FFF2-40B4-BE49-F238E27FC236}">
-                <a16:creationId xmlns:a16="http://schemas.microsoft.com/office/drawing/2014/main" id="{ADF143CE-9778-400F-8F41-742E440E5FBF}"/>
-              </a:ext>
-            </a:extLst>
-          </p:cNvPr>
-          <p:cNvPicPr>
-            <a:picLocks noChangeAspect="1"/>
-          </p:cNvPicPr>
-          <p:nvPr/>
-        </p:nvPicPr>
-        <p:blipFill>
-          <a:blip r:embed="rId9">
-            <a:extLst>
-              <a:ext uri="{BEBA8EAE-BF5A-486C-A8C5-ECC9F3942E4B}">
-                <a14:imgProps xmlns:a14="http://schemas.microsoft.com/office/drawing/2010/main">
-                  <a14:imgLayer r:embed="rId10">
-                    <a14:imgEffect>
-                      <a14:backgroundRemoval t="10000" b="90000" l="4600" r="97400">
-                        <a14:foregroundMark x1="94000" y1="54000" x2="94000" y2="54000"/>
-                        <a14:foregroundMark x1="97400" y1="54000" x2="97400" y2="54000"/>
-                        <a14:foregroundMark x1="8600" y1="28000" x2="8600" y2="28000"/>
-                        <a14:foregroundMark x1="4600" y1="40400" x2="4600" y2="40400"/>
-                        <a14:foregroundMark x1="30600" y1="80400" x2="23800" y2="76600"/>
-                        <a14:foregroundMark x1="23800" y1="76600" x2="21600" y2="69200"/>
-                        <a14:foregroundMark x1="21600" y1="69200" x2="21600" y2="68000"/>
-                        <a14:foregroundMark x1="30200" y1="84400" x2="27600" y2="82000"/>
-                      </a14:backgroundRemoval>
-                    </a14:imgEffect>
-                  </a14:imgLayer>
-                </a14:imgProps>
-              </a:ext>
-              <a:ext uri="{28A0092B-C50C-407E-A947-70E740481C1C}">
-                <a14:useLocalDpi xmlns:a14="http://schemas.microsoft.com/office/drawing/2010/main" val="0"/>
-              </a:ext>
-            </a:extLst>
-          </a:blip>
-          <a:stretch>
-            <a:fillRect/>
-          </a:stretch>
-        </p:blipFill>
-        <p:spPr>
-          <a:xfrm flipH="1">
-            <a:off x="3628884" y="7764118"/>
-            <a:ext cx="2154772" cy="2154771"/>
-          </a:xfrm>
-          <a:prstGeom prst="rect">
-            <a:avLst/>
-          </a:prstGeom>
-        </p:spPr>
-      </p:pic>
-      <p:sp>
-        <p:nvSpPr>
-          <p:cNvPr id="26" name="Rectangle 25">
-            <a:extLst>
-              <a:ext uri="{FF2B5EF4-FFF2-40B4-BE49-F238E27FC236}">
-                <a16:creationId xmlns:a16="http://schemas.microsoft.com/office/drawing/2014/main" id="{B98378B0-F384-4BE8-9145-430E57DE03D7}"/>
-              </a:ext>
-            </a:extLst>
-          </p:cNvPr>
-          <p:cNvSpPr/>
-          <p:nvPr/>
-        </p:nvSpPr>
-        <p:spPr>
-          <a:xfrm>
-            <a:off x="11829609" y="4303751"/>
-            <a:ext cx="902811" cy="561885"/>
-          </a:xfrm>
-          <a:prstGeom prst="rect">
-            <a:avLst/>
-          </a:prstGeom>
-        </p:spPr>
-        <p:txBody>
-          <a:bodyPr wrap="none">
-            <a:spAutoFit/>
-          </a:bodyPr>
-          <a:lstStyle/>
-          <a:p>
-            <a:pPr algn="ctr">
-              <a:lnSpc>
-                <a:spcPct val="120000"/>
-              </a:lnSpc>
-            </a:pPr>
-            <a:r>
-              <a:rPr lang="en-US" sz="2800" dirty="0" err="1"/>
-              <a:t>WiFi</a:t>
-            </a:r>
-            <a:endParaRPr lang="en-US" sz="2800" dirty="0"/>
-          </a:p>
-        </p:txBody>
-      </p:sp>
-      <p:sp>
-        <p:nvSpPr>
-          <p:cNvPr id="27" name="TextBox 26">
-            <a:extLst>
-              <a:ext uri="{FF2B5EF4-FFF2-40B4-BE49-F238E27FC236}">
-                <a16:creationId xmlns:a16="http://schemas.microsoft.com/office/drawing/2014/main" id="{069F82B7-3555-4F6A-ABB5-38813CE5FC85}"/>
-              </a:ext>
-            </a:extLst>
-          </p:cNvPr>
-          <p:cNvSpPr txBox="1"/>
-          <p:nvPr/>
-        </p:nvSpPr>
-        <p:spPr>
-          <a:xfrm>
-            <a:off x="6036723" y="6843026"/>
-            <a:ext cx="923714" cy="553998"/>
-          </a:xfrm>
-          <a:prstGeom prst="rect">
-            <a:avLst/>
-          </a:prstGeom>
-          <a:noFill/>
-        </p:spPr>
-        <p:txBody>
-          <a:bodyPr wrap="square" rtlCol="0">
-            <a:spAutoFit/>
-          </a:bodyPr>
-          <a:lstStyle/>
-          <a:p>
-            <a:pPr algn="ctr">
-              <a:lnSpc>
-                <a:spcPct val="120000"/>
-              </a:lnSpc>
-            </a:pPr>
-            <a:r>
-              <a:rPr lang="en-US" sz="2500" dirty="0" err="1"/>
-              <a:t>UWB</a:t>
-            </a:r>
-            <a:endParaRPr lang="en-US" sz="2500" dirty="0"/>
-          </a:p>
-        </p:txBody>
-      </p:sp>
-      <p:sp>
-        <p:nvSpPr>
-          <p:cNvPr id="28" name="TextBox 27">
-            <a:extLst>
-              <a:ext uri="{FF2B5EF4-FFF2-40B4-BE49-F238E27FC236}">
-                <a16:creationId xmlns:a16="http://schemas.microsoft.com/office/drawing/2014/main" id="{1FE4C8C7-54FF-458B-98C0-1F9EBCC334C8}"/>
-              </a:ext>
-            </a:extLst>
-          </p:cNvPr>
-          <p:cNvSpPr txBox="1"/>
-          <p:nvPr/>
-        </p:nvSpPr>
-        <p:spPr>
-          <a:xfrm>
-            <a:off x="7095066" y="5283287"/>
-            <a:ext cx="856655" cy="552868"/>
-          </a:xfrm>
-          <a:prstGeom prst="rect">
-            <a:avLst/>
-          </a:prstGeom>
-          <a:noFill/>
-        </p:spPr>
-        <p:txBody>
-          <a:bodyPr wrap="square" rtlCol="0">
-            <a:spAutoFit/>
-          </a:bodyPr>
-          <a:lstStyle/>
-          <a:p>
-            <a:pPr algn="ctr">
-              <a:lnSpc>
-                <a:spcPct val="120000"/>
-              </a:lnSpc>
-            </a:pPr>
-            <a:r>
-              <a:rPr lang="en-US" sz="2500" dirty="0"/>
-              <a:t>USB</a:t>
-            </a:r>
-          </a:p>
-        </p:txBody>
-      </p:sp>
-    </p:spTree>
-    <p:extLst>
-      <p:ext uri="{BB962C8B-B14F-4D97-AF65-F5344CB8AC3E}">
-        <p14:creationId xmlns:p14="http://schemas.microsoft.com/office/powerpoint/2010/main" val="3278986083"/>
-      </p:ext>
-    </p:extLst>
-  </p:cSld>
-  <p:clrMapOvr>
-    <a:masterClrMapping/>
-  </p:clrMapOvr>
-</p:sld>
-</file>
-
-<file path=ppt/slides/slide11.xml><?xml version="1.0" encoding="utf-8"?>
-<p:sld xmlns:a="http://schemas.openxmlformats.org/drawingml/2006/main" xmlns:r="http://schemas.openxmlformats.org/officeDocument/2006/relationships" xmlns:p="http://schemas.openxmlformats.org/presentationml/2006/main">
-  <p:cSld>
-    <p:spTree>
-      <p:nvGrpSpPr>
-        <p:cNvPr id="1" name=""/>
-        <p:cNvGrpSpPr/>
-        <p:nvPr/>
-      </p:nvGrpSpPr>
-      <p:grpSpPr>
-        <a:xfrm>
-          <a:off x="0" y="0"/>
-          <a:ext cx="0" cy="0"/>
-          <a:chOff x="0" y="0"/>
-          <a:chExt cx="0" cy="0"/>
-        </a:xfrm>
-      </p:grpSpPr>
-      <p:sp>
-        <p:nvSpPr>
-          <p:cNvPr id="2" name="Titel 1"/>
-          <p:cNvSpPr>
-            <a:spLocks noGrp="1"/>
-          </p:cNvSpPr>
-          <p:nvPr>
-            <p:ph type="title"/>
-          </p:nvPr>
-        </p:nvSpPr>
-        <p:spPr/>
-        <p:txBody>
-          <a:bodyPr/>
-          <a:lstStyle/>
-          <a:p>
-            <a:r>
-              <a:rPr lang="nl-NL" dirty="0"/>
-              <a:t>Lokalisatie</a:t>
-            </a:r>
-          </a:p>
-        </p:txBody>
-      </p:sp>
-      <p:sp>
-        <p:nvSpPr>
-          <p:cNvPr id="4" name="Tijdelijke aanduiding voor dianummer 3"/>
-          <p:cNvSpPr>
-            <a:spLocks noGrp="1"/>
-          </p:cNvSpPr>
-          <p:nvPr>
-            <p:ph type="sldNum" sz="quarter" idx="12"/>
-          </p:nvPr>
-        </p:nvSpPr>
-        <p:spPr/>
-        <p:txBody>
-          <a:bodyPr/>
-          <a:lstStyle/>
-          <a:p>
-            <a:fld id="{7AE184E0-0BD4-4705-A12B-9B71DDE63301}" type="slidenum">
-              <a:rPr lang="nl-BE" noProof="0" smtClean="0"/>
-              <a:t>11</a:t>
             </a:fld>
             <a:endParaRPr lang="nl-BE" noProof="0" dirty="0"/>
           </a:p>
@@ -6739,7 +5917,7 @@
 </p:sld>
 </file>
 
-<file path=ppt/slides/slide12.xml><?xml version="1.0" encoding="utf-8"?>
+<file path=ppt/slides/slide11.xml><?xml version="1.0" encoding="utf-8"?>
 <p:sld xmlns:a="http://schemas.openxmlformats.org/drawingml/2006/main" xmlns:r="http://schemas.openxmlformats.org/officeDocument/2006/relationships" xmlns:p="http://schemas.openxmlformats.org/presentationml/2006/main">
   <p:cSld>
     <p:spTree>
@@ -6795,7 +5973,7 @@
           <a:p>
             <a:fld id="{7AE184E0-0BD4-4705-A12B-9B71DDE63301}" type="slidenum">
               <a:rPr lang="nl-BE" noProof="0" smtClean="0"/>
-              <a:t>12</a:t>
+              <a:t>11</a:t>
             </a:fld>
             <a:endParaRPr lang="nl-BE" noProof="0" dirty="0"/>
           </a:p>
@@ -7741,6 +6919,82 @@
 </p:sld>
 </file>
 
+<file path=ppt/slides/slide12.xml><?xml version="1.0" encoding="utf-8"?>
+<p:sld xmlns:a="http://schemas.openxmlformats.org/drawingml/2006/main" xmlns:r="http://schemas.openxmlformats.org/officeDocument/2006/relationships" xmlns:p="http://schemas.openxmlformats.org/presentationml/2006/main">
+  <p:cSld>
+    <p:spTree>
+      <p:nvGrpSpPr>
+        <p:cNvPr id="1" name=""/>
+        <p:cNvGrpSpPr/>
+        <p:nvPr/>
+      </p:nvGrpSpPr>
+      <p:grpSpPr>
+        <a:xfrm>
+          <a:off x="0" y="0"/>
+          <a:ext cx="0" cy="0"/>
+          <a:chOff x="0" y="0"/>
+          <a:chExt cx="0" cy="0"/>
+        </a:xfrm>
+      </p:grpSpPr>
+      <p:sp>
+        <p:nvSpPr>
+          <p:cNvPr id="8" name="Titel 7"/>
+          <p:cNvSpPr>
+            <a:spLocks noGrp="1"/>
+          </p:cNvSpPr>
+          <p:nvPr>
+            <p:ph type="ctrTitle"/>
+          </p:nvPr>
+        </p:nvSpPr>
+        <p:spPr/>
+        <p:txBody>
+          <a:bodyPr/>
+          <a:lstStyle/>
+          <a:p>
+            <a:r>
+              <a:rPr lang="nl-NL" dirty="0"/>
+              <a:t>planning</a:t>
+            </a:r>
+          </a:p>
+        </p:txBody>
+      </p:sp>
+      <p:sp>
+        <p:nvSpPr>
+          <p:cNvPr id="5" name="Slide Number Placeholder 4"/>
+          <p:cNvSpPr>
+            <a:spLocks noGrp="1"/>
+          </p:cNvSpPr>
+          <p:nvPr>
+            <p:ph type="sldNum" sz="quarter" idx="4"/>
+          </p:nvPr>
+        </p:nvSpPr>
+        <p:spPr/>
+        <p:txBody>
+          <a:bodyPr/>
+          <a:lstStyle/>
+          <a:p>
+            <a:fld id="{7AE184E0-0BD4-4705-A12B-9B71DDE63301}" type="slidenum">
+              <a:rPr lang="nl-BE" smtClean="0"/>
+              <a:pPr/>
+              <a:t>12</a:t>
+            </a:fld>
+            <a:endParaRPr lang="nl-BE" dirty="0"/>
+          </a:p>
+        </p:txBody>
+      </p:sp>
+    </p:spTree>
+    <p:extLst>
+      <p:ext uri="{BB962C8B-B14F-4D97-AF65-F5344CB8AC3E}">
+        <p14:creationId xmlns:p14="http://schemas.microsoft.com/office/powerpoint/2010/main" val="3761811934"/>
+      </p:ext>
+    </p:extLst>
+  </p:cSld>
+  <p:clrMapOvr>
+    <a:masterClrMapping/>
+  </p:clrMapOvr>
+</p:sld>
+</file>
+
 <file path=ppt/slides/slide13.xml><?xml version="1.0" encoding="utf-8"?>
 <p:sld xmlns:a="http://schemas.openxmlformats.org/drawingml/2006/main" xmlns:r="http://schemas.openxmlformats.org/officeDocument/2006/relationships" xmlns:p="http://schemas.openxmlformats.org/presentationml/2006/main">
   <p:cSld>
@@ -7760,12 +7014,12 @@
       </p:grpSpPr>
       <p:sp>
         <p:nvSpPr>
-          <p:cNvPr id="8" name="Titel 7"/>
+          <p:cNvPr id="4" name="Tijdelijke aanduiding voor dianummer 3"/>
           <p:cNvSpPr>
             <a:spLocks noGrp="1"/>
           </p:cNvSpPr>
           <p:nvPr>
-            <p:ph type="ctrTitle"/>
+            <p:ph type="sldNum" sz="quarter" idx="12"/>
           </p:nvPr>
         </p:nvSpPr>
         <p:spPr/>
@@ -7773,21 +7027,54 @@
           <a:bodyPr/>
           <a:lstStyle/>
           <a:p>
-            <a:r>
-              <a:rPr lang="nl-NL" dirty="0"/>
-              <a:t>planning</a:t>
-            </a:r>
-          </a:p>
-        </p:txBody>
-      </p:sp>
-      <p:sp>
-        <p:nvSpPr>
-          <p:cNvPr id="5" name="Slide Number Placeholder 4"/>
+            <a:fld id="{7AE184E0-0BD4-4705-A12B-9B71DDE63301}" type="slidenum">
+              <a:rPr lang="nl-BE" noProof="0" smtClean="0"/>
+              <a:t>13</a:t>
+            </a:fld>
+            <a:endParaRPr lang="nl-BE" noProof="0" dirty="0"/>
+          </a:p>
+        </p:txBody>
+      </p:sp>
+      <p:pic>
+        <p:nvPicPr>
+          <p:cNvPr id="3" name="Content Placeholder 2">
+            <a:extLst>
+              <a:ext uri="{FF2B5EF4-FFF2-40B4-BE49-F238E27FC236}">
+                <a16:creationId xmlns:a16="http://schemas.microsoft.com/office/drawing/2014/main" id="{33BDBA3D-7777-45B6-8177-21D7F6221900}"/>
+              </a:ext>
+            </a:extLst>
+          </p:cNvPr>
+          <p:cNvPicPr>
+            <a:picLocks noGrp="1" noChangeAspect="1"/>
+          </p:cNvPicPr>
+          <p:nvPr>
+            <p:ph idx="1"/>
+          </p:nvPr>
+        </p:nvPicPr>
+        <p:blipFill>
+          <a:blip r:embed="rId3"/>
+          <a:stretch>
+            <a:fillRect/>
+          </a:stretch>
+        </p:blipFill>
+        <p:spPr>
+          <a:xfrm>
+            <a:off x="3840643" y="0"/>
+            <a:ext cx="10405419" cy="9753600"/>
+          </a:xfrm>
+          <a:prstGeom prst="rect">
+            <a:avLst/>
+          </a:prstGeom>
+        </p:spPr>
+      </p:pic>
+      <p:sp>
+        <p:nvSpPr>
+          <p:cNvPr id="2" name="Titel 1"/>
           <p:cNvSpPr>
             <a:spLocks noGrp="1"/>
           </p:cNvSpPr>
           <p:nvPr>
-            <p:ph type="sldNum" sz="quarter" idx="4"/>
+            <p:ph type="title"/>
           </p:nvPr>
         </p:nvSpPr>
         <p:spPr/>
@@ -7795,112 +7082,10 @@
           <a:bodyPr/>
           <a:lstStyle/>
           <a:p>
-            <a:fld id="{7AE184E0-0BD4-4705-A12B-9B71DDE63301}" type="slidenum">
-              <a:rPr lang="nl-BE" smtClean="0"/>
-              <a:pPr/>
-              <a:t>13</a:t>
-            </a:fld>
-            <a:endParaRPr lang="nl-BE" dirty="0"/>
-          </a:p>
-        </p:txBody>
-      </p:sp>
-    </p:spTree>
-    <p:extLst>
-      <p:ext uri="{BB962C8B-B14F-4D97-AF65-F5344CB8AC3E}">
-        <p14:creationId xmlns:p14="http://schemas.microsoft.com/office/powerpoint/2010/main" val="3761811934"/>
-      </p:ext>
-    </p:extLst>
-  </p:cSld>
-  <p:clrMapOvr>
-    <a:masterClrMapping/>
-  </p:clrMapOvr>
-</p:sld>
-</file>
-
-<file path=ppt/slides/slide14.xml><?xml version="1.0" encoding="utf-8"?>
-<p:sld xmlns:a="http://schemas.openxmlformats.org/drawingml/2006/main" xmlns:r="http://schemas.openxmlformats.org/officeDocument/2006/relationships" xmlns:p="http://schemas.openxmlformats.org/presentationml/2006/main">
-  <p:cSld>
-    <p:spTree>
-      <p:nvGrpSpPr>
-        <p:cNvPr id="1" name=""/>
-        <p:cNvGrpSpPr/>
-        <p:nvPr/>
-      </p:nvGrpSpPr>
-      <p:grpSpPr>
-        <a:xfrm>
-          <a:off x="0" y="0"/>
-          <a:ext cx="0" cy="0"/>
-          <a:chOff x="0" y="0"/>
-          <a:chExt cx="0" cy="0"/>
-        </a:xfrm>
-      </p:grpSpPr>
-      <p:sp>
-        <p:nvSpPr>
-          <p:cNvPr id="2" name="Titel 1"/>
-          <p:cNvSpPr>
-            <a:spLocks noGrp="1"/>
-          </p:cNvSpPr>
-          <p:nvPr>
-            <p:ph type="title"/>
-          </p:nvPr>
-        </p:nvSpPr>
-        <p:spPr/>
-        <p:txBody>
-          <a:bodyPr/>
-          <a:lstStyle/>
-          <a:p>
             <a:r>
               <a:rPr lang="nl-NL" dirty="0"/>
               <a:t>Initiële planning</a:t>
             </a:r>
-          </a:p>
-        </p:txBody>
-      </p:sp>
-      <p:sp>
-        <p:nvSpPr>
-          <p:cNvPr id="4" name="Tijdelijke aanduiding voor dianummer 3"/>
-          <p:cNvSpPr>
-            <a:spLocks noGrp="1"/>
-          </p:cNvSpPr>
-          <p:nvPr>
-            <p:ph type="sldNum" sz="quarter" idx="12"/>
-          </p:nvPr>
-        </p:nvSpPr>
-        <p:spPr/>
-        <p:txBody>
-          <a:bodyPr/>
-          <a:lstStyle/>
-          <a:p>
-            <a:fld id="{7AE184E0-0BD4-4705-A12B-9B71DDE63301}" type="slidenum">
-              <a:rPr lang="nl-BE" noProof="0" smtClean="0"/>
-              <a:t>14</a:t>
-            </a:fld>
-            <a:endParaRPr lang="nl-BE" noProof="0" dirty="0"/>
-          </a:p>
-        </p:txBody>
-      </p:sp>
-      <p:sp>
-        <p:nvSpPr>
-          <p:cNvPr id="6" name="Content Placeholder 5">
-            <a:extLst>
-              <a:ext uri="{FF2B5EF4-FFF2-40B4-BE49-F238E27FC236}">
-                <a16:creationId xmlns:a16="http://schemas.microsoft.com/office/drawing/2014/main" id="{F164CE05-DCBB-455E-9EDB-2A95F35B7E3B}"/>
-              </a:ext>
-            </a:extLst>
-          </p:cNvPr>
-          <p:cNvSpPr>
-            <a:spLocks noGrp="1"/>
-          </p:cNvSpPr>
-          <p:nvPr>
-            <p:ph idx="1"/>
-          </p:nvPr>
-        </p:nvSpPr>
-        <p:spPr/>
-        <p:txBody>
-          <a:bodyPr/>
-          <a:lstStyle/>
-          <a:p>
-            <a:endParaRPr lang="en-US"/>
           </a:p>
         </p:txBody>
       </p:sp>
@@ -7917,7 +7102,7 @@
 </p:sld>
 </file>
 
-<file path=ppt/slides/slide15.xml><?xml version="1.0" encoding="utf-8"?>
+<file path=ppt/slides/slide14.xml><?xml version="1.0" encoding="utf-8"?>
 <p:sld xmlns:a="http://schemas.openxmlformats.org/drawingml/2006/main" xmlns:r="http://schemas.openxmlformats.org/officeDocument/2006/relationships" xmlns:p="http://schemas.openxmlformats.org/presentationml/2006/main">
   <p:cSld>
     <p:spTree>
@@ -8289,7 +7474,7 @@
 </file>
 
 <file path=ppt/slides/slide5.xml><?xml version="1.0" encoding="utf-8"?>
-<p:sld xmlns:a="http://schemas.openxmlformats.org/drawingml/2006/main" xmlns:r="http://schemas.openxmlformats.org/officeDocument/2006/relationships" xmlns:p="http://schemas.openxmlformats.org/presentationml/2006/main" show="0">
+<p:sld xmlns:a="http://schemas.openxmlformats.org/drawingml/2006/main" xmlns:r="http://schemas.openxmlformats.org/officeDocument/2006/relationships" xmlns:p="http://schemas.openxmlformats.org/presentationml/2006/main">
   <p:cSld>
     <p:spTree>
       <p:nvGrpSpPr>
@@ -8322,7 +7507,7 @@
           <a:p>
             <a:r>
               <a:rPr lang="nl-NL" dirty="0"/>
-              <a:t>Hardware</a:t>
+              <a:t>Ontwerpskeuzes</a:t>
             </a:r>
           </a:p>
         </p:txBody>
@@ -8354,7 +7539,7 @@
     </p:spTree>
     <p:extLst>
       <p:ext uri="{BB962C8B-B14F-4D97-AF65-F5344CB8AC3E}">
-        <p14:creationId xmlns:p14="http://schemas.microsoft.com/office/powerpoint/2010/main" val="838718083"/>
+        <p14:creationId xmlns:p14="http://schemas.microsoft.com/office/powerpoint/2010/main" val="3352849163"/>
       </p:ext>
     </p:extLst>
   </p:cSld>
@@ -9872,7 +9057,7 @@
 </file>
 
 <file path=ppt/slides/slide9.xml><?xml version="1.0" encoding="utf-8"?>
-<p:sld xmlns:a="http://schemas.openxmlformats.org/drawingml/2006/main" xmlns:r="http://schemas.openxmlformats.org/officeDocument/2006/relationships" xmlns:p="http://schemas.openxmlformats.org/presentationml/2006/main" show="0">
+<p:sld xmlns:a="http://schemas.openxmlformats.org/drawingml/2006/main" xmlns:r="http://schemas.openxmlformats.org/officeDocument/2006/relationships" xmlns:p="http://schemas.openxmlformats.org/presentationml/2006/main">
   <p:cSld>
     <p:spTree>
       <p:nvGrpSpPr>
@@ -9890,12 +9075,12 @@
       </p:grpSpPr>
       <p:sp>
         <p:nvSpPr>
-          <p:cNvPr id="8" name="Titel 7"/>
+          <p:cNvPr id="2" name="Titel 1"/>
           <p:cNvSpPr>
             <a:spLocks noGrp="1"/>
           </p:cNvSpPr>
           <p:nvPr>
-            <p:ph type="ctrTitle"/>
+            <p:ph type="title"/>
           </p:nvPr>
         </p:nvSpPr>
         <p:spPr/>
@@ -9905,19 +9090,19 @@
           <a:p>
             <a:r>
               <a:rPr lang="nl-NL" dirty="0"/>
-              <a:t>Software</a:t>
-            </a:r>
-          </a:p>
-        </p:txBody>
-      </p:sp>
-      <p:sp>
-        <p:nvSpPr>
-          <p:cNvPr id="5" name="Slide Number Placeholder 4"/>
+              <a:t>Setup</a:t>
+            </a:r>
+          </a:p>
+        </p:txBody>
+      </p:sp>
+      <p:sp>
+        <p:nvSpPr>
+          <p:cNvPr id="4" name="Tijdelijke aanduiding voor dianummer 3"/>
           <p:cNvSpPr>
             <a:spLocks noGrp="1"/>
           </p:cNvSpPr>
           <p:nvPr>
-            <p:ph type="sldNum" sz="quarter" idx="4"/>
+            <p:ph type="sldNum" sz="quarter" idx="12"/>
           </p:nvPr>
         </p:nvSpPr>
         <p:spPr/>
@@ -9926,18 +9111,904 @@
           <a:lstStyle/>
           <a:p>
             <a:fld id="{7AE184E0-0BD4-4705-A12B-9B71DDE63301}" type="slidenum">
-              <a:rPr lang="nl-BE" smtClean="0"/>
-              <a:pPr/>
+              <a:rPr lang="nl-BE" noProof="0" smtClean="0"/>
               <a:t>9</a:t>
             </a:fld>
-            <a:endParaRPr lang="nl-BE" dirty="0"/>
+            <a:endParaRPr lang="nl-BE" noProof="0" dirty="0"/>
+          </a:p>
+        </p:txBody>
+      </p:sp>
+      <p:pic>
+        <p:nvPicPr>
+          <p:cNvPr id="5" name="Content Placeholder 5" descr="A picture containing black, cat, rowel&#10;&#10;Description generated with very high confidence">
+            <a:extLst>
+              <a:ext uri="{FF2B5EF4-FFF2-40B4-BE49-F238E27FC236}">
+                <a16:creationId xmlns:a16="http://schemas.microsoft.com/office/drawing/2014/main" id="{209815B5-D362-4E21-B105-90FB0738077B}"/>
+              </a:ext>
+            </a:extLst>
+          </p:cNvPr>
+          <p:cNvPicPr>
+            <a:picLocks noGrp="1" noChangeAspect="1"/>
+          </p:cNvPicPr>
+          <p:nvPr>
+            <p:ph idx="1"/>
+          </p:nvPr>
+        </p:nvPicPr>
+        <p:blipFill>
+          <a:blip r:embed="rId3" cstate="print">
+            <a:clrChange>
+              <a:clrFrom>
+                <a:srgbClr val="FFFFFF"/>
+              </a:clrFrom>
+              <a:clrTo>
+                <a:srgbClr val="FFFFFF">
+                  <a:alpha val="0"/>
+                </a:srgbClr>
+              </a:clrTo>
+            </a:clrChange>
+            <a:extLst>
+              <a:ext uri="{28A0092B-C50C-407E-A947-70E740481C1C}">
+                <a14:useLocalDpi xmlns:a14="http://schemas.microsoft.com/office/drawing/2010/main" val="0"/>
+              </a:ext>
+            </a:extLst>
+          </a:blip>
+          <a:stretch>
+            <a:fillRect/>
+          </a:stretch>
+        </p:blipFill>
+        <p:spPr>
+          <a:xfrm>
+            <a:off x="43955" y="1278990"/>
+            <a:ext cx="5752881" cy="2871674"/>
+          </a:xfrm>
+        </p:spPr>
+      </p:pic>
+      <p:pic>
+        <p:nvPicPr>
+          <p:cNvPr id="6" name="Content Placeholder 5" descr="A circuit board&#10;&#10;Description generated with very high confidence">
+            <a:extLst>
+              <a:ext uri="{FF2B5EF4-FFF2-40B4-BE49-F238E27FC236}">
+                <a16:creationId xmlns:a16="http://schemas.microsoft.com/office/drawing/2014/main" id="{5DC46D9F-5DB3-407F-B27A-199B3FE0352B}"/>
+              </a:ext>
+            </a:extLst>
+          </p:cNvPr>
+          <p:cNvPicPr>
+            <a:picLocks noChangeAspect="1"/>
+          </p:cNvPicPr>
+          <p:nvPr/>
+        </p:nvPicPr>
+        <p:blipFill>
+          <a:blip r:embed="rId4">
+            <a:clrChange>
+              <a:clrFrom>
+                <a:srgbClr val="FFFFFF"/>
+              </a:clrFrom>
+              <a:clrTo>
+                <a:srgbClr val="FFFFFF">
+                  <a:alpha val="0"/>
+                </a:srgbClr>
+              </a:clrTo>
+            </a:clrChange>
+            <a:extLst>
+              <a:ext uri="{28A0092B-C50C-407E-A947-70E740481C1C}">
+                <a14:useLocalDpi xmlns:a14="http://schemas.microsoft.com/office/drawing/2010/main" val="0"/>
+              </a:ext>
+            </a:extLst>
+          </a:blip>
+          <a:stretch>
+            <a:fillRect/>
+          </a:stretch>
+        </p:blipFill>
+        <p:spPr>
+          <a:xfrm>
+            <a:off x="6511265" y="1289833"/>
+            <a:ext cx="5040000" cy="5040000"/>
+          </a:xfrm>
+          <a:prstGeom prst="rect">
+            <a:avLst/>
+          </a:prstGeom>
+        </p:spPr>
+      </p:pic>
+      <p:pic>
+        <p:nvPicPr>
+          <p:cNvPr id="18" name="Picture 17" descr="A close up of a computer&#10;&#10;Description generated with very high confidence">
+            <a:extLst>
+              <a:ext uri="{FF2B5EF4-FFF2-40B4-BE49-F238E27FC236}">
+                <a16:creationId xmlns:a16="http://schemas.microsoft.com/office/drawing/2014/main" id="{E9750424-21F3-4252-B2D0-92619F4A0BAD}"/>
+              </a:ext>
+            </a:extLst>
+          </p:cNvPr>
+          <p:cNvPicPr>
+            <a:picLocks noChangeAspect="1"/>
+          </p:cNvPicPr>
+          <p:nvPr/>
+        </p:nvPicPr>
+        <p:blipFill>
+          <a:blip r:embed="rId5">
+            <a:extLst>
+              <a:ext uri="{BEBA8EAE-BF5A-486C-A8C5-ECC9F3942E4B}">
+                <a14:imgProps xmlns:a14="http://schemas.microsoft.com/office/drawing/2010/main">
+                  <a14:imgLayer r:embed="rId6">
+                    <a14:imgEffect>
+                      <a14:backgroundRemoval t="5981" b="96890" l="4320" r="95680">
+                        <a14:foregroundMark x1="9120" y1="39713" x2="9120" y2="39713"/>
+                        <a14:foregroundMark x1="10400" y1="67225" x2="4320" y2="40670"/>
+                        <a14:foregroundMark x1="4320" y1="40670" x2="10560" y2="30383"/>
+                        <a14:foregroundMark x1="10560" y1="30383" x2="16160" y2="28469"/>
+                        <a14:foregroundMark x1="81280" y1="97129" x2="79040" y2="97129"/>
+                        <a14:foregroundMark x1="81760" y1="6220" x2="81760" y2="6220"/>
+                        <a14:foregroundMark x1="53920" y1="7416" x2="53920" y2="7416"/>
+                        <a14:foregroundMark x1="44960" y1="7656" x2="44960" y2="7656"/>
+                        <a14:foregroundMark x1="40160" y1="12440" x2="48640" y2="9091"/>
+                        <a14:foregroundMark x1="48640" y1="9091" x2="48800" y2="9091"/>
+                        <a14:foregroundMark x1="63680" y1="8612" x2="85440" y2="4545"/>
+                        <a14:foregroundMark x1="85440" y1="4545" x2="91680" y2="15550"/>
+                        <a14:foregroundMark x1="91680" y1="15550" x2="95040" y2="88278"/>
+                        <a14:foregroundMark x1="96480" y1="3110" x2="99360" y2="26794"/>
+                        <a14:foregroundMark x1="99360" y1="26794" x2="95680" y2="85407"/>
+                        <a14:foregroundMark x1="95680" y1="85407" x2="85760" y2="82775"/>
+                        <a14:foregroundMark x1="85760" y1="82775" x2="85120" y2="67464"/>
+                        <a14:foregroundMark x1="85120" y1="67464" x2="93600" y2="21770"/>
+                        <a14:foregroundMark x1="93600" y1="21770" x2="89280" y2="10526"/>
+                        <a14:foregroundMark x1="89280" y1="10526" x2="89280" y2="10526"/>
+                      </a14:backgroundRemoval>
+                    </a14:imgEffect>
+                  </a14:imgLayer>
+                </a14:imgProps>
+              </a:ext>
+              <a:ext uri="{28A0092B-C50C-407E-A947-70E740481C1C}">
+                <a14:useLocalDpi xmlns:a14="http://schemas.microsoft.com/office/drawing/2010/main" val="0"/>
+              </a:ext>
+            </a:extLst>
+          </a:blip>
+          <a:stretch>
+            <a:fillRect/>
+          </a:stretch>
+        </p:blipFill>
+        <p:spPr>
+          <a:xfrm>
+            <a:off x="13010765" y="3432619"/>
+            <a:ext cx="4297497" cy="2881511"/>
+          </a:xfrm>
+          <a:prstGeom prst="rect">
+            <a:avLst/>
+          </a:prstGeom>
+        </p:spPr>
+      </p:pic>
+      <p:cxnSp>
+        <p:nvCxnSpPr>
+          <p:cNvPr id="7" name="Straight Connector 6">
+            <a:extLst>
+              <a:ext uri="{FF2B5EF4-FFF2-40B4-BE49-F238E27FC236}">
+                <a16:creationId xmlns:a16="http://schemas.microsoft.com/office/drawing/2014/main" id="{7C022078-64FB-4E01-B5F9-72AEBF028F24}"/>
+              </a:ext>
+            </a:extLst>
+          </p:cNvPr>
+          <p:cNvCxnSpPr/>
+          <p:nvPr/>
+        </p:nvCxnSpPr>
+        <p:spPr>
+          <a:xfrm>
+            <a:off x="5783656" y="2721429"/>
+            <a:ext cx="1440000" cy="0"/>
+          </a:xfrm>
+          <a:prstGeom prst="line">
+            <a:avLst/>
+          </a:prstGeom>
+          <a:ln w="28575">
+            <a:solidFill>
+              <a:srgbClr val="1E64C8"/>
+            </a:solidFill>
+            <a:prstDash val="solid"/>
+            <a:headEnd type="triangle" w="lg" len="lg"/>
+            <a:tailEnd type="triangle" w="lg" len="lg"/>
+          </a:ln>
+        </p:spPr>
+        <p:style>
+          <a:lnRef idx="3">
+            <a:schemeClr val="accent1"/>
+          </a:lnRef>
+          <a:fillRef idx="0">
+            <a:schemeClr val="accent1"/>
+          </a:fillRef>
+          <a:effectRef idx="2">
+            <a:schemeClr val="accent1"/>
+          </a:effectRef>
+          <a:fontRef idx="minor">
+            <a:schemeClr val="tx1"/>
+          </a:fontRef>
+        </p:style>
+      </p:cxnSp>
+      <p:cxnSp>
+        <p:nvCxnSpPr>
+          <p:cNvPr id="24" name="Straight Connector 23">
+            <a:extLst>
+              <a:ext uri="{FF2B5EF4-FFF2-40B4-BE49-F238E27FC236}">
+                <a16:creationId xmlns:a16="http://schemas.microsoft.com/office/drawing/2014/main" id="{A5ACC2CB-29EE-4B2E-8F9B-C4140FEBE798}"/>
+              </a:ext>
+            </a:extLst>
+          </p:cNvPr>
+          <p:cNvCxnSpPr>
+            <a:cxnSpLocks/>
+          </p:cNvCxnSpPr>
+          <p:nvPr/>
+        </p:nvCxnSpPr>
+        <p:spPr>
+          <a:xfrm>
+            <a:off x="5927656" y="6249410"/>
+            <a:ext cx="1296000" cy="432000"/>
+          </a:xfrm>
+          <a:prstGeom prst="line">
+            <a:avLst/>
+          </a:prstGeom>
+          <a:ln w="28575">
+            <a:solidFill>
+              <a:srgbClr val="1E64C8"/>
+            </a:solidFill>
+            <a:headEnd type="triangle" w="lg" len="lg"/>
+            <a:tailEnd type="triangle" w="lg" len="lg"/>
+          </a:ln>
+        </p:spPr>
+        <p:style>
+          <a:lnRef idx="3">
+            <a:schemeClr val="accent1"/>
+          </a:lnRef>
+          <a:fillRef idx="0">
+            <a:schemeClr val="accent1"/>
+          </a:fillRef>
+          <a:effectRef idx="2">
+            <a:schemeClr val="accent1"/>
+          </a:effectRef>
+          <a:fontRef idx="minor">
+            <a:schemeClr val="tx1"/>
+          </a:fontRef>
+        </p:style>
+      </p:cxnSp>
+      <p:cxnSp>
+        <p:nvCxnSpPr>
+          <p:cNvPr id="25" name="Straight Connector 24">
+            <a:extLst>
+              <a:ext uri="{FF2B5EF4-FFF2-40B4-BE49-F238E27FC236}">
+                <a16:creationId xmlns:a16="http://schemas.microsoft.com/office/drawing/2014/main" id="{DD833622-E1CB-4406-BC3B-BEC0EA9F358B}"/>
+              </a:ext>
+            </a:extLst>
+          </p:cNvPr>
+          <p:cNvCxnSpPr>
+            <a:cxnSpLocks/>
+          </p:cNvCxnSpPr>
+          <p:nvPr/>
+        </p:nvCxnSpPr>
+        <p:spPr>
+          <a:xfrm flipV="1">
+            <a:off x="5927656" y="8112638"/>
+            <a:ext cx="1296000" cy="432000"/>
+          </a:xfrm>
+          <a:prstGeom prst="line">
+            <a:avLst/>
+          </a:prstGeom>
+          <a:ln w="28575">
+            <a:solidFill>
+              <a:srgbClr val="1E64C8"/>
+            </a:solidFill>
+            <a:headEnd type="triangle" w="lg" len="lg"/>
+            <a:tailEnd type="triangle" w="lg" len="lg"/>
+          </a:ln>
+        </p:spPr>
+        <p:style>
+          <a:lnRef idx="3">
+            <a:schemeClr val="accent1"/>
+          </a:lnRef>
+          <a:fillRef idx="0">
+            <a:schemeClr val="accent1"/>
+          </a:fillRef>
+          <a:effectRef idx="2">
+            <a:schemeClr val="accent1"/>
+          </a:effectRef>
+          <a:fontRef idx="minor">
+            <a:schemeClr val="tx1"/>
+          </a:fontRef>
+        </p:style>
+      </p:cxnSp>
+      <p:cxnSp>
+        <p:nvCxnSpPr>
+          <p:cNvPr id="31" name="Straight Connector 30">
+            <a:extLst>
+              <a:ext uri="{FF2B5EF4-FFF2-40B4-BE49-F238E27FC236}">
+                <a16:creationId xmlns:a16="http://schemas.microsoft.com/office/drawing/2014/main" id="{42965CAB-4FC4-44FC-974F-2A001BFFDAC2}"/>
+              </a:ext>
+            </a:extLst>
+          </p:cNvPr>
+          <p:cNvCxnSpPr/>
+          <p:nvPr/>
+        </p:nvCxnSpPr>
+        <p:spPr>
+          <a:xfrm>
+            <a:off x="11553828" y="4874809"/>
+            <a:ext cx="1440000" cy="0"/>
+          </a:xfrm>
+          <a:prstGeom prst="line">
+            <a:avLst/>
+          </a:prstGeom>
+          <a:ln w="28575">
+            <a:solidFill>
+              <a:srgbClr val="1E64C8"/>
+            </a:solidFill>
+            <a:headEnd type="triangle" w="lg" len="lg"/>
+            <a:tailEnd type="triangle" w="lg" len="lg"/>
+          </a:ln>
+        </p:spPr>
+        <p:style>
+          <a:lnRef idx="3">
+            <a:schemeClr val="accent1"/>
+          </a:lnRef>
+          <a:fillRef idx="0">
+            <a:schemeClr val="accent1"/>
+          </a:fillRef>
+          <a:effectRef idx="2">
+            <a:schemeClr val="accent1"/>
+          </a:effectRef>
+          <a:fontRef idx="minor">
+            <a:schemeClr val="tx1"/>
+          </a:fontRef>
+        </p:style>
+      </p:cxnSp>
+      <p:cxnSp>
+        <p:nvCxnSpPr>
+          <p:cNvPr id="32" name="Straight Connector 31">
+            <a:extLst>
+              <a:ext uri="{FF2B5EF4-FFF2-40B4-BE49-F238E27FC236}">
+                <a16:creationId xmlns:a16="http://schemas.microsoft.com/office/drawing/2014/main" id="{6A385D8E-99CA-4AC3-915F-B7588F75E6E6}"/>
+              </a:ext>
+            </a:extLst>
+          </p:cNvPr>
+          <p:cNvCxnSpPr>
+            <a:cxnSpLocks/>
+          </p:cNvCxnSpPr>
+          <p:nvPr/>
+        </p:nvCxnSpPr>
+        <p:spPr>
+          <a:xfrm>
+            <a:off x="7948150" y="4876800"/>
+            <a:ext cx="0" cy="1440000"/>
+          </a:xfrm>
+          <a:prstGeom prst="line">
+            <a:avLst/>
+          </a:prstGeom>
+          <a:ln w="28575">
+            <a:headEnd type="triangle" w="lg" len="lg"/>
+            <a:tailEnd type="triangle" w="lg" len="lg"/>
+          </a:ln>
+        </p:spPr>
+        <p:style>
+          <a:lnRef idx="3">
+            <a:schemeClr val="accent2"/>
+          </a:lnRef>
+          <a:fillRef idx="0">
+            <a:schemeClr val="accent2"/>
+          </a:fillRef>
+          <a:effectRef idx="2">
+            <a:schemeClr val="accent2"/>
+          </a:effectRef>
+          <a:fontRef idx="minor">
+            <a:schemeClr val="tx1"/>
+          </a:fontRef>
+        </p:style>
+      </p:cxnSp>
+      <p:pic>
+        <p:nvPicPr>
+          <p:cNvPr id="36" name="Content Placeholder 8" descr="A close up of a device&#10;&#10;Description generated with high confidence">
+            <a:extLst>
+              <a:ext uri="{FF2B5EF4-FFF2-40B4-BE49-F238E27FC236}">
+                <a16:creationId xmlns:a16="http://schemas.microsoft.com/office/drawing/2014/main" id="{4DCA515B-FF18-4773-879C-D0DA14287EA4}"/>
+              </a:ext>
+            </a:extLst>
+          </p:cNvPr>
+          <p:cNvPicPr>
+            <a:picLocks noChangeAspect="1"/>
+          </p:cNvPicPr>
+          <p:nvPr/>
+        </p:nvPicPr>
+        <p:blipFill>
+          <a:blip r:embed="rId7">
+            <a:extLst>
+              <a:ext uri="{BEBA8EAE-BF5A-486C-A8C5-ECC9F3942E4B}">
+                <a14:imgProps xmlns:a14="http://schemas.microsoft.com/office/drawing/2010/main">
+                  <a14:imgLayer r:embed="rId8">
+                    <a14:imgEffect>
+                      <a14:backgroundRemoval t="10000" b="90000" l="10000" r="90000"/>
+                    </a14:imgEffect>
+                  </a14:imgLayer>
+                </a14:imgProps>
+              </a:ext>
+              <a:ext uri="{28A0092B-C50C-407E-A947-70E740481C1C}">
+                <a14:useLocalDpi xmlns:a14="http://schemas.microsoft.com/office/drawing/2010/main" val="0"/>
+              </a:ext>
+            </a:extLst>
+          </a:blip>
+          <a:stretch>
+            <a:fillRect/>
+          </a:stretch>
+        </p:blipFill>
+        <p:spPr>
+          <a:xfrm>
+            <a:off x="8981084" y="0"/>
+            <a:ext cx="2281867" cy="2002972"/>
+          </a:xfrm>
+          <a:prstGeom prst="rect">
+            <a:avLst/>
+          </a:prstGeom>
+        </p:spPr>
+      </p:pic>
+      <p:cxnSp>
+        <p:nvCxnSpPr>
+          <p:cNvPr id="37" name="Straight Connector 36">
+            <a:extLst>
+              <a:ext uri="{FF2B5EF4-FFF2-40B4-BE49-F238E27FC236}">
+                <a16:creationId xmlns:a16="http://schemas.microsoft.com/office/drawing/2014/main" id="{7A9CC6C6-26AC-4C9B-963B-9C13D9697B44}"/>
+              </a:ext>
+            </a:extLst>
+          </p:cNvPr>
+          <p:cNvCxnSpPr>
+            <a:cxnSpLocks/>
+          </p:cNvCxnSpPr>
+          <p:nvPr/>
+        </p:nvCxnSpPr>
+        <p:spPr>
+          <a:xfrm>
+            <a:off x="10115019" y="2002972"/>
+            <a:ext cx="0" cy="1436914"/>
+          </a:xfrm>
+          <a:prstGeom prst="line">
+            <a:avLst/>
+          </a:prstGeom>
+          <a:ln w="28575">
+            <a:headEnd type="triangle" w="lg" len="lg"/>
+            <a:tailEnd type="triangle" w="lg" len="lg"/>
+          </a:ln>
+        </p:spPr>
+        <p:style>
+          <a:lnRef idx="3">
+            <a:schemeClr val="accent2"/>
+          </a:lnRef>
+          <a:fillRef idx="0">
+            <a:schemeClr val="accent2"/>
+          </a:fillRef>
+          <a:effectRef idx="2">
+            <a:schemeClr val="accent2"/>
+          </a:effectRef>
+          <a:fontRef idx="minor">
+            <a:schemeClr val="tx1"/>
+          </a:fontRef>
+        </p:style>
+      </p:cxnSp>
+      <p:pic>
+        <p:nvPicPr>
+          <p:cNvPr id="33" name="Content Placeholder 5" descr="A circuit board&#10;&#10;Description generated with very high confidence">
+            <a:extLst>
+              <a:ext uri="{FF2B5EF4-FFF2-40B4-BE49-F238E27FC236}">
+                <a16:creationId xmlns:a16="http://schemas.microsoft.com/office/drawing/2014/main" id="{5E97ED60-7D5C-412E-BD73-CA59674ADA15}"/>
+              </a:ext>
+            </a:extLst>
+          </p:cNvPr>
+          <p:cNvPicPr>
+            <a:picLocks noChangeAspect="1"/>
+          </p:cNvPicPr>
+          <p:nvPr/>
+        </p:nvPicPr>
+        <p:blipFill>
+          <a:blip r:embed="rId9">
+            <a:extLst>
+              <a:ext uri="{BEBA8EAE-BF5A-486C-A8C5-ECC9F3942E4B}">
+                <a14:imgProps xmlns:a14="http://schemas.microsoft.com/office/drawing/2010/main">
+                  <a14:imgLayer r:embed="rId10">
+                    <a14:imgEffect>
+                      <a14:backgroundRemoval t="10000" b="90000" l="4600" r="97400">
+                        <a14:foregroundMark x1="94000" y1="54000" x2="94000" y2="54000"/>
+                        <a14:foregroundMark x1="97400" y1="54000" x2="97400" y2="54000"/>
+                        <a14:foregroundMark x1="8600" y1="28000" x2="8600" y2="28000"/>
+                        <a14:foregroundMark x1="4600" y1="40400" x2="4600" y2="40400"/>
+                        <a14:foregroundMark x1="30600" y1="80400" x2="23800" y2="76600"/>
+                        <a14:foregroundMark x1="23800" y1="76600" x2="21600" y2="69200"/>
+                        <a14:foregroundMark x1="21600" y1="69200" x2="21600" y2="68000"/>
+                        <a14:foregroundMark x1="30200" y1="84400" x2="27600" y2="82000"/>
+                      </a14:backgroundRemoval>
+                    </a14:imgEffect>
+                  </a14:imgLayer>
+                </a14:imgProps>
+              </a:ext>
+              <a:ext uri="{28A0092B-C50C-407E-A947-70E740481C1C}">
+                <a14:useLocalDpi xmlns:a14="http://schemas.microsoft.com/office/drawing/2010/main" val="0"/>
+              </a:ext>
+            </a:extLst>
+          </a:blip>
+          <a:stretch>
+            <a:fillRect/>
+          </a:stretch>
+        </p:blipFill>
+        <p:spPr>
+          <a:xfrm flipH="1">
+            <a:off x="3628884" y="4893733"/>
+            <a:ext cx="2154772" cy="2154771"/>
+          </a:xfrm>
+          <a:prstGeom prst="rect">
+            <a:avLst/>
+          </a:prstGeom>
+        </p:spPr>
+      </p:pic>
+      <p:cxnSp>
+        <p:nvCxnSpPr>
+          <p:cNvPr id="40" name="Straight Connector 39">
+            <a:extLst>
+              <a:ext uri="{FF2B5EF4-FFF2-40B4-BE49-F238E27FC236}">
+                <a16:creationId xmlns:a16="http://schemas.microsoft.com/office/drawing/2014/main" id="{3502DCF6-F5E2-4DE3-9B56-35798FF187D8}"/>
+              </a:ext>
+            </a:extLst>
+          </p:cNvPr>
+          <p:cNvCxnSpPr>
+            <a:cxnSpLocks/>
+          </p:cNvCxnSpPr>
+          <p:nvPr/>
+        </p:nvCxnSpPr>
+        <p:spPr>
+          <a:xfrm>
+            <a:off x="5783656" y="7397024"/>
+            <a:ext cx="1440000" cy="1"/>
+          </a:xfrm>
+          <a:prstGeom prst="line">
+            <a:avLst/>
+          </a:prstGeom>
+          <a:ln w="28575">
+            <a:solidFill>
+              <a:srgbClr val="1E64C8"/>
+            </a:solidFill>
+            <a:headEnd type="triangle" w="lg" len="lg"/>
+            <a:tailEnd type="triangle" w="lg" len="lg"/>
+          </a:ln>
+        </p:spPr>
+        <p:style>
+          <a:lnRef idx="3">
+            <a:schemeClr val="accent1"/>
+          </a:lnRef>
+          <a:fillRef idx="0">
+            <a:schemeClr val="accent1"/>
+          </a:fillRef>
+          <a:effectRef idx="2">
+            <a:schemeClr val="accent1"/>
+          </a:effectRef>
+          <a:fontRef idx="minor">
+            <a:schemeClr val="tx1"/>
+          </a:fontRef>
+        </p:style>
+      </p:cxnSp>
+      <p:cxnSp>
+        <p:nvCxnSpPr>
+          <p:cNvPr id="41" name="Straight Connector 40">
+            <a:extLst>
+              <a:ext uri="{FF2B5EF4-FFF2-40B4-BE49-F238E27FC236}">
+                <a16:creationId xmlns:a16="http://schemas.microsoft.com/office/drawing/2014/main" id="{646C3ECD-1E1B-4EA5-888B-0E5F68D9A070}"/>
+              </a:ext>
+            </a:extLst>
+          </p:cNvPr>
+          <p:cNvCxnSpPr>
+            <a:cxnSpLocks/>
+          </p:cNvCxnSpPr>
+          <p:nvPr/>
+        </p:nvCxnSpPr>
+        <p:spPr>
+          <a:xfrm>
+            <a:off x="8310100" y="4876800"/>
+            <a:ext cx="0" cy="1440000"/>
+          </a:xfrm>
+          <a:prstGeom prst="line">
+            <a:avLst/>
+          </a:prstGeom>
+          <a:ln w="28575">
+            <a:headEnd type="triangle" w="lg" len="lg"/>
+            <a:tailEnd type="triangle" w="lg" len="lg"/>
+          </a:ln>
+        </p:spPr>
+        <p:style>
+          <a:lnRef idx="3">
+            <a:schemeClr val="accent2"/>
+          </a:lnRef>
+          <a:fillRef idx="0">
+            <a:schemeClr val="accent2"/>
+          </a:fillRef>
+          <a:effectRef idx="2">
+            <a:schemeClr val="accent2"/>
+          </a:effectRef>
+          <a:fontRef idx="minor">
+            <a:schemeClr val="tx1"/>
+          </a:fontRef>
+        </p:style>
+      </p:cxnSp>
+      <p:pic>
+        <p:nvPicPr>
+          <p:cNvPr id="21" name="Content Placeholder 5" descr="A circuit board&#10;&#10;Description generated with very high confidence">
+            <a:extLst>
+              <a:ext uri="{FF2B5EF4-FFF2-40B4-BE49-F238E27FC236}">
+                <a16:creationId xmlns:a16="http://schemas.microsoft.com/office/drawing/2014/main" id="{6D79CF16-C9A0-4673-AA2E-348378FF8194}"/>
+              </a:ext>
+            </a:extLst>
+          </p:cNvPr>
+          <p:cNvPicPr>
+            <a:picLocks noChangeAspect="1"/>
+          </p:cNvPicPr>
+          <p:nvPr/>
+        </p:nvPicPr>
+        <p:blipFill>
+          <a:blip r:embed="rId9">
+            <a:extLst>
+              <a:ext uri="{BEBA8EAE-BF5A-486C-A8C5-ECC9F3942E4B}">
+                <a14:imgProps xmlns:a14="http://schemas.microsoft.com/office/drawing/2010/main">
+                  <a14:imgLayer r:embed="rId10">
+                    <a14:imgEffect>
+                      <a14:backgroundRemoval t="10000" b="90000" l="4600" r="97400">
+                        <a14:foregroundMark x1="94000" y1="54000" x2="94000" y2="54000"/>
+                        <a14:foregroundMark x1="97400" y1="54000" x2="97400" y2="54000"/>
+                        <a14:foregroundMark x1="8600" y1="28000" x2="8600" y2="28000"/>
+                        <a14:foregroundMark x1="4600" y1="40400" x2="4600" y2="40400"/>
+                        <a14:foregroundMark x1="30600" y1="80400" x2="23800" y2="76600"/>
+                        <a14:foregroundMark x1="23800" y1="76600" x2="21600" y2="69200"/>
+                        <a14:foregroundMark x1="21600" y1="69200" x2="21600" y2="68000"/>
+                        <a14:foregroundMark x1="30200" y1="84400" x2="27600" y2="82000"/>
+                      </a14:backgroundRemoval>
+                    </a14:imgEffect>
+                  </a14:imgLayer>
+                </a14:imgProps>
+              </a:ext>
+              <a:ext uri="{28A0092B-C50C-407E-A947-70E740481C1C}">
+                <a14:useLocalDpi xmlns:a14="http://schemas.microsoft.com/office/drawing/2010/main" val="0"/>
+              </a:ext>
+            </a:extLst>
+          </a:blip>
+          <a:stretch>
+            <a:fillRect/>
+          </a:stretch>
+        </p:blipFill>
+        <p:spPr>
+          <a:xfrm flipH="1">
+            <a:off x="7223655" y="6334075"/>
+            <a:ext cx="2890416" cy="2856553"/>
+          </a:xfrm>
+          <a:prstGeom prst="rect">
+            <a:avLst/>
+          </a:prstGeom>
+        </p:spPr>
+      </p:pic>
+      <p:pic>
+        <p:nvPicPr>
+          <p:cNvPr id="20" name="Content Placeholder 5" descr="A circuit board&#10;&#10;Description generated with very high confidence">
+            <a:extLst>
+              <a:ext uri="{FF2B5EF4-FFF2-40B4-BE49-F238E27FC236}">
+                <a16:creationId xmlns:a16="http://schemas.microsoft.com/office/drawing/2014/main" id="{8DE2BD19-D59F-4A31-92EF-1B0D9E9D0FDB}"/>
+              </a:ext>
+            </a:extLst>
+          </p:cNvPr>
+          <p:cNvPicPr>
+            <a:picLocks noChangeAspect="1"/>
+          </p:cNvPicPr>
+          <p:nvPr/>
+        </p:nvPicPr>
+        <p:blipFill>
+          <a:blip r:embed="rId9">
+            <a:extLst>
+              <a:ext uri="{BEBA8EAE-BF5A-486C-A8C5-ECC9F3942E4B}">
+                <a14:imgProps xmlns:a14="http://schemas.microsoft.com/office/drawing/2010/main">
+                  <a14:imgLayer r:embed="rId10">
+                    <a14:imgEffect>
+                      <a14:backgroundRemoval t="10000" b="90000" l="4600" r="97400">
+                        <a14:foregroundMark x1="94000" y1="54000" x2="94000" y2="54000"/>
+                        <a14:foregroundMark x1="97400" y1="54000" x2="97400" y2="54000"/>
+                        <a14:foregroundMark x1="8600" y1="28000" x2="8600" y2="28000"/>
+                        <a14:foregroundMark x1="4600" y1="40400" x2="4600" y2="40400"/>
+                        <a14:foregroundMark x1="30600" y1="80400" x2="23800" y2="76600"/>
+                        <a14:foregroundMark x1="23800" y1="76600" x2="21600" y2="69200"/>
+                        <a14:foregroundMark x1="21600" y1="69200" x2="21600" y2="68000"/>
+                        <a14:foregroundMark x1="30200" y1="84400" x2="27600" y2="82000"/>
+                      </a14:backgroundRemoval>
+                    </a14:imgEffect>
+                  </a14:imgLayer>
+                </a14:imgProps>
+              </a:ext>
+              <a:ext uri="{28A0092B-C50C-407E-A947-70E740481C1C}">
+                <a14:useLocalDpi xmlns:a14="http://schemas.microsoft.com/office/drawing/2010/main" val="0"/>
+              </a:ext>
+            </a:extLst>
+          </a:blip>
+          <a:stretch>
+            <a:fillRect/>
+          </a:stretch>
+        </p:blipFill>
+        <p:spPr>
+          <a:xfrm flipH="1">
+            <a:off x="3641549" y="6333733"/>
+            <a:ext cx="2154772" cy="2154771"/>
+          </a:xfrm>
+          <a:prstGeom prst="rect">
+            <a:avLst/>
+          </a:prstGeom>
+        </p:spPr>
+      </p:pic>
+      <p:pic>
+        <p:nvPicPr>
+          <p:cNvPr id="22" name="Content Placeholder 5" descr="A circuit board&#10;&#10;Description generated with very high confidence">
+            <a:extLst>
+              <a:ext uri="{FF2B5EF4-FFF2-40B4-BE49-F238E27FC236}">
+                <a16:creationId xmlns:a16="http://schemas.microsoft.com/office/drawing/2014/main" id="{ADF143CE-9778-400F-8F41-742E440E5FBF}"/>
+              </a:ext>
+            </a:extLst>
+          </p:cNvPr>
+          <p:cNvPicPr>
+            <a:picLocks noChangeAspect="1"/>
+          </p:cNvPicPr>
+          <p:nvPr/>
+        </p:nvPicPr>
+        <p:blipFill>
+          <a:blip r:embed="rId9">
+            <a:extLst>
+              <a:ext uri="{BEBA8EAE-BF5A-486C-A8C5-ECC9F3942E4B}">
+                <a14:imgProps xmlns:a14="http://schemas.microsoft.com/office/drawing/2010/main">
+                  <a14:imgLayer r:embed="rId10">
+                    <a14:imgEffect>
+                      <a14:backgroundRemoval t="10000" b="90000" l="4600" r="97400">
+                        <a14:foregroundMark x1="94000" y1="54000" x2="94000" y2="54000"/>
+                        <a14:foregroundMark x1="97400" y1="54000" x2="97400" y2="54000"/>
+                        <a14:foregroundMark x1="8600" y1="28000" x2="8600" y2="28000"/>
+                        <a14:foregroundMark x1="4600" y1="40400" x2="4600" y2="40400"/>
+                        <a14:foregroundMark x1="30600" y1="80400" x2="23800" y2="76600"/>
+                        <a14:foregroundMark x1="23800" y1="76600" x2="21600" y2="69200"/>
+                        <a14:foregroundMark x1="21600" y1="69200" x2="21600" y2="68000"/>
+                        <a14:foregroundMark x1="30200" y1="84400" x2="27600" y2="82000"/>
+                      </a14:backgroundRemoval>
+                    </a14:imgEffect>
+                  </a14:imgLayer>
+                </a14:imgProps>
+              </a:ext>
+              <a:ext uri="{28A0092B-C50C-407E-A947-70E740481C1C}">
+                <a14:useLocalDpi xmlns:a14="http://schemas.microsoft.com/office/drawing/2010/main" val="0"/>
+              </a:ext>
+            </a:extLst>
+          </a:blip>
+          <a:stretch>
+            <a:fillRect/>
+          </a:stretch>
+        </p:blipFill>
+        <p:spPr>
+          <a:xfrm flipH="1">
+            <a:off x="3628884" y="7764118"/>
+            <a:ext cx="2154772" cy="2154771"/>
+          </a:xfrm>
+          <a:prstGeom prst="rect">
+            <a:avLst/>
+          </a:prstGeom>
+        </p:spPr>
+      </p:pic>
+      <p:sp>
+        <p:nvSpPr>
+          <p:cNvPr id="26" name="Rectangle 25">
+            <a:extLst>
+              <a:ext uri="{FF2B5EF4-FFF2-40B4-BE49-F238E27FC236}">
+                <a16:creationId xmlns:a16="http://schemas.microsoft.com/office/drawing/2014/main" id="{B98378B0-F384-4BE8-9145-430E57DE03D7}"/>
+              </a:ext>
+            </a:extLst>
+          </p:cNvPr>
+          <p:cNvSpPr/>
+          <p:nvPr/>
+        </p:nvSpPr>
+        <p:spPr>
+          <a:xfrm>
+            <a:off x="11829609" y="4303751"/>
+            <a:ext cx="902811" cy="561885"/>
+          </a:xfrm>
+          <a:prstGeom prst="rect">
+            <a:avLst/>
+          </a:prstGeom>
+        </p:spPr>
+        <p:txBody>
+          <a:bodyPr wrap="none">
+            <a:spAutoFit/>
+          </a:bodyPr>
+          <a:lstStyle/>
+          <a:p>
+            <a:pPr algn="ctr">
+              <a:lnSpc>
+                <a:spcPct val="120000"/>
+              </a:lnSpc>
+            </a:pPr>
+            <a:r>
+              <a:rPr lang="en-US" sz="2800" dirty="0" err="1"/>
+              <a:t>WiFi</a:t>
+            </a:r>
+            <a:endParaRPr lang="en-US" sz="2800" dirty="0"/>
+          </a:p>
+        </p:txBody>
+      </p:sp>
+      <p:sp>
+        <p:nvSpPr>
+          <p:cNvPr id="27" name="TextBox 26">
+            <a:extLst>
+              <a:ext uri="{FF2B5EF4-FFF2-40B4-BE49-F238E27FC236}">
+                <a16:creationId xmlns:a16="http://schemas.microsoft.com/office/drawing/2014/main" id="{069F82B7-3555-4F6A-ABB5-38813CE5FC85}"/>
+              </a:ext>
+            </a:extLst>
+          </p:cNvPr>
+          <p:cNvSpPr txBox="1"/>
+          <p:nvPr/>
+        </p:nvSpPr>
+        <p:spPr>
+          <a:xfrm>
+            <a:off x="6036723" y="6843026"/>
+            <a:ext cx="923714" cy="553998"/>
+          </a:xfrm>
+          <a:prstGeom prst="rect">
+            <a:avLst/>
+          </a:prstGeom>
+          <a:noFill/>
+        </p:spPr>
+        <p:txBody>
+          <a:bodyPr wrap="square" rtlCol="0">
+            <a:spAutoFit/>
+          </a:bodyPr>
+          <a:lstStyle/>
+          <a:p>
+            <a:pPr algn="ctr">
+              <a:lnSpc>
+                <a:spcPct val="120000"/>
+              </a:lnSpc>
+            </a:pPr>
+            <a:r>
+              <a:rPr lang="en-US" sz="2500" dirty="0" err="1"/>
+              <a:t>UWB</a:t>
+            </a:r>
+            <a:endParaRPr lang="en-US" sz="2500" dirty="0"/>
+          </a:p>
+        </p:txBody>
+      </p:sp>
+      <p:sp>
+        <p:nvSpPr>
+          <p:cNvPr id="28" name="TextBox 27">
+            <a:extLst>
+              <a:ext uri="{FF2B5EF4-FFF2-40B4-BE49-F238E27FC236}">
+                <a16:creationId xmlns:a16="http://schemas.microsoft.com/office/drawing/2014/main" id="{1FE4C8C7-54FF-458B-98C0-1F9EBCC334C8}"/>
+              </a:ext>
+            </a:extLst>
+          </p:cNvPr>
+          <p:cNvSpPr txBox="1"/>
+          <p:nvPr/>
+        </p:nvSpPr>
+        <p:spPr>
+          <a:xfrm>
+            <a:off x="7095066" y="5283287"/>
+            <a:ext cx="856655" cy="552868"/>
+          </a:xfrm>
+          <a:prstGeom prst="rect">
+            <a:avLst/>
+          </a:prstGeom>
+          <a:noFill/>
+        </p:spPr>
+        <p:txBody>
+          <a:bodyPr wrap="square" rtlCol="0">
+            <a:spAutoFit/>
+          </a:bodyPr>
+          <a:lstStyle/>
+          <a:p>
+            <a:pPr algn="ctr">
+              <a:lnSpc>
+                <a:spcPct val="120000"/>
+              </a:lnSpc>
+            </a:pPr>
+            <a:r>
+              <a:rPr lang="en-US" sz="2500" dirty="0"/>
+              <a:t>USB</a:t>
+            </a:r>
           </a:p>
         </p:txBody>
       </p:sp>
     </p:spTree>
     <p:extLst>
       <p:ext uri="{BB962C8B-B14F-4D97-AF65-F5344CB8AC3E}">
-        <p14:creationId xmlns:p14="http://schemas.microsoft.com/office/powerpoint/2010/main" val="3856710313"/>
+        <p14:creationId xmlns:p14="http://schemas.microsoft.com/office/powerpoint/2010/main" val="3278986083"/>
       </p:ext>
     </p:extLst>
   </p:cSld>

</xml_diff>

<commit_message>
added code and added text to presentation 1
</commit_message>
<xml_diff>
--- a/Report/Presentatie_1.pptx
+++ b/Report/Presentatie_1.pptx
@@ -221,7 +221,7 @@
           <a:p>
             <a:fld id="{86680C0C-85DF-417F-8238-DB0D15743621}" type="datetimeFigureOut">
               <a:rPr lang="en-GB" smtClean="0"/>
-              <a:t>07/03/2018</a:t>
+              <a:t>08/03/2018</a:t>
             </a:fld>
             <a:endParaRPr lang="en-GB"/>
           </a:p>
@@ -730,6 +730,21 @@
           <a:p>
             <a:r>
               <a:rPr lang="nl-BE" dirty="0"/>
+              <a:t>We hebben ons voor elke taak opgesplitst in een groepjes van 2 personen. Zo kunnen we elkaars mening vragen en daar op inspelen. Elke kleur op de planning heeft dan ook een betekenis.</a:t>
+            </a:r>
+          </a:p>
+          <a:p>
+            <a:r>
+              <a:rPr lang="nl-BE" dirty="0"/>
+              <a:t>Vb. Bram en mezelf geven presentatie 1, dus wij zijn het groenachtige kleur.</a:t>
+            </a:r>
+          </a:p>
+          <a:p>
+            <a:endParaRPr lang="nl-BE" dirty="0"/>
+          </a:p>
+          <a:p>
+            <a:r>
+              <a:rPr lang="nl-BE" dirty="0"/>
               <a:t>Tijdens de eerste 2 weken hebben we de hardware samengesteld en besteld. Die orders worden in de komende week geleverd. Sinds gisteren is onze drone toegekomen en eerder vandaag hebben we die dan ook uitvoerig getest.</a:t>
             </a:r>
           </a:p>
@@ -739,7 +754,22 @@
           <a:p>
             <a:r>
               <a:rPr lang="nl-BE" dirty="0"/>
-              <a:t>Momenteel is het UWB aspect achter de rug en tegen het eind van volgende week moet het hardware-aspect volledig afgerond zijn.</a:t>
+              <a:t>Momenteel is het UWB aspect  ook grotendeels achter de rug en tegen het eind van volgende week moet het hardware-aspect volledig afgerond zijn.</a:t>
+            </a:r>
+          </a:p>
+          <a:p>
+            <a:endParaRPr lang="nl-BE" dirty="0"/>
+          </a:p>
+          <a:p>
+            <a:r>
+              <a:rPr lang="nl-BE" dirty="0"/>
+              <a:t>Het aansturen van de drone is een taak van lange adem en kreeg dan ook het meeste tijd toegekend.</a:t>
+            </a:r>
+          </a:p>
+          <a:p>
+            <a:r>
+              <a:rPr lang="nl-BE" dirty="0"/>
+              <a:t>De full-mesh, waarbij meerdere drones door het magazijn vliegen en onderling communiceren is een uitbreiding, waarvan we nog niet weten of we er ooit toe zullen komen.</a:t>
             </a:r>
           </a:p>
         </p:txBody>
@@ -860,6 +890,64 @@
           <a:p>
             <a:r>
               <a:rPr lang="en-US" dirty="0" err="1"/>
+              <a:t>Ik</a:t>
+            </a:r>
+            <a:r>
+              <a:rPr lang="en-US" dirty="0"/>
+              <a:t> hoop </a:t>
+            </a:r>
+            <a:r>
+              <a:rPr lang="en-US" dirty="0" err="1"/>
+              <a:t>dat</a:t>
+            </a:r>
+            <a:r>
+              <a:rPr lang="en-US" dirty="0"/>
+              <a:t> we u </a:t>
+            </a:r>
+            <a:r>
+              <a:rPr lang="en-US" dirty="0" err="1"/>
+              <a:t>iets</a:t>
+            </a:r>
+            <a:r>
+              <a:rPr lang="en-US" dirty="0"/>
+              <a:t> </a:t>
+            </a:r>
+            <a:r>
+              <a:rPr lang="en-US" dirty="0" err="1"/>
+              <a:t>hebben</a:t>
+            </a:r>
+            <a:r>
+              <a:rPr lang="en-US" dirty="0"/>
+              <a:t> </a:t>
+            </a:r>
+            <a:r>
+              <a:rPr lang="en-US" dirty="0" err="1"/>
+              <a:t>kunnen</a:t>
+            </a:r>
+            <a:r>
+              <a:rPr lang="en-US" dirty="0"/>
+              <a:t> </a:t>
+            </a:r>
+            <a:r>
+              <a:rPr lang="en-US" dirty="0" err="1"/>
+              <a:t>bijbrengen</a:t>
+            </a:r>
+            <a:r>
+              <a:rPr lang="en-US" dirty="0"/>
+              <a:t> over </a:t>
+            </a:r>
+            <a:r>
+              <a:rPr lang="en-US" dirty="0" err="1"/>
+              <a:t>ons</a:t>
+            </a:r>
+            <a:r>
+              <a:rPr lang="en-US" dirty="0"/>
+              <a:t> project.</a:t>
+            </a:r>
+          </a:p>
+          <a:p>
+            <a:r>
+              <a:rPr lang="en-US" dirty="0" err="1"/>
               <a:t>Als</a:t>
             </a:r>
             <a:r>
@@ -2033,7 +2121,7 @@
           <a:p>
             <a:fld id="{5A24147F-ED97-47AF-A1B3-C82A179CF7F3}" type="datetime1">
               <a:rPr lang="nl-NL" smtClean="0"/>
-              <a:t>7-3-2018</a:t>
+              <a:t>8-3-2018</a:t>
             </a:fld>
             <a:endParaRPr lang="en-GB"/>
           </a:p>
@@ -3111,7 +3199,7 @@
           <a:p>
             <a:fld id="{25470885-0B31-4E06-AE71-7E16801F2838}" type="datetime1">
               <a:rPr lang="nl-BE" noProof="0" smtClean="0"/>
-              <a:t>7/03/2018</a:t>
+              <a:t>8/03/2018</a:t>
             </a:fld>
             <a:endParaRPr lang="nl-BE" noProof="0" dirty="0"/>
           </a:p>
@@ -3229,7 +3317,7 @@
           <a:p>
             <a:fld id="{E7410F60-8C93-4C37-B51A-4DDAE36F7E9B}" type="datetime1">
               <a:rPr lang="nl-BE" noProof="0" smtClean="0"/>
-              <a:t>7/03/2018</a:t>
+              <a:t>8/03/2018</a:t>
             </a:fld>
             <a:endParaRPr lang="nl-BE" noProof="0" dirty="0"/>
           </a:p>
@@ -3508,7 +3596,7 @@
           <a:p>
             <a:fld id="{656594B6-17DF-4759-A7A5-128AFEA77F2C}" type="datetime1">
               <a:rPr lang="nl-BE" noProof="0" smtClean="0"/>
-              <a:t>7/03/2018</a:t>
+              <a:t>8/03/2018</a:t>
             </a:fld>
             <a:endParaRPr lang="nl-BE" noProof="0" dirty="0"/>
           </a:p>
@@ -3649,7 +3737,7 @@
           <a:p>
             <a:fld id="{66A81384-1200-4D40-BEF0-3A17A1F906F4}" type="datetime1">
               <a:rPr lang="nl-NL" noProof="0" smtClean="0"/>
-              <a:t>7-3-2018</a:t>
+              <a:t>8-3-2018</a:t>
             </a:fld>
             <a:endParaRPr lang="nl-NL" noProof="0" dirty="0"/>
           </a:p>
@@ -4190,7 +4278,7 @@
           <a:p>
             <a:fld id="{FA870D1A-A3AB-4E9F-892E-C45B5A80FDBF}" type="datetime1">
               <a:rPr lang="nl-BE" noProof="0" smtClean="0"/>
-              <a:t>7/03/2018</a:t>
+              <a:t>8/03/2018</a:t>
             </a:fld>
             <a:endParaRPr lang="nl-BE" noProof="0" dirty="0"/>
           </a:p>
@@ -7402,12 +7490,35 @@
           </a:p>
         </p:txBody>
       </p:sp>
+      <p:sp>
+        <p:nvSpPr>
+          <p:cNvPr id="4" name="Tijdelijke aanduiding voor dianummer 3"/>
+          <p:cNvSpPr>
+            <a:spLocks noGrp="1"/>
+          </p:cNvSpPr>
+          <p:nvPr>
+            <p:ph type="sldNum" sz="quarter" idx="12"/>
+          </p:nvPr>
+        </p:nvSpPr>
+        <p:spPr/>
+        <p:txBody>
+          <a:bodyPr/>
+          <a:lstStyle/>
+          <a:p>
+            <a:fld id="{7AE184E0-0BD4-4705-A12B-9B71DDE63301}" type="slidenum">
+              <a:rPr lang="nl-BE" noProof="0" smtClean="0"/>
+              <a:t>4</a:t>
+            </a:fld>
+            <a:endParaRPr lang="nl-BE" noProof="0" dirty="0"/>
+          </a:p>
+        </p:txBody>
+      </p:sp>
       <p:pic>
         <p:nvPicPr>
-          <p:cNvPr id="8" name="Content Placeholder 7" descr="A picture containing fence, warehouse, indoor, floor&#10;&#10;Description generated with very high confidence">
+          <p:cNvPr id="10" name="Content Placeholder 9" descr="A large room&#10;&#10;Description generated with high confidence">
             <a:extLst>
               <a:ext uri="{FF2B5EF4-FFF2-40B4-BE49-F238E27FC236}">
-                <a16:creationId xmlns:a16="http://schemas.microsoft.com/office/drawing/2014/main" id="{6E5AD5FB-4101-4963-B765-86997C982E62}"/>
+                <a16:creationId xmlns:a16="http://schemas.microsoft.com/office/drawing/2014/main" id="{CB18B540-A7A0-45B7-B302-B92E6367E279}"/>
               </a:ext>
             </a:extLst>
           </p:cNvPr>
@@ -7432,34 +7543,11 @@
         </p:blipFill>
         <p:spPr>
           <a:xfrm>
-            <a:off x="4005118" y="1613130"/>
-            <a:ext cx="10015682" cy="6722161"/>
+            <a:off x="3807091" y="1230116"/>
+            <a:ext cx="9724491" cy="7293368"/>
           </a:xfrm>
         </p:spPr>
       </p:pic>
-      <p:sp>
-        <p:nvSpPr>
-          <p:cNvPr id="4" name="Tijdelijke aanduiding voor dianummer 3"/>
-          <p:cNvSpPr>
-            <a:spLocks noGrp="1"/>
-          </p:cNvSpPr>
-          <p:nvPr>
-            <p:ph type="sldNum" sz="quarter" idx="12"/>
-          </p:nvPr>
-        </p:nvSpPr>
-        <p:spPr/>
-        <p:txBody>
-          <a:bodyPr/>
-          <a:lstStyle/>
-          <a:p>
-            <a:fld id="{7AE184E0-0BD4-4705-A12B-9B71DDE63301}" type="slidenum">
-              <a:rPr lang="nl-BE" noProof="0" smtClean="0"/>
-              <a:t>4</a:t>
-            </a:fld>
-            <a:endParaRPr lang="nl-BE" noProof="0" dirty="0"/>
-          </a:p>
-        </p:txBody>
-      </p:sp>
     </p:spTree>
     <p:extLst>
       <p:ext uri="{BB962C8B-B14F-4D97-AF65-F5344CB8AC3E}">
@@ -8430,7 +8518,7 @@
           <a:p>
             <a:r>
               <a:rPr lang="nl-BE" dirty="0"/>
-              <a:t>Localisatie</a:t>
+              <a:t>Lokalisatie</a:t>
             </a:r>
           </a:p>
         </p:txBody>
@@ -10002,6 +10090,46 @@
               <a:rPr lang="en-US" sz="2500" dirty="0"/>
               <a:t>USB</a:t>
             </a:r>
+          </a:p>
+        </p:txBody>
+      </p:sp>
+      <p:sp>
+        <p:nvSpPr>
+          <p:cNvPr id="23" name="Rectangle 22">
+            <a:extLst>
+              <a:ext uri="{FF2B5EF4-FFF2-40B4-BE49-F238E27FC236}">
+                <a16:creationId xmlns:a16="http://schemas.microsoft.com/office/drawing/2014/main" id="{12D42B44-5C4F-49F5-8EFE-9A5058CD755F}"/>
+              </a:ext>
+            </a:extLst>
+          </p:cNvPr>
+          <p:cNvSpPr/>
+          <p:nvPr/>
+        </p:nvSpPr>
+        <p:spPr>
+          <a:xfrm>
+            <a:off x="6124250" y="2134188"/>
+            <a:ext cx="902811" cy="561885"/>
+          </a:xfrm>
+          <a:prstGeom prst="rect">
+            <a:avLst/>
+          </a:prstGeom>
+        </p:spPr>
+        <p:txBody>
+          <a:bodyPr wrap="none">
+            <a:spAutoFit/>
+          </a:bodyPr>
+          <a:lstStyle/>
+          <a:p>
+            <a:pPr algn="ctr">
+              <a:lnSpc>
+                <a:spcPct val="120000"/>
+              </a:lnSpc>
+            </a:pPr>
+            <a:r>
+              <a:rPr lang="en-US" sz="2800" dirty="0" err="1"/>
+              <a:t>WiFi</a:t>
+            </a:r>
+            <a:endParaRPr lang="en-US" sz="2800" dirty="0"/>
           </a:p>
         </p:txBody>
       </p:sp>

</xml_diff>

<commit_message>
final text added to Presentation 1
</commit_message>
<xml_diff>
--- a/Report/Presentatie_1.pptx
+++ b/Report/Presentatie_1.pptx
@@ -533,7 +533,220 @@
           <a:bodyPr/>
           <a:lstStyle/>
           <a:p>
-            <a:endParaRPr lang="en-GB"/>
+            <a:r>
+              <a:rPr lang="en-US" dirty="0"/>
+              <a:t>Goede </a:t>
+            </a:r>
+            <a:r>
+              <a:rPr lang="en-US" dirty="0" err="1"/>
+              <a:t>middag</a:t>
+            </a:r>
+            <a:r>
+              <a:rPr lang="en-US" dirty="0"/>
+              <a:t> </a:t>
+            </a:r>
+            <a:r>
+              <a:rPr lang="en-US" dirty="0" err="1"/>
+              <a:t>iedereen</a:t>
+            </a:r>
+            <a:r>
+              <a:rPr lang="en-US" dirty="0"/>
+              <a:t>.</a:t>
+            </a:r>
+          </a:p>
+          <a:p>
+            <a:r>
+              <a:rPr lang="en-US" dirty="0" err="1"/>
+              <a:t>Wij</a:t>
+            </a:r>
+            <a:r>
+              <a:rPr lang="en-US" dirty="0"/>
+              <a:t> </a:t>
+            </a:r>
+            <a:r>
+              <a:rPr lang="en-US" dirty="0" err="1"/>
+              <a:t>zijn</a:t>
+            </a:r>
+            <a:r>
+              <a:rPr lang="en-US" dirty="0"/>
+              <a:t> </a:t>
+            </a:r>
+            <a:r>
+              <a:rPr lang="en-US" dirty="0" err="1"/>
+              <a:t>groep</a:t>
+            </a:r>
+            <a:r>
+              <a:rPr lang="en-US" dirty="0"/>
+              <a:t> </a:t>
+            </a:r>
+            <a:r>
+              <a:rPr lang="en-US" dirty="0" err="1"/>
+              <a:t>BC10</a:t>
+            </a:r>
+            <a:r>
+              <a:rPr lang="en-US" dirty="0"/>
+              <a:t>.</a:t>
+            </a:r>
+          </a:p>
+          <a:p>
+            <a:endParaRPr lang="en-US" dirty="0"/>
+          </a:p>
+          <a:p>
+            <a:r>
+              <a:rPr lang="en-US" dirty="0" err="1"/>
+              <a:t>Dit</a:t>
+            </a:r>
+            <a:r>
+              <a:rPr lang="en-US" dirty="0"/>
+              <a:t> is Bram </a:t>
+            </a:r>
+            <a:r>
+              <a:rPr lang="en-US" dirty="0" err="1"/>
+              <a:t>en</a:t>
+            </a:r>
+            <a:r>
+              <a:rPr lang="en-US" dirty="0"/>
+              <a:t> </a:t>
+            </a:r>
+            <a:r>
+              <a:rPr lang="en-US" dirty="0" err="1"/>
+              <a:t>ik</a:t>
+            </a:r>
+            <a:r>
+              <a:rPr lang="en-US" dirty="0"/>
+              <a:t> ben Garben.</a:t>
+            </a:r>
+          </a:p>
+          <a:p>
+            <a:r>
+              <a:rPr lang="en-US" dirty="0" err="1"/>
+              <a:t>Samen</a:t>
+            </a:r>
+            <a:r>
+              <a:rPr lang="en-US" dirty="0"/>
+              <a:t> met Xavier  </a:t>
+            </a:r>
+            <a:r>
+              <a:rPr lang="en-US" dirty="0" err="1"/>
+              <a:t>en</a:t>
+            </a:r>
+            <a:r>
+              <a:rPr lang="en-US" dirty="0"/>
+              <a:t> </a:t>
+            </a:r>
+            <a:r>
+              <a:rPr lang="en-US" dirty="0" err="1"/>
+              <a:t>Robbe</a:t>
+            </a:r>
+            <a:r>
+              <a:rPr lang="en-US" dirty="0"/>
+              <a:t> </a:t>
+            </a:r>
+            <a:r>
+              <a:rPr lang="en-US" dirty="0" err="1"/>
+              <a:t>doen</a:t>
+            </a:r>
+            <a:r>
+              <a:rPr lang="en-US" dirty="0"/>
+              <a:t> </a:t>
+            </a:r>
+            <a:r>
+              <a:rPr lang="en-US" dirty="0" err="1"/>
+              <a:t>wij</a:t>
+            </a:r>
+            <a:r>
+              <a:rPr lang="en-US" dirty="0"/>
+              <a:t> het project </a:t>
+            </a:r>
+            <a:r>
+              <a:rPr lang="en-US" dirty="0" err="1"/>
+              <a:t>voorraadbeheer</a:t>
+            </a:r>
+            <a:r>
+              <a:rPr lang="en-US" dirty="0"/>
+              <a:t> in </a:t>
+            </a:r>
+            <a:r>
+              <a:rPr lang="en-US" dirty="0" err="1"/>
+              <a:t>magazijnen</a:t>
+            </a:r>
+            <a:r>
+              <a:rPr lang="en-US" dirty="0"/>
+              <a:t>.</a:t>
+            </a:r>
+          </a:p>
+          <a:p>
+            <a:endParaRPr lang="en-US" dirty="0"/>
+          </a:p>
+          <a:p>
+            <a:r>
+              <a:rPr lang="en-US" dirty="0"/>
+              <a:t>We </a:t>
+            </a:r>
+            <a:r>
+              <a:rPr lang="en-US" dirty="0" err="1"/>
+              <a:t>zullen</a:t>
+            </a:r>
+            <a:r>
+              <a:rPr lang="en-US" dirty="0"/>
+              <a:t> in </a:t>
+            </a:r>
+            <a:r>
+              <a:rPr lang="en-US" dirty="0" err="1"/>
+              <a:t>deze</a:t>
+            </a:r>
+            <a:r>
+              <a:rPr lang="en-US" dirty="0"/>
+              <a:t> </a:t>
+            </a:r>
+            <a:r>
+              <a:rPr lang="en-US" dirty="0" err="1"/>
+              <a:t>presentatie</a:t>
+            </a:r>
+            <a:r>
+              <a:rPr lang="en-US" dirty="0"/>
+              <a:t> de </a:t>
+            </a:r>
+            <a:r>
+              <a:rPr lang="en-US" dirty="0" err="1"/>
+              <a:t>probleemstelling</a:t>
+            </a:r>
+            <a:r>
+              <a:rPr lang="en-US" dirty="0"/>
+              <a:t>, de </a:t>
+            </a:r>
+            <a:r>
+              <a:rPr lang="en-US" dirty="0" err="1"/>
+              <a:t>doelstellingen</a:t>
+            </a:r>
+            <a:r>
+              <a:rPr lang="en-US" dirty="0"/>
+              <a:t>, de </a:t>
+            </a:r>
+            <a:r>
+              <a:rPr lang="en-US" dirty="0" err="1"/>
+              <a:t>ontwerpskeuzes</a:t>
+            </a:r>
+            <a:r>
+              <a:rPr lang="en-US" dirty="0"/>
+              <a:t> </a:t>
+            </a:r>
+            <a:r>
+              <a:rPr lang="en-US" dirty="0" err="1"/>
+              <a:t>en</a:t>
+            </a:r>
+            <a:r>
+              <a:rPr lang="en-US" dirty="0"/>
+              <a:t> de planning </a:t>
+            </a:r>
+            <a:r>
+              <a:rPr lang="en-US" dirty="0" err="1"/>
+              <a:t>behandelen</a:t>
+            </a:r>
+            <a:r>
+              <a:rPr lang="en-US" dirty="0"/>
+              <a:t>.</a:t>
+            </a:r>
           </a:p>
         </p:txBody>
       </p:sp>
@@ -554,7 +767,7 @@
           <a:p>
             <a:fld id="{539A0A48-EDB1-4AFE-B1B7-10CE2A416496}" type="slidenum">
               <a:rPr lang="en-GB" smtClean="0"/>
-              <a:t>3</a:t>
+              <a:t>2</a:t>
             </a:fld>
             <a:endParaRPr lang="en-GB"/>
           </a:p>
@@ -563,7 +776,7 @@
     </p:spTree>
     <p:extLst>
       <p:ext uri="{BB962C8B-B14F-4D97-AF65-F5344CB8AC3E}">
-        <p14:creationId xmlns:p14="http://schemas.microsoft.com/office/powerpoint/2010/main" val="3871061518"/>
+        <p14:creationId xmlns:p14="http://schemas.microsoft.com/office/powerpoint/2010/main" val="1445879388"/>
       </p:ext>
     </p:extLst>
   </p:cSld>
@@ -592,7 +805,7 @@
       </p:grpSpPr>
       <p:sp>
         <p:nvSpPr>
-          <p:cNvPr id="2" name="Slide Image Placeholder 1"/>
+          <p:cNvPr id="2" name="Tijdelijke aanduiding voor dia-afbeelding 1"/>
           <p:cNvSpPr>
             <a:spLocks noGrp="1" noRot="1" noChangeAspect="1"/>
           </p:cNvSpPr>
@@ -604,7 +817,7 @@
       </p:sp>
       <p:sp>
         <p:nvSpPr>
-          <p:cNvPr id="3" name="Notes Placeholder 2"/>
+          <p:cNvPr id="3" name="Tijdelijke aanduiding voor notities 2"/>
           <p:cNvSpPr>
             <a:spLocks noGrp="1"/>
           </p:cNvSpPr>
@@ -617,13 +830,31 @@
           <a:bodyPr/>
           <a:lstStyle/>
           <a:p>
-            <a:endParaRPr lang="en-GB" dirty="0"/>
-          </a:p>
-        </p:txBody>
-      </p:sp>
-      <p:sp>
-        <p:nvSpPr>
-          <p:cNvPr id="4" name="Slide Number Placeholder 3"/>
+            <a:r>
+              <a:rPr lang="nl-BE" dirty="0">
+                <a:sym typeface="Wingdings" pitchFamily="2" charset="2"/>
+              </a:rPr>
+              <a:t>Drone aansturen via Raspberry </a:t>
+            </a:r>
+          </a:p>
+          <a:p>
+            <a:endParaRPr lang="nl-BE" dirty="0">
+              <a:sym typeface="Wingdings" pitchFamily="2" charset="2"/>
+            </a:endParaRPr>
+          </a:p>
+          <a:p>
+            <a:endParaRPr lang="nl-BE" dirty="0">
+              <a:sym typeface="Wingdings" pitchFamily="2" charset="2"/>
+            </a:endParaRPr>
+          </a:p>
+          <a:p>
+            <a:endParaRPr lang="nl-BE" dirty="0"/>
+          </a:p>
+        </p:txBody>
+      </p:sp>
+      <p:sp>
+        <p:nvSpPr>
+          <p:cNvPr id="4" name="Tijdelijke aanduiding voor dianummer 3"/>
           <p:cNvSpPr>
             <a:spLocks noGrp="1"/>
           </p:cNvSpPr>
@@ -638,7 +869,7 @@
           <a:p>
             <a:fld id="{539A0A48-EDB1-4AFE-B1B7-10CE2A416496}" type="slidenum">
               <a:rPr lang="en-GB" smtClean="0"/>
-              <a:t>12</a:t>
+              <a:t>11</a:t>
             </a:fld>
             <a:endParaRPr lang="en-GB"/>
           </a:p>
@@ -647,7 +878,7 @@
     </p:spTree>
     <p:extLst>
       <p:ext uri="{BB962C8B-B14F-4D97-AF65-F5344CB8AC3E}">
-        <p14:creationId xmlns:p14="http://schemas.microsoft.com/office/powerpoint/2010/main" val="3237113512"/>
+        <p14:creationId xmlns:p14="http://schemas.microsoft.com/office/powerpoint/2010/main" val="1259480818"/>
       </p:ext>
     </p:extLst>
   </p:cSld>
@@ -676,7 +907,7 @@
       </p:grpSpPr>
       <p:sp>
         <p:nvSpPr>
-          <p:cNvPr id="2" name="Tijdelijke aanduiding voor dia-afbeelding 1"/>
+          <p:cNvPr id="2" name="Slide Image Placeholder 1"/>
           <p:cNvSpPr>
             <a:spLocks noGrp="1" noRot="1" noChangeAspect="1"/>
           </p:cNvSpPr>
@@ -688,7 +919,7 @@
       </p:sp>
       <p:sp>
         <p:nvSpPr>
-          <p:cNvPr id="3" name="Tijdelijke aanduiding voor notities 2"/>
+          <p:cNvPr id="3" name="Notes Placeholder 2"/>
           <p:cNvSpPr>
             <a:spLocks noGrp="1"/>
           </p:cNvSpPr>
@@ -702,81 +933,39 @@
           <a:lstStyle/>
           <a:p>
             <a:r>
-              <a:rPr lang="nl-BE" dirty="0"/>
-              <a:t>Tot slot geven we u nog de initiële planning mee.</a:t>
-            </a:r>
-          </a:p>
-          <a:p>
-            <a:endParaRPr lang="nl-BE" dirty="0"/>
-          </a:p>
-          <a:p>
-            <a:r>
-              <a:rPr lang="nl-BE" dirty="0"/>
-              <a:t>De planning is opgedeeld in 13 weken, nl. de 12 lesweken en de inhaalweek.</a:t>
-            </a:r>
-          </a:p>
-          <a:p>
-            <a:endParaRPr lang="nl-BE" dirty="0"/>
-          </a:p>
-          <a:p>
-            <a:r>
-              <a:rPr lang="nl-BE" dirty="0"/>
-              <a:t>In het begin focussen we op de hardware en vervolgens krijgt het software-aspect de aandacht.</a:t>
-            </a:r>
-          </a:p>
-          <a:p>
-            <a:endParaRPr lang="nl-BE" dirty="0"/>
-          </a:p>
-          <a:p>
-            <a:r>
-              <a:rPr lang="nl-BE" dirty="0"/>
-              <a:t>We hebben ons voor elke taak opgesplitst in een groepjes van 2 personen. Zo kunnen we elkaars mening vragen en daar op inspelen. Elke kleur op de planning heeft dan ook een betekenis.</a:t>
-            </a:r>
-          </a:p>
-          <a:p>
-            <a:r>
-              <a:rPr lang="nl-BE" dirty="0"/>
-              <a:t>Vb. Bram en mezelf geven presentatie 1, dus wij zijn het groenachtige kleur.</a:t>
-            </a:r>
-          </a:p>
-          <a:p>
-            <a:endParaRPr lang="nl-BE" dirty="0"/>
-          </a:p>
-          <a:p>
-            <a:r>
-              <a:rPr lang="nl-BE" dirty="0"/>
-              <a:t>Tijdens de eerste 2 weken hebben we de hardware samengesteld en besteld. Die orders worden in de komende week geleverd. Sinds gisteren is onze drone toegekomen en eerder vandaag hebben we die dan ook uitvoerig getest.</a:t>
-            </a:r>
-          </a:p>
-          <a:p>
-            <a:endParaRPr lang="nl-BE" dirty="0"/>
-          </a:p>
-          <a:p>
-            <a:r>
-              <a:rPr lang="nl-BE" dirty="0"/>
-              <a:t>Momenteel is het UWB aspect  ook grotendeels achter de rug en tegen het eind van volgende week moet het hardware-aspect volledig afgerond zijn.</a:t>
-            </a:r>
-          </a:p>
-          <a:p>
-            <a:endParaRPr lang="nl-BE" dirty="0"/>
-          </a:p>
-          <a:p>
-            <a:r>
-              <a:rPr lang="nl-BE" dirty="0"/>
-              <a:t>Het aansturen van de drone is een taak van lange adem en kreeg dan ook het meeste tijd toegekend.</a:t>
-            </a:r>
-          </a:p>
-          <a:p>
-            <a:r>
-              <a:rPr lang="nl-BE" dirty="0"/>
-              <a:t>De full-mesh, waarbij meerdere drones door het magazijn vliegen en onderling communiceren is een uitbreiding, waarvan we nog niet weten of we er ooit toe zullen komen.</a:t>
-            </a:r>
-          </a:p>
-        </p:txBody>
-      </p:sp>
-      <p:sp>
-        <p:nvSpPr>
-          <p:cNvPr id="4" name="Tijdelijke aanduiding voor dianummer 3"/>
+              <a:rPr lang="en-GB" dirty="0"/>
+              <a:t>Tot slot </a:t>
+            </a:r>
+            <a:r>
+              <a:rPr lang="en-GB" dirty="0" err="1"/>
+              <a:t>bespreken</a:t>
+            </a:r>
+            <a:r>
+              <a:rPr lang="en-GB" dirty="0"/>
+              <a:t> we </a:t>
+            </a:r>
+            <a:r>
+              <a:rPr lang="en-GB" dirty="0" err="1"/>
+              <a:t>nog</a:t>
+            </a:r>
+            <a:r>
+              <a:rPr lang="en-GB" dirty="0"/>
+              <a:t> de </a:t>
+            </a:r>
+            <a:r>
+              <a:rPr lang="en-GB" dirty="0" err="1"/>
+              <a:t>initiële</a:t>
+            </a:r>
+            <a:r>
+              <a:rPr lang="en-GB" dirty="0"/>
+              <a:t> planning.</a:t>
+            </a:r>
+          </a:p>
+        </p:txBody>
+      </p:sp>
+      <p:sp>
+        <p:nvSpPr>
+          <p:cNvPr id="4" name="Slide Number Placeholder 3"/>
           <p:cNvSpPr>
             <a:spLocks noGrp="1"/>
           </p:cNvSpPr>
@@ -791,7 +980,7 @@
           <a:p>
             <a:fld id="{539A0A48-EDB1-4AFE-B1B7-10CE2A416496}" type="slidenum">
               <a:rPr lang="en-GB" smtClean="0"/>
-              <a:t>13</a:t>
+              <a:t>12</a:t>
             </a:fld>
             <a:endParaRPr lang="en-GB"/>
           </a:p>
@@ -800,7 +989,7 @@
     </p:spTree>
     <p:extLst>
       <p:ext uri="{BB962C8B-B14F-4D97-AF65-F5344CB8AC3E}">
-        <p14:creationId xmlns:p14="http://schemas.microsoft.com/office/powerpoint/2010/main" val="2736078886"/>
+        <p14:creationId xmlns:p14="http://schemas.microsoft.com/office/powerpoint/2010/main" val="3237113512"/>
       </p:ext>
     </p:extLst>
   </p:cSld>
@@ -829,7 +1018,7 @@
       </p:grpSpPr>
       <p:sp>
         <p:nvSpPr>
-          <p:cNvPr id="2" name="Slide Image Placeholder 1"/>
+          <p:cNvPr id="2" name="Tijdelijke aanduiding voor dia-afbeelding 1"/>
           <p:cNvSpPr>
             <a:spLocks noGrp="1" noRot="1" noChangeAspect="1"/>
           </p:cNvSpPr>
@@ -841,7 +1030,7 @@
       </p:sp>
       <p:sp>
         <p:nvSpPr>
-          <p:cNvPr id="3" name="Notes Placeholder 2"/>
+          <p:cNvPr id="3" name="Tijdelijke aanduiding voor notities 2"/>
           <p:cNvSpPr>
             <a:spLocks noGrp="1"/>
           </p:cNvSpPr>
@@ -855,6 +1044,174 @@
           <a:lstStyle/>
           <a:p>
             <a:r>
+              <a:rPr lang="nl-BE" dirty="0"/>
+              <a:t>De planning is opgedeeld in 13 weken, nl. de 12 lesweken en de inhaalweek.</a:t>
+            </a:r>
+          </a:p>
+          <a:p>
+            <a:endParaRPr lang="nl-BE" dirty="0"/>
+          </a:p>
+          <a:p>
+            <a:r>
+              <a:rPr lang="nl-BE" dirty="0"/>
+              <a:t>In het begin focussen we op de hardware en vervolgens krijgt het software-aspect de aandacht.</a:t>
+            </a:r>
+          </a:p>
+          <a:p>
+            <a:endParaRPr lang="nl-BE" dirty="0"/>
+          </a:p>
+          <a:p>
+            <a:r>
+              <a:rPr lang="nl-BE" dirty="0"/>
+              <a:t>We hebben ons voor elke taak opgesplitst in een groepjes van 2 personen.</a:t>
+            </a:r>
+          </a:p>
+          <a:p>
+            <a:r>
+              <a:rPr lang="nl-BE" dirty="0"/>
+              <a:t>Zo kunnen we elkaars mening vragen en daar op inspelen.</a:t>
+            </a:r>
+          </a:p>
+          <a:p>
+            <a:r>
+              <a:rPr lang="nl-BE" dirty="0"/>
+              <a:t>Elke kleur op de planning heeft dan ook een betekenis.</a:t>
+            </a:r>
+          </a:p>
+          <a:p>
+            <a:r>
+              <a:rPr lang="nl-BE" dirty="0"/>
+              <a:t>Vb. Bram en mezelf geven Presentatie 1, dus wij zijn het groenachtige kleur.</a:t>
+            </a:r>
+          </a:p>
+          <a:p>
+            <a:endParaRPr lang="nl-BE" dirty="0"/>
+          </a:p>
+          <a:p>
+            <a:r>
+              <a:rPr lang="nl-BE" dirty="0"/>
+              <a:t>Tijdens de eerste 2 weken hebben we de hardware uitgezocht en besteld.</a:t>
+            </a:r>
+          </a:p>
+          <a:p>
+            <a:r>
+              <a:rPr lang="nl-BE" dirty="0"/>
+              <a:t>Die orders worden in de komende week geleverd.</a:t>
+            </a:r>
+          </a:p>
+          <a:p>
+            <a:r>
+              <a:rPr lang="nl-BE" dirty="0"/>
+              <a:t>Sinds gisteren is onze drone toegekomen en eerder vandaag hebben we die dan ook uitvoerig getest.</a:t>
+            </a:r>
+          </a:p>
+          <a:p>
+            <a:endParaRPr lang="nl-BE" dirty="0"/>
+          </a:p>
+          <a:p>
+            <a:r>
+              <a:rPr lang="nl-BE" dirty="0"/>
+              <a:t>Momenteel is het UWB aspect ook grotendeels achter de rug en tegen het eind van volgende week moet het hardware-aspect volledig afgerond zijn.</a:t>
+            </a:r>
+          </a:p>
+          <a:p>
+            <a:endParaRPr lang="nl-BE" dirty="0"/>
+          </a:p>
+          <a:p>
+            <a:r>
+              <a:rPr lang="nl-BE" dirty="0"/>
+              <a:t>Het aansturen van de drone is een taak van lange adem en kreeg dan ook het meeste tijd toegekend.</a:t>
+            </a:r>
+          </a:p>
+          <a:p>
+            <a:r>
+              <a:rPr lang="nl-BE" dirty="0"/>
+              <a:t>De full-mesh, waarbij meerdere drones door het magazijn vliegen en onderling communiceren is een uitbreiding, waarvan we nog niet weten of we er ooit toe zullen komen.</a:t>
+            </a:r>
+          </a:p>
+        </p:txBody>
+      </p:sp>
+      <p:sp>
+        <p:nvSpPr>
+          <p:cNvPr id="4" name="Tijdelijke aanduiding voor dianummer 3"/>
+          <p:cNvSpPr>
+            <a:spLocks noGrp="1"/>
+          </p:cNvSpPr>
+          <p:nvPr>
+            <p:ph type="sldNum" sz="quarter" idx="10"/>
+          </p:nvPr>
+        </p:nvSpPr>
+        <p:spPr/>
+        <p:txBody>
+          <a:bodyPr/>
+          <a:lstStyle/>
+          <a:p>
+            <a:fld id="{539A0A48-EDB1-4AFE-B1B7-10CE2A416496}" type="slidenum">
+              <a:rPr lang="en-GB" smtClean="0"/>
+              <a:t>13</a:t>
+            </a:fld>
+            <a:endParaRPr lang="en-GB"/>
+          </a:p>
+        </p:txBody>
+      </p:sp>
+    </p:spTree>
+    <p:extLst>
+      <p:ext uri="{BB962C8B-B14F-4D97-AF65-F5344CB8AC3E}">
+        <p14:creationId xmlns:p14="http://schemas.microsoft.com/office/powerpoint/2010/main" val="2736078886"/>
+      </p:ext>
+    </p:extLst>
+  </p:cSld>
+  <p:clrMapOvr>
+    <a:masterClrMapping/>
+  </p:clrMapOvr>
+</p:notes>
+</file>
+
+<file path=ppt/notesSlides/notesSlide13.xml><?xml version="1.0" encoding="utf-8"?>
+<p:notes xmlns:a="http://schemas.openxmlformats.org/drawingml/2006/main" xmlns:r="http://schemas.openxmlformats.org/officeDocument/2006/relationships" xmlns:p="http://schemas.openxmlformats.org/presentationml/2006/main">
+  <p:cSld>
+    <p:spTree>
+      <p:nvGrpSpPr>
+        <p:cNvPr id="1" name=""/>
+        <p:cNvGrpSpPr/>
+        <p:nvPr/>
+      </p:nvGrpSpPr>
+      <p:grpSpPr>
+        <a:xfrm>
+          <a:off x="0" y="0"/>
+          <a:ext cx="0" cy="0"/>
+          <a:chOff x="0" y="0"/>
+          <a:chExt cx="0" cy="0"/>
+        </a:xfrm>
+      </p:grpSpPr>
+      <p:sp>
+        <p:nvSpPr>
+          <p:cNvPr id="2" name="Slide Image Placeholder 1"/>
+          <p:cNvSpPr>
+            <a:spLocks noGrp="1" noRot="1" noChangeAspect="1"/>
+          </p:cNvSpPr>
+          <p:nvPr>
+            <p:ph type="sldImg"/>
+          </p:nvPr>
+        </p:nvSpPr>
+        <p:spPr/>
+      </p:sp>
+      <p:sp>
+        <p:nvSpPr>
+          <p:cNvPr id="3" name="Notes Placeholder 2"/>
+          <p:cNvSpPr>
+            <a:spLocks noGrp="1"/>
+          </p:cNvSpPr>
+          <p:nvPr>
+            <p:ph type="body" idx="1"/>
+          </p:nvPr>
+        </p:nvSpPr>
+        <p:spPr/>
+        <p:txBody>
+          <a:bodyPr/>
+          <a:lstStyle/>
+          <a:p>
+            <a:r>
               <a:rPr lang="en-US" dirty="0" err="1"/>
               <a:t>Bedankt</a:t>
             </a:r>
@@ -888,6 +1245,9 @@
             </a:r>
           </a:p>
           <a:p>
+            <a:endParaRPr lang="en-US" dirty="0"/>
+          </a:p>
+          <a:p>
             <a:r>
               <a:rPr lang="en-US" dirty="0" err="1"/>
               <a:t>Ik</a:t>
@@ -944,6 +1304,9 @@
               <a:rPr lang="en-US" dirty="0"/>
               <a:t> project.</a:t>
             </a:r>
+          </a:p>
+          <a:p>
+            <a:endParaRPr lang="en-US" dirty="0"/>
           </a:p>
           <a:p>
             <a:r>
@@ -1068,7 +1431,7 @@
       </p:grpSpPr>
       <p:sp>
         <p:nvSpPr>
-          <p:cNvPr id="2" name="Tijdelijke aanduiding voor dia-afbeelding 1"/>
+          <p:cNvPr id="2" name="Slide Image Placeholder 1"/>
           <p:cNvSpPr>
             <a:spLocks noGrp="1" noRot="1" noChangeAspect="1"/>
           </p:cNvSpPr>
@@ -1080,7 +1443,7 @@
       </p:sp>
       <p:sp>
         <p:nvSpPr>
-          <p:cNvPr id="3" name="Tijdelijke aanduiding voor notities 2"/>
+          <p:cNvPr id="3" name="Notes Placeholder 2"/>
           <p:cNvSpPr>
             <a:spLocks noGrp="1"/>
           </p:cNvSpPr>
@@ -1094,62 +1457,40 @@
           <a:lstStyle/>
           <a:p>
             <a:r>
-              <a:rPr lang="nl-BE" dirty="0"/>
-              <a:t>Voorraden beheren in een magazijn.</a:t>
-            </a:r>
-          </a:p>
-          <a:p>
-            <a:r>
-              <a:rPr lang="nl-BE" dirty="0"/>
-              <a:t>Nu handmatig barcodes scannen </a:t>
-            </a:r>
-            <a:r>
-              <a:rPr lang="nl-BE" dirty="0">
-                <a:sym typeface="Wingdings" pitchFamily="2" charset="2"/>
-              </a:rPr>
-              <a:t> traag, duur en gevaarlijk</a:t>
-            </a:r>
-          </a:p>
-          <a:p>
-            <a:endParaRPr lang="nl-BE" dirty="0">
-              <a:sym typeface="Wingdings" pitchFamily="2" charset="2"/>
-            </a:endParaRPr>
-          </a:p>
-          <a:p>
-            <a:r>
-              <a:rPr lang="nl-BE" dirty="0">
-                <a:sym typeface="Wingdings" pitchFamily="2" charset="2"/>
-              </a:rPr>
-              <a:t>Oplossing  Automatisch aangestuurde drones die via een camera de barcodes kunnen inscannen</a:t>
-            </a:r>
-          </a:p>
-          <a:p>
-            <a:endParaRPr lang="nl-BE" dirty="0">
-              <a:sym typeface="Wingdings" pitchFamily="2" charset="2"/>
-            </a:endParaRPr>
-          </a:p>
-          <a:p>
-            <a:r>
-              <a:rPr lang="nl-BE" dirty="0">
-                <a:sym typeface="Wingdings" pitchFamily="2" charset="2"/>
-              </a:rPr>
-              <a:t>WIJ  De basis, drone autonoom een vooraf bepaalde route laten vliegen in een magazijn. </a:t>
-            </a:r>
-          </a:p>
-          <a:p>
-            <a:r>
-              <a:rPr lang="nl-BE">
-                <a:sym typeface="Wingdings" pitchFamily="2" charset="2"/>
-              </a:rPr>
-              <a:t>Hierbij moeten we ook in real time de locatie van de drone kennen.</a:t>
-            </a:r>
-            <a:endParaRPr lang="nl-BE" dirty="0"/>
-          </a:p>
-        </p:txBody>
-      </p:sp>
-      <p:sp>
-        <p:nvSpPr>
-          <p:cNvPr id="4" name="Tijdelijke aanduiding voor dianummer 3"/>
+              <a:rPr lang="en-GB" dirty="0" err="1"/>
+              <a:t>Laat</a:t>
+            </a:r>
+            <a:r>
+              <a:rPr lang="en-GB" dirty="0"/>
+              <a:t> </a:t>
+            </a:r>
+            <a:r>
+              <a:rPr lang="en-GB" dirty="0" err="1"/>
+              <a:t>ons</a:t>
+            </a:r>
+            <a:r>
+              <a:rPr lang="en-GB" dirty="0"/>
+              <a:t> </a:t>
+            </a:r>
+            <a:r>
+              <a:rPr lang="en-GB" dirty="0" err="1"/>
+              <a:t>beginnen</a:t>
+            </a:r>
+            <a:r>
+              <a:rPr lang="en-GB" dirty="0"/>
+              <a:t> met de </a:t>
+            </a:r>
+            <a:r>
+              <a:rPr lang="en-GB" dirty="0" err="1"/>
+              <a:t>probleemanalyse</a:t>
+            </a:r>
+            <a:endParaRPr lang="en-GB" dirty="0"/>
+          </a:p>
+        </p:txBody>
+      </p:sp>
+      <p:sp>
+        <p:nvSpPr>
+          <p:cNvPr id="4" name="Slide Number Placeholder 3"/>
           <p:cNvSpPr>
             <a:spLocks noGrp="1"/>
           </p:cNvSpPr>
@@ -1164,7 +1505,7 @@
           <a:p>
             <a:fld id="{539A0A48-EDB1-4AFE-B1B7-10CE2A416496}" type="slidenum">
               <a:rPr lang="en-GB" smtClean="0"/>
-              <a:t>4</a:t>
+              <a:t>3</a:t>
             </a:fld>
             <a:endParaRPr lang="en-GB"/>
           </a:p>
@@ -1173,7 +1514,7 @@
     </p:spTree>
     <p:extLst>
       <p:ext uri="{BB962C8B-B14F-4D97-AF65-F5344CB8AC3E}">
-        <p14:creationId xmlns:p14="http://schemas.microsoft.com/office/powerpoint/2010/main" val="2541877905"/>
+        <p14:creationId xmlns:p14="http://schemas.microsoft.com/office/powerpoint/2010/main" val="3871061518"/>
       </p:ext>
     </p:extLst>
   </p:cSld>
@@ -1202,7 +1543,7 @@
       </p:grpSpPr>
       <p:sp>
         <p:nvSpPr>
-          <p:cNvPr id="2" name="Slide Image Placeholder 1"/>
+          <p:cNvPr id="2" name="Tijdelijke aanduiding voor dia-afbeelding 1"/>
           <p:cNvSpPr>
             <a:spLocks noGrp="1" noRot="1" noChangeAspect="1"/>
           </p:cNvSpPr>
@@ -1214,7 +1555,7 @@
       </p:sp>
       <p:sp>
         <p:nvSpPr>
-          <p:cNvPr id="3" name="Notes Placeholder 2"/>
+          <p:cNvPr id="3" name="Tijdelijke aanduiding voor notities 2"/>
           <p:cNvSpPr>
             <a:spLocks noGrp="1"/>
           </p:cNvSpPr>
@@ -1227,13 +1568,63 @@
           <a:bodyPr/>
           <a:lstStyle/>
           <a:p>
-            <a:endParaRPr lang="en-GB"/>
-          </a:p>
-        </p:txBody>
-      </p:sp>
-      <p:sp>
-        <p:nvSpPr>
-          <p:cNvPr id="4" name="Slide Number Placeholder 3"/>
+            <a:r>
+              <a:rPr lang="nl-BE" dirty="0"/>
+              <a:t>Voorraadbeheer in magazijnen gebeurt tegenwoordig vaak door werknemers die op de rekken of op een vorklift kruipen om handmatig barcodes in te scannen.</a:t>
+            </a:r>
+          </a:p>
+          <a:p>
+            <a:r>
+              <a:rPr lang="nl-BE" dirty="0"/>
+              <a:t>Dat is </a:t>
+            </a:r>
+            <a:r>
+              <a:rPr lang="nl-BE" dirty="0">
+                <a:sym typeface="Wingdings" pitchFamily="2" charset="2"/>
+              </a:rPr>
+              <a:t>traag, duur en vooral levensgevaarlijk.</a:t>
+            </a:r>
+          </a:p>
+          <a:p>
+            <a:endParaRPr lang="nl-BE" dirty="0">
+              <a:sym typeface="Wingdings" pitchFamily="2" charset="2"/>
+            </a:endParaRPr>
+          </a:p>
+          <a:p>
+            <a:r>
+              <a:rPr lang="nl-BE" dirty="0">
+                <a:sym typeface="Wingdings" pitchFamily="2" charset="2"/>
+              </a:rPr>
+              <a:t>Oplossing  Automatisch aangestuurde drones die via een camera de barcodes kunnen inscannen</a:t>
+            </a:r>
+          </a:p>
+          <a:p>
+            <a:endParaRPr lang="nl-BE" dirty="0">
+              <a:sym typeface="Wingdings" pitchFamily="2" charset="2"/>
+            </a:endParaRPr>
+          </a:p>
+          <a:p>
+            <a:r>
+              <a:rPr lang="nl-BE" dirty="0">
+                <a:sym typeface="Wingdings" pitchFamily="2" charset="2"/>
+              </a:rPr>
+              <a:t>WIJ  De basis, drone autonoom een vooraf bepaalde route laten vliegen in een magazijn. </a:t>
+            </a:r>
+          </a:p>
+          <a:p>
+            <a:r>
+              <a:rPr lang="nl-BE" dirty="0">
+                <a:sym typeface="Wingdings" pitchFamily="2" charset="2"/>
+              </a:rPr>
+              <a:t>Hierbij moeten we ook in real time de locatie van de drone kennen.</a:t>
+            </a:r>
+            <a:endParaRPr lang="nl-BE" dirty="0"/>
+          </a:p>
+        </p:txBody>
+      </p:sp>
+      <p:sp>
+        <p:nvSpPr>
+          <p:cNvPr id="4" name="Tijdelijke aanduiding voor dianummer 3"/>
           <p:cNvSpPr>
             <a:spLocks noGrp="1"/>
           </p:cNvSpPr>
@@ -1248,7 +1639,7 @@
           <a:p>
             <a:fld id="{539A0A48-EDB1-4AFE-B1B7-10CE2A416496}" type="slidenum">
               <a:rPr lang="en-GB" smtClean="0"/>
-              <a:t>5</a:t>
+              <a:t>4</a:t>
             </a:fld>
             <a:endParaRPr lang="en-GB"/>
           </a:p>
@@ -1257,7 +1648,7 @@
     </p:spTree>
     <p:extLst>
       <p:ext uri="{BB962C8B-B14F-4D97-AF65-F5344CB8AC3E}">
-        <p14:creationId xmlns:p14="http://schemas.microsoft.com/office/powerpoint/2010/main" val="847193591"/>
+        <p14:creationId xmlns:p14="http://schemas.microsoft.com/office/powerpoint/2010/main" val="2541877905"/>
       </p:ext>
     </p:extLst>
   </p:cSld>
@@ -1286,7 +1677,7 @@
       </p:grpSpPr>
       <p:sp>
         <p:nvSpPr>
-          <p:cNvPr id="2" name="Tijdelijke aanduiding voor dia-afbeelding 1"/>
+          <p:cNvPr id="2" name="Slide Image Placeholder 1"/>
           <p:cNvSpPr>
             <a:spLocks noGrp="1" noRot="1" noChangeAspect="1"/>
           </p:cNvSpPr>
@@ -1298,7 +1689,7 @@
       </p:sp>
       <p:sp>
         <p:nvSpPr>
-          <p:cNvPr id="3" name="Tijdelijke aanduiding voor notities 2"/>
+          <p:cNvPr id="3" name="Notes Placeholder 2"/>
           <p:cNvSpPr>
             <a:spLocks noGrp="1"/>
           </p:cNvSpPr>
@@ -1312,104 +1703,32 @@
           <a:lstStyle/>
           <a:p>
             <a:r>
-              <a:rPr lang="nl-BE" dirty="0"/>
-              <a:t>Project samengevat op één dia</a:t>
-            </a:r>
-          </a:p>
-          <a:p>
-            <a:endParaRPr lang="nl-BE" dirty="0"/>
-          </a:p>
-          <a:p>
-            <a:r>
-              <a:rPr lang="nl-BE" dirty="0"/>
-              <a:t>Drone </a:t>
-            </a:r>
-          </a:p>
-          <a:p>
-            <a:r>
-              <a:rPr lang="nl-BE" dirty="0"/>
-              <a:t>Raspberry Pi Zero W </a:t>
-            </a:r>
-            <a:r>
-              <a:rPr lang="nl-BE" dirty="0">
-                <a:sym typeface="Wingdings" pitchFamily="2" charset="2"/>
-              </a:rPr>
-              <a:t> De controller, kleine computer</a:t>
-            </a:r>
-            <a:endParaRPr lang="nl-BE" dirty="0"/>
-          </a:p>
-          <a:p>
-            <a:r>
-              <a:rPr lang="nl-BE" dirty="0"/>
-              <a:t>LiPo Batterij </a:t>
-            </a:r>
-            <a:r>
-              <a:rPr lang="nl-BE" dirty="0">
-                <a:sym typeface="Wingdings" pitchFamily="2" charset="2"/>
-              </a:rPr>
-              <a:t> De controller van stroom voorzien</a:t>
-            </a:r>
-            <a:endParaRPr lang="nl-BE" dirty="0"/>
-          </a:p>
-          <a:p>
-            <a:r>
-              <a:rPr lang="nl-BE" dirty="0"/>
-              <a:t>MQTT Server </a:t>
-            </a:r>
-            <a:r>
-              <a:rPr lang="nl-BE" dirty="0">
-                <a:sym typeface="Wingdings" pitchFamily="2" charset="2"/>
-              </a:rPr>
-              <a:t> Komt later aan bod</a:t>
-            </a:r>
-            <a:endParaRPr lang="nl-BE" dirty="0"/>
-          </a:p>
-          <a:p>
-            <a:endParaRPr lang="nl-BE" dirty="0"/>
-          </a:p>
-          <a:p>
-            <a:r>
-              <a:rPr lang="nl-BE" dirty="0"/>
-              <a:t>Bram: </a:t>
-            </a:r>
-          </a:p>
-          <a:p>
-            <a:r>
-              <a:rPr lang="nl-BE" dirty="0"/>
-              <a:t>Pozyx tags en anchers </a:t>
-            </a:r>
-          </a:p>
-          <a:p>
-            <a:r>
-              <a:rPr lang="nl-BE" dirty="0"/>
-              <a:t>Theorie: Exact een route aan de drone meegeven vanaf een gekende locatie</a:t>
-            </a:r>
-          </a:p>
-          <a:p>
-            <a:r>
-              <a:rPr lang="nl-BE" dirty="0"/>
-              <a:t>Praktijk: Onhaalbaar </a:t>
-            </a:r>
-            <a:r>
-              <a:rPr lang="nl-BE" dirty="0">
-                <a:sym typeface="Wingdings" pitchFamily="2" charset="2"/>
-              </a:rPr>
-              <a:t> Ongekende obstakels, een ventilatieschacht etc.</a:t>
-            </a:r>
-          </a:p>
-          <a:p>
-            <a:r>
-              <a:rPr lang="nl-BE" dirty="0">
-                <a:sym typeface="Wingdings" pitchFamily="2" charset="2"/>
-              </a:rPr>
-              <a:t>Locatie is belangrijk</a:t>
-            </a:r>
-          </a:p>
-        </p:txBody>
-      </p:sp>
-      <p:sp>
-        <p:nvSpPr>
-          <p:cNvPr id="4" name="Tijdelijke aanduiding voor dianummer 3"/>
+              <a:rPr lang="en-GB" dirty="0" err="1"/>
+              <a:t>Vervolgens</a:t>
+            </a:r>
+            <a:r>
+              <a:rPr lang="en-GB" dirty="0"/>
+              <a:t> </a:t>
+            </a:r>
+            <a:r>
+              <a:rPr lang="en-GB" dirty="0" err="1"/>
+              <a:t>bespreken</a:t>
+            </a:r>
+            <a:r>
+              <a:rPr lang="en-GB" dirty="0"/>
+              <a:t> we de </a:t>
+            </a:r>
+            <a:r>
+              <a:rPr lang="en-GB" dirty="0" err="1"/>
+              <a:t>ontwerpskeuzes</a:t>
+            </a:r>
+            <a:endParaRPr lang="en-GB" dirty="0"/>
+          </a:p>
+        </p:txBody>
+      </p:sp>
+      <p:sp>
+        <p:nvSpPr>
+          <p:cNvPr id="4" name="Slide Number Placeholder 3"/>
           <p:cNvSpPr>
             <a:spLocks noGrp="1"/>
           </p:cNvSpPr>
@@ -1424,7 +1743,7 @@
           <a:p>
             <a:fld id="{539A0A48-EDB1-4AFE-B1B7-10CE2A416496}" type="slidenum">
               <a:rPr lang="en-GB" smtClean="0"/>
-              <a:t>6</a:t>
+              <a:t>5</a:t>
             </a:fld>
             <a:endParaRPr lang="en-GB"/>
           </a:p>
@@ -1433,7 +1752,7 @@
     </p:spTree>
     <p:extLst>
       <p:ext uri="{BB962C8B-B14F-4D97-AF65-F5344CB8AC3E}">
-        <p14:creationId xmlns:p14="http://schemas.microsoft.com/office/powerpoint/2010/main" val="2513926235"/>
+        <p14:creationId xmlns:p14="http://schemas.microsoft.com/office/powerpoint/2010/main" val="847193591"/>
       </p:ext>
     </p:extLst>
   </p:cSld>
@@ -1489,42 +1808,89 @@
           <a:p>
             <a:r>
               <a:rPr lang="nl-BE" dirty="0"/>
-              <a:t>Bram:</a:t>
-            </a:r>
+              <a:t>Project samengevat op één dia</a:t>
+            </a:r>
+          </a:p>
+          <a:p>
+            <a:endParaRPr lang="nl-BE" dirty="0"/>
           </a:p>
           <a:p>
             <a:r>
               <a:rPr lang="nl-BE" dirty="0"/>
-              <a:t>Denken aan locatie </a:t>
+              <a:t>Drone</a:t>
+            </a:r>
+          </a:p>
+          <a:p>
+            <a:r>
+              <a:rPr lang="nl-BE" dirty="0"/>
+              <a:t>Raspberry Pi Zero W </a:t>
             </a:r>
             <a:r>
               <a:rPr lang="nl-BE" dirty="0">
                 <a:sym typeface="Wingdings" pitchFamily="2" charset="2"/>
               </a:rPr>
-              <a:t> Gps, wifi, bluetooth  Te onnauwkeurig</a:t>
-            </a:r>
-          </a:p>
-          <a:p>
+              <a:t> De controller, kleine computer</a:t>
+            </a:r>
+            <a:endParaRPr lang="nl-BE" dirty="0"/>
+          </a:p>
+          <a:p>
+            <a:r>
+              <a:rPr lang="nl-BE" dirty="0"/>
+              <a:t>LiPo Batterij </a:t>
+            </a:r>
             <a:r>
               <a:rPr lang="nl-BE" dirty="0">
                 <a:sym typeface="Wingdings" pitchFamily="2" charset="2"/>
               </a:rPr>
-              <a:t>Ons doel is om drone tussen rekken op 2m afstand te laten vliegen</a:t>
-            </a:r>
-          </a:p>
-          <a:p>
-            <a:endParaRPr lang="nl-BE" dirty="0">
-              <a:sym typeface="Wingdings" pitchFamily="2" charset="2"/>
-            </a:endParaRPr>
-          </a:p>
-          <a:p>
+              <a:t> De controller van stroom voorzien</a:t>
+            </a:r>
+          </a:p>
+          <a:p>
+            <a:r>
+              <a:rPr lang="nl-BE" dirty="0"/>
+              <a:t>Bram zal nu verder uitweiden over de locatiebepaling en de server</a:t>
+            </a:r>
+          </a:p>
+          <a:p>
+            <a:endParaRPr lang="nl-BE" dirty="0"/>
+          </a:p>
+          <a:p>
+            <a:r>
+              <a:rPr lang="nl-BE" dirty="0"/>
+              <a:t>Bram: </a:t>
+            </a:r>
+          </a:p>
+          <a:p>
+            <a:r>
+              <a:rPr lang="nl-BE" dirty="0"/>
+              <a:t>Pozyx tags en anchers</a:t>
+            </a:r>
+          </a:p>
+          <a:p>
+            <a:r>
+              <a:rPr lang="nl-BE" dirty="0"/>
+              <a:t>Theorie: Exact een route aan de drone meegeven vanaf een gekende locatie</a:t>
+            </a:r>
+          </a:p>
+          <a:p>
+            <a:r>
+              <a:rPr lang="nl-BE" dirty="0"/>
+              <a:t>Praktijk: Onhaalbaar </a:t>
+            </a:r>
             <a:r>
               <a:rPr lang="nl-BE" dirty="0">
                 <a:sym typeface="Wingdings" pitchFamily="2" charset="2"/>
               </a:rPr>
-              <a:t>Oplossing UWB</a:t>
-            </a:r>
-            <a:endParaRPr lang="nl-BE" dirty="0"/>
+              <a:t> Ongekende obstakels, een ventilatieschacht etc.</a:t>
+            </a:r>
+          </a:p>
+          <a:p>
+            <a:r>
+              <a:rPr lang="nl-BE" dirty="0">
+                <a:sym typeface="Wingdings" pitchFamily="2" charset="2"/>
+              </a:rPr>
+              <a:t>Locatie is belangrijk</a:t>
+            </a:r>
           </a:p>
         </p:txBody>
       </p:sp>
@@ -1545,7 +1911,7 @@
           <a:p>
             <a:fld id="{539A0A48-EDB1-4AFE-B1B7-10CE2A416496}" type="slidenum">
               <a:rPr lang="en-GB" smtClean="0"/>
-              <a:t>7</a:t>
+              <a:t>6</a:t>
             </a:fld>
             <a:endParaRPr lang="en-GB"/>
           </a:p>
@@ -1554,7 +1920,7 @@
     </p:spTree>
     <p:extLst>
       <p:ext uri="{BB962C8B-B14F-4D97-AF65-F5344CB8AC3E}">
-        <p14:creationId xmlns:p14="http://schemas.microsoft.com/office/powerpoint/2010/main" val="3176631790"/>
+        <p14:creationId xmlns:p14="http://schemas.microsoft.com/office/powerpoint/2010/main" val="2513926235"/>
       </p:ext>
     </p:extLst>
   </p:cSld>
@@ -1616,55 +1982,35 @@
           <a:p>
             <a:r>
               <a:rPr lang="nl-BE" dirty="0"/>
-              <a:t>Ankers op gekende locaties</a:t>
-            </a:r>
-          </a:p>
-          <a:p>
-            <a:r>
-              <a:rPr lang="nl-BE" dirty="0"/>
-              <a:t>Tag aan de Raspberry Pi op de drone</a:t>
-            </a:r>
-          </a:p>
-          <a:p>
-            <a:endParaRPr lang="nl-BE" dirty="0"/>
-          </a:p>
-          <a:p>
-            <a:r>
-              <a:rPr lang="nl-BE" dirty="0"/>
-              <a:t>Tag spreekt om de beurt ankers aan, en weet hierdoor de afstand tot een bepaald punt in het magazijn</a:t>
-            </a:r>
-          </a:p>
-          <a:p>
-            <a:endParaRPr lang="nl-BE" dirty="0"/>
-          </a:p>
-          <a:p>
-            <a:r>
-              <a:rPr lang="nl-BE" dirty="0"/>
-              <a:t>Eerst gekozen voor Pozyx, want was direct beschikbaar</a:t>
-            </a:r>
-          </a:p>
-          <a:p>
-            <a:r>
-              <a:rPr lang="nl-BE" dirty="0"/>
-              <a:t>Toekomst: misschien DecaWave DWM1001, + kleiner, goedkoper, lichter</a:t>
-            </a:r>
-          </a:p>
-          <a:p>
-            <a:endParaRPr lang="nl-BE" dirty="0"/>
-          </a:p>
-          <a:p>
-            <a:r>
-              <a:rPr lang="nl-BE" dirty="0"/>
-              <a:t>Gewicht? Onze drone niet extreem belangrijk, maar uitbereiden naar kleinere drones wel.. </a:t>
-            </a:r>
-          </a:p>
-          <a:p>
-            <a:r>
-              <a:rPr lang="nl-BE" dirty="0"/>
-              <a:t>Stabiliteit, vliegtijd</a:t>
-            </a:r>
-          </a:p>
-          <a:p>
+              <a:t>Denken aan locatie </a:t>
+            </a:r>
+            <a:r>
+              <a:rPr lang="nl-BE" dirty="0">
+                <a:sym typeface="Wingdings" pitchFamily="2" charset="2"/>
+              </a:rPr>
+              <a:t> Gps, wifi, bluetooth  Te onnauwkeurig</a:t>
+            </a:r>
+          </a:p>
+          <a:p>
+            <a:r>
+              <a:rPr lang="nl-BE" dirty="0">
+                <a:sym typeface="Wingdings" pitchFamily="2" charset="2"/>
+              </a:rPr>
+              <a:t>Ons doel is om drone tussen rekken op 2m afstand te laten vliegen</a:t>
+            </a:r>
+          </a:p>
+          <a:p>
+            <a:endParaRPr lang="nl-BE" dirty="0">
+              <a:sym typeface="Wingdings" pitchFamily="2" charset="2"/>
+            </a:endParaRPr>
+          </a:p>
+          <a:p>
+            <a:r>
+              <a:rPr lang="nl-BE" dirty="0">
+                <a:sym typeface="Wingdings" pitchFamily="2" charset="2"/>
+              </a:rPr>
+              <a:t>Oplossing UWB</a:t>
+            </a:r>
             <a:endParaRPr lang="nl-BE" dirty="0"/>
           </a:p>
         </p:txBody>
@@ -1686,7 +2032,7 @@
           <a:p>
             <a:fld id="{539A0A48-EDB1-4AFE-B1B7-10CE2A416496}" type="slidenum">
               <a:rPr lang="en-GB" smtClean="0"/>
-              <a:t>8</a:t>
+              <a:t>7</a:t>
             </a:fld>
             <a:endParaRPr lang="en-GB"/>
           </a:p>
@@ -1695,7 +2041,7 @@
     </p:spTree>
     <p:extLst>
       <p:ext uri="{BB962C8B-B14F-4D97-AF65-F5344CB8AC3E}">
-        <p14:creationId xmlns:p14="http://schemas.microsoft.com/office/powerpoint/2010/main" val="2418677896"/>
+        <p14:creationId xmlns:p14="http://schemas.microsoft.com/office/powerpoint/2010/main" val="3176631790"/>
       </p:ext>
     </p:extLst>
   </p:cSld>
@@ -1751,25 +2097,53 @@
           <a:p>
             <a:r>
               <a:rPr lang="nl-BE" dirty="0"/>
-              <a:t>Bram:</a:t>
+              <a:t>Ankers op gekende locaties</a:t>
             </a:r>
           </a:p>
           <a:p>
             <a:r>
               <a:rPr lang="nl-BE" dirty="0"/>
-              <a:t>Afstanden </a:t>
-            </a:r>
-            <a:r>
-              <a:rPr lang="nl-BE" dirty="0">
-                <a:sym typeface="Wingdings" pitchFamily="2" charset="2"/>
-              </a:rPr>
-              <a:t>naar positie</a:t>
-            </a:r>
-          </a:p>
-          <a:p>
-            <a:endParaRPr lang="nl-BE" dirty="0">
-              <a:sym typeface="Wingdings" pitchFamily="2" charset="2"/>
-            </a:endParaRPr>
+              <a:t>Tag aan de Raspberry Pi op de drone</a:t>
+            </a:r>
+          </a:p>
+          <a:p>
+            <a:endParaRPr lang="nl-BE" dirty="0"/>
+          </a:p>
+          <a:p>
+            <a:r>
+              <a:rPr lang="nl-BE" dirty="0"/>
+              <a:t>Tag spreekt om de beurt ankers aan, en weet hierdoor de afstand tot een bepaald punt in het magazijn</a:t>
+            </a:r>
+          </a:p>
+          <a:p>
+            <a:endParaRPr lang="nl-BE" dirty="0"/>
+          </a:p>
+          <a:p>
+            <a:r>
+              <a:rPr lang="nl-BE" dirty="0"/>
+              <a:t>Eerst gekozen voor Pozyx, want was direct beschikbaar</a:t>
+            </a:r>
+          </a:p>
+          <a:p>
+            <a:r>
+              <a:rPr lang="nl-BE" dirty="0"/>
+              <a:t>Toekomst: misschien DecaWave DWM1001, + kleiner, goedkoper, lichter</a:t>
+            </a:r>
+          </a:p>
+          <a:p>
+            <a:endParaRPr lang="nl-BE" dirty="0"/>
+          </a:p>
+          <a:p>
+            <a:r>
+              <a:rPr lang="nl-BE" dirty="0"/>
+              <a:t>Gewicht? Onze drone niet extreem belangrijk, maar uitbereiden naar kleinere drones wel.. </a:t>
+            </a:r>
+          </a:p>
+          <a:p>
+            <a:r>
+              <a:rPr lang="nl-BE" dirty="0"/>
+              <a:t>Stabiliteit, vliegtijd</a:t>
+            </a:r>
           </a:p>
           <a:p>
             <a:endParaRPr lang="nl-BE" dirty="0"/>
@@ -1793,7 +2167,7 @@
           <a:p>
             <a:fld id="{539A0A48-EDB1-4AFE-B1B7-10CE2A416496}" type="slidenum">
               <a:rPr lang="en-GB" smtClean="0"/>
-              <a:t>9</a:t>
+              <a:t>8</a:t>
             </a:fld>
             <a:endParaRPr lang="en-GB"/>
           </a:p>
@@ -1802,7 +2176,7 @@
     </p:spTree>
     <p:extLst>
       <p:ext uri="{BB962C8B-B14F-4D97-AF65-F5344CB8AC3E}">
-        <p14:creationId xmlns:p14="http://schemas.microsoft.com/office/powerpoint/2010/main" val="4015503791"/>
+        <p14:creationId xmlns:p14="http://schemas.microsoft.com/office/powerpoint/2010/main" val="2418677896"/>
       </p:ext>
     </p:extLst>
   </p:cSld>
@@ -1858,47 +2232,13 @@
           <a:p>
             <a:r>
               <a:rPr lang="nl-BE" dirty="0"/>
-              <a:t>Afstanden komen binnen op Raspberry Pi</a:t>
-            </a:r>
-          </a:p>
-          <a:p>
-            <a:endParaRPr lang="nl-BE" dirty="0"/>
-          </a:p>
-          <a:p>
-            <a:r>
-              <a:rPr lang="nl-BE" dirty="0"/>
-              <a:t>Berekeningen verschuiven naar MQTT (=Message Queuing Telemetry Transport) server via wifi</a:t>
-            </a:r>
-          </a:p>
-          <a:p>
-            <a:endParaRPr lang="nl-BE" dirty="0"/>
-          </a:p>
-          <a:p>
-            <a:r>
-              <a:rPr lang="nl-BE" dirty="0"/>
-              <a:t>Wie? Broker </a:t>
+              <a:t>Afstanden </a:t>
             </a:r>
             <a:r>
               <a:rPr lang="nl-BE" dirty="0">
                 <a:sym typeface="Wingdings" pitchFamily="2" charset="2"/>
               </a:rPr>
-              <a:t> Clients</a:t>
-            </a:r>
-          </a:p>
-          <a:p>
-            <a:r>
-              <a:rPr lang="nl-BE" dirty="0">
-                <a:sym typeface="Wingdings" pitchFamily="2" charset="2"/>
-              </a:rPr>
-              <a:t>Methoden? Publish  Subscribe</a:t>
-            </a:r>
-          </a:p>
-          <a:p>
-            <a:r>
-              <a:rPr lang="nl-BE" dirty="0">
-                <a:sym typeface="Wingdings" pitchFamily="2" charset="2"/>
-              </a:rPr>
-              <a:t>Topics? Ranging  Position </a:t>
+              <a:t>naar positie</a:t>
             </a:r>
           </a:p>
           <a:p>
@@ -1907,44 +2247,6 @@
             </a:endParaRPr>
           </a:p>
           <a:p>
-            <a:r>
-              <a:rPr lang="nl-BE" dirty="0">
-                <a:sym typeface="Wingdings" pitchFamily="2" charset="2"/>
-              </a:rPr>
-              <a:t>Ander software matig concept m.b.t. Snelheid</a:t>
-            </a:r>
-          </a:p>
-          <a:p>
-            <a:r>
-              <a:rPr lang="nl-BE" dirty="0">
-                <a:sym typeface="Wingdings" pitchFamily="2" charset="2"/>
-              </a:rPr>
-              <a:t>Niet altijd alle ankers sturen, maar een selectie maken</a:t>
-            </a:r>
-          </a:p>
-          <a:p>
-            <a:endParaRPr lang="nl-BE" dirty="0">
-              <a:sym typeface="Wingdings" pitchFamily="2" charset="2"/>
-            </a:endParaRPr>
-          </a:p>
-          <a:p>
-            <a:r>
-              <a:rPr lang="nl-BE" dirty="0">
-                <a:sym typeface="Wingdings" pitchFamily="2" charset="2"/>
-              </a:rPr>
-              <a:t>Zijnoot: De server die we ter beschikking hebben werkt reeds in 2D, probleem</a:t>
-            </a:r>
-          </a:p>
-          <a:p>
-            <a:r>
-              <a:rPr lang="nl-BE" dirty="0">
-                <a:sym typeface="Wingdings" pitchFamily="2" charset="2"/>
-              </a:rPr>
-              <a:t>Oplossing: Ultrasone sensor op de drone voor de hoogte</a:t>
-            </a:r>
-            <a:endParaRPr lang="nl-BE" dirty="0"/>
-          </a:p>
-          <a:p>
             <a:endParaRPr lang="nl-BE" dirty="0"/>
           </a:p>
         </p:txBody>
@@ -1966,7 +2268,7 @@
           <a:p>
             <a:fld id="{539A0A48-EDB1-4AFE-B1B7-10CE2A416496}" type="slidenum">
               <a:rPr lang="en-GB" smtClean="0"/>
-              <a:t>10</a:t>
+              <a:t>9</a:t>
             </a:fld>
             <a:endParaRPr lang="en-GB"/>
           </a:p>
@@ -1975,7 +2277,7 @@
     </p:spTree>
     <p:extLst>
       <p:ext uri="{BB962C8B-B14F-4D97-AF65-F5344CB8AC3E}">
-        <p14:creationId xmlns:p14="http://schemas.microsoft.com/office/powerpoint/2010/main" val="2054610554"/>
+        <p14:creationId xmlns:p14="http://schemas.microsoft.com/office/powerpoint/2010/main" val="4015503791"/>
       </p:ext>
     </p:extLst>
   </p:cSld>
@@ -2030,10 +2332,48 @@
           <a:lstStyle/>
           <a:p>
             <a:r>
+              <a:rPr lang="nl-BE" dirty="0"/>
+              <a:t>Afstanden komen binnen op Raspberry Pi</a:t>
+            </a:r>
+          </a:p>
+          <a:p>
+            <a:endParaRPr lang="nl-BE" dirty="0"/>
+          </a:p>
+          <a:p>
+            <a:r>
+              <a:rPr lang="nl-BE" dirty="0"/>
+              <a:t>Berekeningen verschuiven naar MQTT (=Message Queuing Telemetry Transport) server via wifi</a:t>
+            </a:r>
+          </a:p>
+          <a:p>
+            <a:endParaRPr lang="nl-BE" dirty="0"/>
+          </a:p>
+          <a:p>
+            <a:r>
+              <a:rPr lang="nl-BE" dirty="0"/>
+              <a:t>Wie? Broker </a:t>
+            </a:r>
+            <a:r>
               <a:rPr lang="nl-BE" dirty="0">
                 <a:sym typeface="Wingdings" pitchFamily="2" charset="2"/>
               </a:rPr>
-              <a:t>Drone aansturen via Raspberry </a:t>
+              <a:t> Clients</a:t>
+            </a:r>
+          </a:p>
+          <a:p>
+            <a:r>
+              <a:rPr lang="nl-BE" dirty="0">
+                <a:sym typeface="Wingdings" pitchFamily="2" charset="2"/>
+              </a:rPr>
+              <a:t>Methoden? Publish  Subscribe</a:t>
+            </a:r>
+          </a:p>
+          <a:p>
+            <a:r>
+              <a:rPr lang="nl-BE" dirty="0">
+                <a:sym typeface="Wingdings" pitchFamily="2" charset="2"/>
+              </a:rPr>
+              <a:t>Topics? Ranging  Position </a:t>
             </a:r>
           </a:p>
           <a:p>
@@ -2042,11 +2382,44 @@
             </a:endParaRPr>
           </a:p>
           <a:p>
+            <a:r>
+              <a:rPr lang="nl-BE" dirty="0">
+                <a:sym typeface="Wingdings" pitchFamily="2" charset="2"/>
+              </a:rPr>
+              <a:t>Ander software matig concept m.b.t. Snelheid</a:t>
+            </a:r>
+          </a:p>
+          <a:p>
+            <a:r>
+              <a:rPr lang="nl-BE" dirty="0">
+                <a:sym typeface="Wingdings" pitchFamily="2" charset="2"/>
+              </a:rPr>
+              <a:t>Niet altijd alle ankers sturen, maar een selectie maken</a:t>
+            </a:r>
+          </a:p>
+          <a:p>
             <a:endParaRPr lang="nl-BE" dirty="0">
               <a:sym typeface="Wingdings" pitchFamily="2" charset="2"/>
             </a:endParaRPr>
           </a:p>
           <a:p>
+            <a:r>
+              <a:rPr lang="nl-BE" dirty="0">
+                <a:sym typeface="Wingdings" pitchFamily="2" charset="2"/>
+              </a:rPr>
+              <a:t>Zijnoot: De server die we ter beschikking hebben werkt reeds in 2D, probleem</a:t>
+            </a:r>
+          </a:p>
+          <a:p>
+            <a:r>
+              <a:rPr lang="nl-BE" dirty="0">
+                <a:sym typeface="Wingdings" pitchFamily="2" charset="2"/>
+              </a:rPr>
+              <a:t>Oplossing: Ultrasone sensor op de drone voor de hoogte</a:t>
+            </a:r>
+            <a:endParaRPr lang="nl-BE" dirty="0"/>
+          </a:p>
+          <a:p>
             <a:endParaRPr lang="nl-BE" dirty="0"/>
           </a:p>
         </p:txBody>
@@ -2068,7 +2441,7 @@
           <a:p>
             <a:fld id="{539A0A48-EDB1-4AFE-B1B7-10CE2A416496}" type="slidenum">
               <a:rPr lang="en-GB" smtClean="0"/>
-              <a:t>11</a:t>
+              <a:t>10</a:t>
             </a:fld>
             <a:endParaRPr lang="en-GB"/>
           </a:p>
@@ -2077,7 +2450,7 @@
     </p:spTree>
     <p:extLst>
       <p:ext uri="{BB962C8B-B14F-4D97-AF65-F5344CB8AC3E}">
-        <p14:creationId xmlns:p14="http://schemas.microsoft.com/office/powerpoint/2010/main" val="1259480818"/>
+        <p14:creationId xmlns:p14="http://schemas.microsoft.com/office/powerpoint/2010/main" val="2054610554"/>
       </p:ext>
     </p:extLst>
   </p:cSld>

</xml_diff>